<commit_message>
Minor changes an ppt completition
</commit_message>
<xml_diff>
--- a/2017-5 - 10 gruppo 8.pptx
+++ b/2017-5 - 10 gruppo 8.pptx
@@ -5,7 +5,7 @@
     <p:sldMasterId id="2147483732" r:id="rId1"/>
   </p:sldMasterIdLst>
   <p:notesMasterIdLst>
-    <p:notesMasterId r:id="rId7"/>
+    <p:notesMasterId r:id="rId19"/>
   </p:notesMasterIdLst>
   <p:sldIdLst>
     <p:sldId id="256" r:id="rId2"/>
@@ -13,6 +13,18 @@
     <p:sldId id="258" r:id="rId4"/>
     <p:sldId id="259" r:id="rId5"/>
     <p:sldId id="260" r:id="rId6"/>
+    <p:sldId id="261" r:id="rId7"/>
+    <p:sldId id="262" r:id="rId8"/>
+    <p:sldId id="266" r:id="rId9"/>
+    <p:sldId id="267" r:id="rId10"/>
+    <p:sldId id="268" r:id="rId11"/>
+    <p:sldId id="270" r:id="rId12"/>
+    <p:sldId id="271" r:id="rId13"/>
+    <p:sldId id="275" r:id="rId14"/>
+    <p:sldId id="276" r:id="rId15"/>
+    <p:sldId id="277" r:id="rId16"/>
+    <p:sldId id="279" r:id="rId17"/>
+    <p:sldId id="280" r:id="rId18"/>
   </p:sldIdLst>
   <p:sldSz cx="12192000" cy="6858000"/>
   <p:notesSz cx="6858000" cy="9144000"/>
@@ -111,6 +123,48 @@
       </a:defRPr>
     </a:lvl9pPr>
   </p:defaultTextStyle>
+  <p:extLst>
+    <p:ext uri="{521415D9-36F7-43E2-AB2F-B90AF26B5E84}">
+      <p14:sectionLst xmlns:p14="http://schemas.microsoft.com/office/powerpoint/2010/main">
+        <p14:section name="Sezione predefinita" id="{E0F5B197-CCD8-4FE2-A7DE-E5B427B19C99}">
+          <p14:sldIdLst>
+            <p14:sldId id="256"/>
+            <p14:sldId id="257"/>
+          </p14:sldIdLst>
+        </p14:section>
+        <p14:section name="Descrittive" id="{9C3B7421-A4A7-4AAF-8D5F-80E71D83E2A4}">
+          <p14:sldIdLst>
+            <p14:sldId id="258"/>
+            <p14:sldId id="259"/>
+            <p14:sldId id="260"/>
+            <p14:sldId id="261"/>
+          </p14:sldIdLst>
+        </p14:section>
+        <p14:section name="Non parametriche" id="{54DB201B-18D2-4FD1-9CDA-3FDC68748164}">
+          <p14:sldIdLst>
+            <p14:sldId id="262"/>
+            <p14:sldId id="266"/>
+            <p14:sldId id="267"/>
+            <p14:sldId id="268"/>
+            <p14:sldId id="270"/>
+            <p14:sldId id="271"/>
+            <p14:sldId id="275"/>
+            <p14:sldId id="276"/>
+            <p14:sldId id="277"/>
+          </p14:sldIdLst>
+        </p14:section>
+        <p14:section name="Modelli di Cox" id="{35B3E83D-6F2A-4BBD-A43E-85D2D6B56862}">
+          <p14:sldIdLst>
+            <p14:sldId id="279"/>
+            <p14:sldId id="280"/>
+          </p14:sldIdLst>
+        </p14:section>
+      </p14:sectionLst>
+    </p:ext>
+    <p:ext uri="{EFAFB233-063F-42B5-8137-9DF3F51BA10A}">
+      <p15:sldGuideLst xmlns:p15="http://schemas.microsoft.com/office/powerpoint/2012/main"/>
+    </p:ext>
+  </p:extLst>
 </p:presentation>
 </file>
 
@@ -587,6 +641,479 @@
 </p:notes>
 </file>
 
+<file path=ppt/notesSlides/notesSlide10.xml><?xml version="1.0" encoding="utf-8"?>
+<p:notes xmlns:a="http://schemas.openxmlformats.org/drawingml/2006/main" xmlns:r="http://schemas.openxmlformats.org/officeDocument/2006/relationships" xmlns:p="http://schemas.openxmlformats.org/presentationml/2006/main">
+  <p:cSld>
+    <p:spTree>
+      <p:nvGrpSpPr>
+        <p:cNvPr id="1" name=""/>
+        <p:cNvGrpSpPr/>
+        <p:nvPr/>
+      </p:nvGrpSpPr>
+      <p:grpSpPr>
+        <a:xfrm>
+          <a:off x="0" y="0"/>
+          <a:ext cx="0" cy="0"/>
+          <a:chOff x="0" y="0"/>
+          <a:chExt cx="0" cy="0"/>
+        </a:xfrm>
+      </p:grpSpPr>
+      <p:sp>
+        <p:nvSpPr>
+          <p:cNvPr id="2" name="Segnaposto immagine diapositiva 1"/>
+          <p:cNvSpPr>
+            <a:spLocks noGrp="1" noRot="1" noChangeAspect="1"/>
+          </p:cNvSpPr>
+          <p:nvPr>
+            <p:ph type="sldImg"/>
+          </p:nvPr>
+        </p:nvSpPr>
+        <p:spPr/>
+      </p:sp>
+      <p:sp>
+        <p:nvSpPr>
+          <p:cNvPr id="3" name="Segnaposto note 2"/>
+          <p:cNvSpPr>
+            <a:spLocks noGrp="1"/>
+          </p:cNvSpPr>
+          <p:nvPr>
+            <p:ph type="body" idx="1"/>
+          </p:nvPr>
+        </p:nvSpPr>
+        <p:spPr/>
+        <p:txBody>
+          <a:bodyPr/>
+          <a:lstStyle/>
+          <a:p>
+            <a:pPr marL="0" marR="0" lvl="0" indent="0" algn="l" defTabSz="914400" rtl="0" eaLnBrk="1" fontAlgn="auto" latinLnBrk="0" hangingPunct="1">
+              <a:lnSpc>
+                <a:spcPct val="100000"/>
+              </a:lnSpc>
+              <a:spcBef>
+                <a:spcPts val="0"/>
+              </a:spcBef>
+              <a:spcAft>
+                <a:spcPts val="0"/>
+              </a:spcAft>
+              <a:buClrTx/>
+              <a:buSzTx/>
+              <a:buFontTx/>
+              <a:buNone/>
+              <a:tabLst/>
+              <a:defRPr/>
+            </a:pPr>
+            <a:r>
+              <a:rPr lang="nn-NO" sz="1200" b="0" i="0" u="none" strike="noStrike" kern="1200" baseline="0" dirty="0" smtClean="0">
+                <a:solidFill>
+                  <a:schemeClr val="tx1"/>
+                </a:solidFill>
+                <a:latin typeface="+mn-lt"/>
+                <a:ea typeface="+mn-ea"/>
+                <a:cs typeface="+mn-cs"/>
+              </a:rPr>
+              <a:t>Dallo studio condotto da N. C. Arslan, S. Sokmen vediamo che le curve di sopravvienza per LNR sono compatibili (le nostre a destra). </a:t>
+            </a:r>
+            <a:endParaRPr lang="it-IT" dirty="0" smtClean="0"/>
+          </a:p>
+          <a:p>
+            <a:r>
+              <a:rPr lang="it-IT" dirty="0" smtClean="0"/>
+              <a:t>Da questo</a:t>
+            </a:r>
+            <a:r>
+              <a:rPr lang="it-IT" baseline="0" dirty="0" smtClean="0"/>
+              <a:t> possiamo dire che l’analisi da noi condotta conferma lo studio precedentemente citato. </a:t>
+            </a:r>
+            <a:endParaRPr lang="it-IT" dirty="0"/>
+          </a:p>
+        </p:txBody>
+      </p:sp>
+      <p:sp>
+        <p:nvSpPr>
+          <p:cNvPr id="4" name="Segnaposto numero diapositiva 3"/>
+          <p:cNvSpPr>
+            <a:spLocks noGrp="1"/>
+          </p:cNvSpPr>
+          <p:nvPr>
+            <p:ph type="sldNum" sz="quarter" idx="10"/>
+          </p:nvPr>
+        </p:nvSpPr>
+        <p:spPr/>
+        <p:txBody>
+          <a:bodyPr/>
+          <a:lstStyle/>
+          <a:p>
+            <a:fld id="{BA521C96-A9D3-4B92-95F8-5669AF865DB6}" type="slidenum">
+              <a:rPr lang="it-IT" smtClean="0"/>
+              <a:t>14</a:t>
+            </a:fld>
+            <a:endParaRPr lang="it-IT"/>
+          </a:p>
+        </p:txBody>
+      </p:sp>
+    </p:spTree>
+    <p:extLst>
+      <p:ext uri="{BB962C8B-B14F-4D97-AF65-F5344CB8AC3E}">
+        <p14:creationId xmlns:p14="http://schemas.microsoft.com/office/powerpoint/2010/main" val="371058099"/>
+      </p:ext>
+    </p:extLst>
+  </p:cSld>
+  <p:clrMapOvr>
+    <a:masterClrMapping/>
+  </p:clrMapOvr>
+</p:notes>
+</file>
+
+<file path=ppt/notesSlides/notesSlide11.xml><?xml version="1.0" encoding="utf-8"?>
+<p:notes xmlns:a="http://schemas.openxmlformats.org/drawingml/2006/main" xmlns:r="http://schemas.openxmlformats.org/officeDocument/2006/relationships" xmlns:p="http://schemas.openxmlformats.org/presentationml/2006/main">
+  <p:cSld>
+    <p:spTree>
+      <p:nvGrpSpPr>
+        <p:cNvPr id="1" name=""/>
+        <p:cNvGrpSpPr/>
+        <p:nvPr/>
+      </p:nvGrpSpPr>
+      <p:grpSpPr>
+        <a:xfrm>
+          <a:off x="0" y="0"/>
+          <a:ext cx="0" cy="0"/>
+          <a:chOff x="0" y="0"/>
+          <a:chExt cx="0" cy="0"/>
+        </a:xfrm>
+      </p:grpSpPr>
+      <p:sp>
+        <p:nvSpPr>
+          <p:cNvPr id="2" name="Segnaposto immagine diapositiva 1"/>
+          <p:cNvSpPr>
+            <a:spLocks noGrp="1" noRot="1" noChangeAspect="1"/>
+          </p:cNvSpPr>
+          <p:nvPr>
+            <p:ph type="sldImg"/>
+          </p:nvPr>
+        </p:nvSpPr>
+        <p:spPr/>
+      </p:sp>
+      <p:sp>
+        <p:nvSpPr>
+          <p:cNvPr id="3" name="Segnaposto note 2"/>
+          <p:cNvSpPr>
+            <a:spLocks noGrp="1"/>
+          </p:cNvSpPr>
+          <p:nvPr>
+            <p:ph type="body" idx="1"/>
+          </p:nvPr>
+        </p:nvSpPr>
+        <p:spPr/>
+        <p:txBody>
+          <a:bodyPr/>
+          <a:lstStyle/>
+          <a:p>
+            <a:r>
+              <a:rPr lang="it-IT" dirty="0" smtClean="0"/>
+              <a:t>Queste sono le curve della</a:t>
+            </a:r>
+            <a:r>
+              <a:rPr lang="it-IT" baseline="0" dirty="0" smtClean="0"/>
+              <a:t> sopravvivenza per il </a:t>
+            </a:r>
+            <a:r>
+              <a:rPr lang="it-IT" baseline="0" dirty="0" err="1" smtClean="0"/>
+              <a:t>disease</a:t>
+            </a:r>
+            <a:r>
+              <a:rPr lang="it-IT" baseline="0" dirty="0" smtClean="0"/>
+              <a:t> free. Anche in questo caso notiamo che la classe LNR 2 e la classe LODDS 2 sono significativamente differenti rispetto ai restanti. </a:t>
+            </a:r>
+            <a:endParaRPr lang="it-IT" dirty="0"/>
+          </a:p>
+        </p:txBody>
+      </p:sp>
+      <p:sp>
+        <p:nvSpPr>
+          <p:cNvPr id="4" name="Segnaposto numero diapositiva 3"/>
+          <p:cNvSpPr>
+            <a:spLocks noGrp="1"/>
+          </p:cNvSpPr>
+          <p:nvPr>
+            <p:ph type="sldNum" sz="quarter" idx="10"/>
+          </p:nvPr>
+        </p:nvSpPr>
+        <p:spPr/>
+        <p:txBody>
+          <a:bodyPr/>
+          <a:lstStyle/>
+          <a:p>
+            <a:fld id="{BA521C96-A9D3-4B92-95F8-5669AF865DB6}" type="slidenum">
+              <a:rPr lang="it-IT" smtClean="0"/>
+              <a:t>15</a:t>
+            </a:fld>
+            <a:endParaRPr lang="it-IT"/>
+          </a:p>
+        </p:txBody>
+      </p:sp>
+    </p:spTree>
+    <p:extLst>
+      <p:ext uri="{BB962C8B-B14F-4D97-AF65-F5344CB8AC3E}">
+        <p14:creationId xmlns:p14="http://schemas.microsoft.com/office/powerpoint/2010/main" val="3886210708"/>
+      </p:ext>
+    </p:extLst>
+  </p:cSld>
+  <p:clrMapOvr>
+    <a:masterClrMapping/>
+  </p:clrMapOvr>
+</p:notes>
+</file>
+
+<file path=ppt/notesSlides/notesSlide12.xml><?xml version="1.0" encoding="utf-8"?>
+<p:notes xmlns:a="http://schemas.openxmlformats.org/drawingml/2006/main" xmlns:r="http://schemas.openxmlformats.org/officeDocument/2006/relationships" xmlns:p="http://schemas.openxmlformats.org/presentationml/2006/main">
+  <p:cSld>
+    <p:spTree>
+      <p:nvGrpSpPr>
+        <p:cNvPr id="1" name=""/>
+        <p:cNvGrpSpPr/>
+        <p:nvPr/>
+      </p:nvGrpSpPr>
+      <p:grpSpPr>
+        <a:xfrm>
+          <a:off x="0" y="0"/>
+          <a:ext cx="0" cy="0"/>
+          <a:chOff x="0" y="0"/>
+          <a:chExt cx="0" cy="0"/>
+        </a:xfrm>
+      </p:grpSpPr>
+      <p:sp>
+        <p:nvSpPr>
+          <p:cNvPr id="2" name="Segnaposto immagine diapositiva 1"/>
+          <p:cNvSpPr>
+            <a:spLocks noGrp="1" noRot="1" noChangeAspect="1"/>
+          </p:cNvSpPr>
+          <p:nvPr>
+            <p:ph type="sldImg"/>
+          </p:nvPr>
+        </p:nvSpPr>
+        <p:spPr/>
+      </p:sp>
+      <p:sp>
+        <p:nvSpPr>
+          <p:cNvPr id="3" name="Segnaposto note 2"/>
+          <p:cNvSpPr>
+            <a:spLocks noGrp="1"/>
+          </p:cNvSpPr>
+          <p:nvPr>
+            <p:ph type="body" idx="1"/>
+          </p:nvPr>
+        </p:nvSpPr>
+        <p:spPr/>
+        <p:txBody>
+          <a:bodyPr/>
+          <a:lstStyle/>
+          <a:p>
+            <a:r>
+              <a:rPr lang="it-IT" dirty="0" smtClean="0"/>
+              <a:t>Abbiamo</a:t>
+            </a:r>
+            <a:r>
+              <a:rPr lang="it-IT" baseline="0" dirty="0" smtClean="0"/>
+              <a:t> modo di credere che l’ipotesi dei rischi proporzionali non sia rispettata. Pertanto il modello di </a:t>
+            </a:r>
+            <a:r>
+              <a:rPr lang="it-IT" baseline="0" dirty="0" err="1" smtClean="0"/>
+              <a:t>Cox</a:t>
+            </a:r>
+            <a:r>
+              <a:rPr lang="it-IT" baseline="0" dirty="0" smtClean="0"/>
+              <a:t> che stiamo per proporre probabilmente è errato.</a:t>
+            </a:r>
+            <a:endParaRPr lang="it-IT" dirty="0"/>
+          </a:p>
+        </p:txBody>
+      </p:sp>
+      <p:sp>
+        <p:nvSpPr>
+          <p:cNvPr id="4" name="Segnaposto numero diapositiva 3"/>
+          <p:cNvSpPr>
+            <a:spLocks noGrp="1"/>
+          </p:cNvSpPr>
+          <p:nvPr>
+            <p:ph type="sldNum" sz="quarter" idx="10"/>
+          </p:nvPr>
+        </p:nvSpPr>
+        <p:spPr/>
+        <p:txBody>
+          <a:bodyPr/>
+          <a:lstStyle/>
+          <a:p>
+            <a:fld id="{BA521C96-A9D3-4B92-95F8-5669AF865DB6}" type="slidenum">
+              <a:rPr lang="it-IT" smtClean="0"/>
+              <a:t>16</a:t>
+            </a:fld>
+            <a:endParaRPr lang="it-IT"/>
+          </a:p>
+        </p:txBody>
+      </p:sp>
+    </p:spTree>
+    <p:extLst>
+      <p:ext uri="{BB962C8B-B14F-4D97-AF65-F5344CB8AC3E}">
+        <p14:creationId xmlns:p14="http://schemas.microsoft.com/office/powerpoint/2010/main" val="2604708004"/>
+      </p:ext>
+    </p:extLst>
+  </p:cSld>
+  <p:clrMapOvr>
+    <a:masterClrMapping/>
+  </p:clrMapOvr>
+</p:notes>
+</file>
+
+<file path=ppt/notesSlides/notesSlide13.xml><?xml version="1.0" encoding="utf-8"?>
+<p:notes xmlns:a="http://schemas.openxmlformats.org/drawingml/2006/main" xmlns:r="http://schemas.openxmlformats.org/officeDocument/2006/relationships" xmlns:p="http://schemas.openxmlformats.org/presentationml/2006/main">
+  <p:cSld>
+    <p:spTree>
+      <p:nvGrpSpPr>
+        <p:cNvPr id="1" name=""/>
+        <p:cNvGrpSpPr/>
+        <p:nvPr/>
+      </p:nvGrpSpPr>
+      <p:grpSpPr>
+        <a:xfrm>
+          <a:off x="0" y="0"/>
+          <a:ext cx="0" cy="0"/>
+          <a:chOff x="0" y="0"/>
+          <a:chExt cx="0" cy="0"/>
+        </a:xfrm>
+      </p:grpSpPr>
+      <p:sp>
+        <p:nvSpPr>
+          <p:cNvPr id="2" name="Segnaposto immagine diapositiva 1"/>
+          <p:cNvSpPr>
+            <a:spLocks noGrp="1" noRot="1" noChangeAspect="1"/>
+          </p:cNvSpPr>
+          <p:nvPr>
+            <p:ph type="sldImg"/>
+          </p:nvPr>
+        </p:nvSpPr>
+        <p:spPr/>
+      </p:sp>
+      <p:sp>
+        <p:nvSpPr>
+          <p:cNvPr id="3" name="Segnaposto note 2"/>
+          <p:cNvSpPr>
+            <a:spLocks noGrp="1"/>
+          </p:cNvSpPr>
+          <p:nvPr>
+            <p:ph type="body" idx="1"/>
+          </p:nvPr>
+        </p:nvSpPr>
+        <p:spPr/>
+        <p:txBody>
+          <a:bodyPr/>
+          <a:lstStyle/>
+          <a:p>
+            <a:pPr marL="171450" indent="-171450">
+              <a:buFont typeface="Arial" panose="020B0604020202020204" pitchFamily="34" charset="0"/>
+              <a:buChar char="•"/>
+            </a:pPr>
+            <a:r>
+              <a:rPr lang="it-IT" dirty="0" smtClean="0"/>
+              <a:t>Come già visto, il coefficiente riferito alla classe 1 di LNR non è significativo.</a:t>
+            </a:r>
+            <a:r>
+              <a:rPr lang="it-IT" baseline="0" dirty="0" smtClean="0"/>
+              <a:t> </a:t>
+            </a:r>
+            <a:r>
+              <a:rPr lang="it-IT" b="1" dirty="0" smtClean="0"/>
+              <a:t>Il coefficiente relativo alla classe 2, invece, risulta essere significativo. </a:t>
+            </a:r>
+            <a:r>
+              <a:rPr lang="it-IT" dirty="0" smtClean="0"/>
+              <a:t>L'</a:t>
+            </a:r>
+            <a:r>
+              <a:rPr lang="it-IT" dirty="0" err="1" smtClean="0"/>
+              <a:t>hazard</a:t>
+            </a:r>
+            <a:r>
+              <a:rPr lang="it-IT" dirty="0" smtClean="0"/>
+              <a:t> ratio risulta essere, infatti, di 3.055</a:t>
+            </a:r>
+            <a:r>
+              <a:rPr lang="it-IT" baseline="0" dirty="0" smtClean="0"/>
+              <a:t> </a:t>
+            </a:r>
+            <a:r>
+              <a:rPr lang="it-IT" dirty="0" smtClean="0"/>
+              <a:t>con valori che oscillano tra 1.89 e 4.9 con intervalli di confidenza del 95%</a:t>
+            </a:r>
+            <a:br>
+              <a:rPr lang="it-IT" dirty="0" smtClean="0"/>
+            </a:br>
+            <a:endParaRPr lang="it-IT" dirty="0" smtClean="0"/>
+          </a:p>
+          <a:p>
+            <a:pPr marL="171450" indent="-171450">
+              <a:buFont typeface="Arial" panose="020B0604020202020204" pitchFamily="34" charset="0"/>
+              <a:buChar char="•"/>
+            </a:pPr>
+            <a:r>
+              <a:rPr lang="it-IT" dirty="0" smtClean="0"/>
+              <a:t>Situazione analoga per LODDS. La prima classe non risulta significativa pe </a:t>
+            </a:r>
+            <a:r>
+              <a:rPr lang="it-IT" dirty="0" err="1" smtClean="0"/>
+              <a:t>run</a:t>
+            </a:r>
+            <a:r>
+              <a:rPr lang="it-IT" dirty="0" smtClean="0"/>
+              <a:t> intervallo di confidenza del 95%. </a:t>
+            </a:r>
+            <a:r>
+              <a:rPr lang="it-IT" b="1" dirty="0" smtClean="0"/>
+              <a:t>La classe 2, invece, è significativa,</a:t>
+            </a:r>
+            <a:r>
+              <a:rPr lang="it-IT" dirty="0" smtClean="0"/>
+              <a:t> con un HR di 3.8, con intervalli di confidenza al 95% che oscillano da 2.257 a 6.396</a:t>
+            </a:r>
+            <a:endParaRPr lang="it-IT" dirty="0"/>
+          </a:p>
+        </p:txBody>
+      </p:sp>
+      <p:sp>
+        <p:nvSpPr>
+          <p:cNvPr id="4" name="Segnaposto numero diapositiva 3"/>
+          <p:cNvSpPr>
+            <a:spLocks noGrp="1"/>
+          </p:cNvSpPr>
+          <p:nvPr>
+            <p:ph type="sldNum" sz="quarter" idx="10"/>
+          </p:nvPr>
+        </p:nvSpPr>
+        <p:spPr/>
+        <p:txBody>
+          <a:bodyPr/>
+          <a:lstStyle/>
+          <a:p>
+            <a:fld id="{BA521C96-A9D3-4B92-95F8-5669AF865DB6}" type="slidenum">
+              <a:rPr lang="it-IT" smtClean="0"/>
+              <a:t>17</a:t>
+            </a:fld>
+            <a:endParaRPr lang="it-IT"/>
+          </a:p>
+        </p:txBody>
+      </p:sp>
+    </p:spTree>
+    <p:extLst>
+      <p:ext uri="{BB962C8B-B14F-4D97-AF65-F5344CB8AC3E}">
+        <p14:creationId xmlns:p14="http://schemas.microsoft.com/office/powerpoint/2010/main" val="2655930392"/>
+      </p:ext>
+    </p:extLst>
+  </p:cSld>
+  <p:clrMapOvr>
+    <a:masterClrMapping/>
+  </p:clrMapOvr>
+</p:notes>
+</file>
+
 <file path=ppt/notesSlides/notesSlide2.xml><?xml version="1.0" encoding="utf-8"?>
 <p:notes xmlns:a="http://schemas.openxmlformats.org/drawingml/2006/main" xmlns:r="http://schemas.openxmlformats.org/officeDocument/2006/relationships" xmlns:p="http://schemas.openxmlformats.org/presentationml/2006/main">
   <p:cSld>
@@ -692,6 +1219,982 @@
     <p:extLst>
       <p:ext uri="{BB962C8B-B14F-4D97-AF65-F5344CB8AC3E}">
         <p14:creationId xmlns:p14="http://schemas.microsoft.com/office/powerpoint/2010/main" val="2243630574"/>
+      </p:ext>
+    </p:extLst>
+  </p:cSld>
+  <p:clrMapOvr>
+    <a:masterClrMapping/>
+  </p:clrMapOvr>
+</p:notes>
+</file>
+
+<file path=ppt/notesSlides/notesSlide3.xml><?xml version="1.0" encoding="utf-8"?>
+<p:notes xmlns:a="http://schemas.openxmlformats.org/drawingml/2006/main" xmlns:r="http://schemas.openxmlformats.org/officeDocument/2006/relationships" xmlns:p="http://schemas.openxmlformats.org/presentationml/2006/main">
+  <p:cSld>
+    <p:spTree>
+      <p:nvGrpSpPr>
+        <p:cNvPr id="1" name=""/>
+        <p:cNvGrpSpPr/>
+        <p:nvPr/>
+      </p:nvGrpSpPr>
+      <p:grpSpPr>
+        <a:xfrm>
+          <a:off x="0" y="0"/>
+          <a:ext cx="0" cy="0"/>
+          <a:chOff x="0" y="0"/>
+          <a:chExt cx="0" cy="0"/>
+        </a:xfrm>
+      </p:grpSpPr>
+      <p:sp>
+        <p:nvSpPr>
+          <p:cNvPr id="2" name="Segnaposto immagine diapositiva 1"/>
+          <p:cNvSpPr>
+            <a:spLocks noGrp="1" noRot="1" noChangeAspect="1"/>
+          </p:cNvSpPr>
+          <p:nvPr>
+            <p:ph type="sldImg"/>
+          </p:nvPr>
+        </p:nvSpPr>
+        <p:spPr/>
+      </p:sp>
+      <p:sp>
+        <p:nvSpPr>
+          <p:cNvPr id="3" name="Segnaposto note 2"/>
+          <p:cNvSpPr>
+            <a:spLocks noGrp="1"/>
+          </p:cNvSpPr>
+          <p:nvPr>
+            <p:ph type="body" idx="1"/>
+          </p:nvPr>
+        </p:nvSpPr>
+        <p:spPr/>
+        <p:txBody>
+          <a:bodyPr/>
+          <a:lstStyle/>
+          <a:p>
+            <a:r>
+              <a:rPr lang="it-IT" dirty="0" err="1" smtClean="0"/>
+              <a:t>Linfonode</a:t>
+            </a:r>
+            <a:r>
+              <a:rPr lang="it-IT" baseline="0" dirty="0" err="1" smtClean="0"/>
+              <a:t>s</a:t>
+            </a:r>
+            <a:r>
+              <a:rPr lang="it-IT" baseline="0" dirty="0" smtClean="0"/>
+              <a:t> Ratio e Log-</a:t>
+            </a:r>
+            <a:r>
+              <a:rPr lang="it-IT" baseline="0" dirty="0" err="1" smtClean="0"/>
+              <a:t>Odds</a:t>
+            </a:r>
+            <a:r>
+              <a:rPr lang="it-IT" baseline="0" dirty="0" smtClean="0"/>
+              <a:t> </a:t>
+            </a:r>
+            <a:r>
+              <a:rPr lang="it-IT" baseline="0" dirty="0" err="1" smtClean="0"/>
+              <a:t>Linfonodes</a:t>
+            </a:r>
+            <a:endParaRPr lang="it-IT" baseline="0" dirty="0" smtClean="0"/>
+          </a:p>
+          <a:p>
+            <a:r>
+              <a:rPr lang="it-IT" dirty="0" smtClean="0"/>
+              <a:t>Ogni </a:t>
+            </a:r>
+            <a:r>
+              <a:rPr lang="it-IT" dirty="0" err="1" smtClean="0"/>
+              <a:t>varibile</a:t>
+            </a:r>
+            <a:r>
+              <a:rPr lang="it-IT" baseline="0" dirty="0" smtClean="0"/>
+              <a:t> presentava tre modalità. La correlazione tra le due </a:t>
+            </a:r>
+            <a:r>
+              <a:rPr lang="it-IT" baseline="0" dirty="0" err="1" smtClean="0"/>
+              <a:t>varibili</a:t>
+            </a:r>
+            <a:r>
+              <a:rPr lang="it-IT" baseline="0" dirty="0" smtClean="0"/>
+              <a:t> risulta essere di 0.88</a:t>
+            </a:r>
+          </a:p>
+          <a:p>
+            <a:r>
+              <a:rPr lang="it-IT" baseline="0" dirty="0" smtClean="0"/>
+              <a:t>Questo perché LODDS è una trasformazione lineare di LNR. </a:t>
+            </a:r>
+          </a:p>
+          <a:p>
+            <a:r>
+              <a:rPr lang="it-IT" baseline="0" dirty="0" smtClean="0"/>
+              <a:t>Secondo il </a:t>
+            </a:r>
+            <a:r>
+              <a:rPr lang="it-IT" baseline="0" dirty="0" err="1" smtClean="0"/>
+              <a:t>paper</a:t>
+            </a:r>
+            <a:r>
+              <a:rPr lang="it-IT" baseline="0" dirty="0" smtClean="0"/>
+              <a:t>:</a:t>
+            </a:r>
+            <a:endParaRPr lang="it-IT" dirty="0"/>
+          </a:p>
+        </p:txBody>
+      </p:sp>
+      <p:sp>
+        <p:nvSpPr>
+          <p:cNvPr id="4" name="Segnaposto numero diapositiva 3"/>
+          <p:cNvSpPr>
+            <a:spLocks noGrp="1"/>
+          </p:cNvSpPr>
+          <p:nvPr>
+            <p:ph type="sldNum" sz="quarter" idx="10"/>
+          </p:nvPr>
+        </p:nvSpPr>
+        <p:spPr/>
+        <p:txBody>
+          <a:bodyPr/>
+          <a:lstStyle/>
+          <a:p>
+            <a:fld id="{BA521C96-A9D3-4B92-95F8-5669AF865DB6}" type="slidenum">
+              <a:rPr lang="it-IT" smtClean="0"/>
+              <a:t>6</a:t>
+            </a:fld>
+            <a:endParaRPr lang="it-IT"/>
+          </a:p>
+        </p:txBody>
+      </p:sp>
+    </p:spTree>
+    <p:extLst>
+      <p:ext uri="{BB962C8B-B14F-4D97-AF65-F5344CB8AC3E}">
+        <p14:creationId xmlns:p14="http://schemas.microsoft.com/office/powerpoint/2010/main" val="3513532468"/>
+      </p:ext>
+    </p:extLst>
+  </p:cSld>
+  <p:clrMapOvr>
+    <a:masterClrMapping/>
+  </p:clrMapOvr>
+</p:notes>
+</file>
+
+<file path=ppt/notesSlides/notesSlide4.xml><?xml version="1.0" encoding="utf-8"?>
+<p:notes xmlns:a="http://schemas.openxmlformats.org/drawingml/2006/main" xmlns:r="http://schemas.openxmlformats.org/officeDocument/2006/relationships" xmlns:p="http://schemas.openxmlformats.org/presentationml/2006/main">
+  <p:cSld>
+    <p:spTree>
+      <p:nvGrpSpPr>
+        <p:cNvPr id="1" name=""/>
+        <p:cNvGrpSpPr/>
+        <p:nvPr/>
+      </p:nvGrpSpPr>
+      <p:grpSpPr>
+        <a:xfrm>
+          <a:off x="0" y="0"/>
+          <a:ext cx="0" cy="0"/>
+          <a:chOff x="0" y="0"/>
+          <a:chExt cx="0" cy="0"/>
+        </a:xfrm>
+      </p:grpSpPr>
+      <p:sp>
+        <p:nvSpPr>
+          <p:cNvPr id="2" name="Segnaposto immagine diapositiva 1"/>
+          <p:cNvSpPr>
+            <a:spLocks noGrp="1" noRot="1" noChangeAspect="1"/>
+          </p:cNvSpPr>
+          <p:nvPr>
+            <p:ph type="sldImg"/>
+          </p:nvPr>
+        </p:nvSpPr>
+        <p:spPr/>
+      </p:sp>
+      <p:sp>
+        <p:nvSpPr>
+          <p:cNvPr id="3" name="Segnaposto note 2"/>
+          <p:cNvSpPr>
+            <a:spLocks noGrp="1"/>
+          </p:cNvSpPr>
+          <p:nvPr>
+            <p:ph type="body" idx="1"/>
+          </p:nvPr>
+        </p:nvSpPr>
+        <p:spPr/>
+        <p:txBody>
+          <a:bodyPr/>
+          <a:lstStyle/>
+          <a:p>
+            <a:r>
+              <a:rPr lang="it-IT" dirty="0" smtClean="0"/>
+              <a:t>Questa</a:t>
+            </a:r>
+            <a:r>
+              <a:rPr lang="it-IT" baseline="0" dirty="0" smtClean="0"/>
+              <a:t> è la funzione di </a:t>
+            </a:r>
+            <a:r>
+              <a:rPr lang="it-IT" baseline="0" dirty="0" err="1" smtClean="0"/>
+              <a:t>sopravvienza</a:t>
+            </a:r>
+            <a:r>
+              <a:rPr lang="it-IT" baseline="0" dirty="0" smtClean="0"/>
+              <a:t> generale.</a:t>
+            </a:r>
+            <a:endParaRPr lang="it-IT" dirty="0"/>
+          </a:p>
+        </p:txBody>
+      </p:sp>
+      <p:sp>
+        <p:nvSpPr>
+          <p:cNvPr id="4" name="Segnaposto numero diapositiva 3"/>
+          <p:cNvSpPr>
+            <a:spLocks noGrp="1"/>
+          </p:cNvSpPr>
+          <p:nvPr>
+            <p:ph type="sldNum" sz="quarter" idx="10"/>
+          </p:nvPr>
+        </p:nvSpPr>
+        <p:spPr/>
+        <p:txBody>
+          <a:bodyPr/>
+          <a:lstStyle/>
+          <a:p>
+            <a:fld id="{BA521C96-A9D3-4B92-95F8-5669AF865DB6}" type="slidenum">
+              <a:rPr lang="it-IT" smtClean="0"/>
+              <a:t>8</a:t>
+            </a:fld>
+            <a:endParaRPr lang="it-IT"/>
+          </a:p>
+        </p:txBody>
+      </p:sp>
+    </p:spTree>
+    <p:extLst>
+      <p:ext uri="{BB962C8B-B14F-4D97-AF65-F5344CB8AC3E}">
+        <p14:creationId xmlns:p14="http://schemas.microsoft.com/office/powerpoint/2010/main" val="3293549807"/>
+      </p:ext>
+    </p:extLst>
+  </p:cSld>
+  <p:clrMapOvr>
+    <a:masterClrMapping/>
+  </p:clrMapOvr>
+</p:notes>
+</file>
+
+<file path=ppt/notesSlides/notesSlide5.xml><?xml version="1.0" encoding="utf-8"?>
+<p:notes xmlns:a="http://schemas.openxmlformats.org/drawingml/2006/main" xmlns:r="http://schemas.openxmlformats.org/officeDocument/2006/relationships" xmlns:p="http://schemas.openxmlformats.org/presentationml/2006/main">
+  <p:cSld>
+    <p:spTree>
+      <p:nvGrpSpPr>
+        <p:cNvPr id="1" name=""/>
+        <p:cNvGrpSpPr/>
+        <p:nvPr/>
+      </p:nvGrpSpPr>
+      <p:grpSpPr>
+        <a:xfrm>
+          <a:off x="0" y="0"/>
+          <a:ext cx="0" cy="0"/>
+          <a:chOff x="0" y="0"/>
+          <a:chExt cx="0" cy="0"/>
+        </a:xfrm>
+      </p:grpSpPr>
+      <p:sp>
+        <p:nvSpPr>
+          <p:cNvPr id="2" name="Segnaposto immagine diapositiva 1"/>
+          <p:cNvSpPr>
+            <a:spLocks noGrp="1" noRot="1" noChangeAspect="1"/>
+          </p:cNvSpPr>
+          <p:nvPr>
+            <p:ph type="sldImg"/>
+          </p:nvPr>
+        </p:nvSpPr>
+        <p:spPr/>
+      </p:sp>
+      <p:sp>
+        <p:nvSpPr>
+          <p:cNvPr id="3" name="Segnaposto note 2"/>
+          <p:cNvSpPr>
+            <a:spLocks noGrp="1"/>
+          </p:cNvSpPr>
+          <p:nvPr>
+            <p:ph type="body" idx="1"/>
+          </p:nvPr>
+        </p:nvSpPr>
+        <p:spPr/>
+        <p:txBody>
+          <a:bodyPr/>
+          <a:lstStyle/>
+          <a:p>
+            <a:pPr marL="0" marR="0" lvl="0" indent="0" algn="l" defTabSz="914400" rtl="0" eaLnBrk="1" fontAlgn="auto" latinLnBrk="0" hangingPunct="1">
+              <a:lnSpc>
+                <a:spcPct val="100000"/>
+              </a:lnSpc>
+              <a:spcBef>
+                <a:spcPts val="0"/>
+              </a:spcBef>
+              <a:spcAft>
+                <a:spcPts val="0"/>
+              </a:spcAft>
+              <a:buClrTx/>
+              <a:buSzTx/>
+              <a:buFontTx/>
+              <a:buNone/>
+              <a:tabLst/>
+              <a:defRPr/>
+            </a:pPr>
+            <a:r>
+              <a:rPr lang="it-IT" dirty="0" smtClean="0"/>
+              <a:t>Questa</a:t>
+            </a:r>
+            <a:r>
+              <a:rPr lang="it-IT" baseline="0" dirty="0" smtClean="0"/>
+              <a:t> è la funzione di </a:t>
+            </a:r>
+            <a:r>
+              <a:rPr lang="it-IT" baseline="0" dirty="0" err="1" smtClean="0"/>
+              <a:t>sopravvienza</a:t>
+            </a:r>
+            <a:r>
+              <a:rPr lang="it-IT" baseline="0" dirty="0" smtClean="0"/>
+              <a:t> per quanto riguarda il </a:t>
+            </a:r>
+            <a:r>
+              <a:rPr lang="it-IT" baseline="0" dirty="0" err="1" smtClean="0"/>
+              <a:t>disease</a:t>
+            </a:r>
+            <a:r>
+              <a:rPr lang="it-IT" baseline="0" dirty="0" smtClean="0"/>
+              <a:t>-free. Ci accorgiamo che sul </a:t>
+            </a:r>
+            <a:r>
+              <a:rPr lang="it-IT" baseline="0" dirty="0" err="1" smtClean="0"/>
+              <a:t>disease</a:t>
+            </a:r>
+            <a:r>
+              <a:rPr lang="it-IT" baseline="0" dirty="0" smtClean="0"/>
+              <a:t> free la gran parte dei pazienti contrae una ricaduta. </a:t>
+            </a:r>
+            <a:br>
+              <a:rPr lang="it-IT" baseline="0" dirty="0" smtClean="0"/>
+            </a:br>
+            <a:r>
+              <a:rPr lang="it-IT" baseline="0" dirty="0" smtClean="0"/>
+              <a:t>Inoltre il numero dei censurati è molto minore in questo caso.</a:t>
+            </a:r>
+            <a:endParaRPr lang="it-IT" dirty="0" smtClean="0"/>
+          </a:p>
+          <a:p>
+            <a:endParaRPr lang="it-IT" dirty="0"/>
+          </a:p>
+        </p:txBody>
+      </p:sp>
+      <p:sp>
+        <p:nvSpPr>
+          <p:cNvPr id="4" name="Segnaposto numero diapositiva 3"/>
+          <p:cNvSpPr>
+            <a:spLocks noGrp="1"/>
+          </p:cNvSpPr>
+          <p:nvPr>
+            <p:ph type="sldNum" sz="quarter" idx="10"/>
+          </p:nvPr>
+        </p:nvSpPr>
+        <p:spPr/>
+        <p:txBody>
+          <a:bodyPr/>
+          <a:lstStyle/>
+          <a:p>
+            <a:fld id="{BA521C96-A9D3-4B92-95F8-5669AF865DB6}" type="slidenum">
+              <a:rPr lang="it-IT" smtClean="0"/>
+              <a:t>9</a:t>
+            </a:fld>
+            <a:endParaRPr lang="it-IT"/>
+          </a:p>
+        </p:txBody>
+      </p:sp>
+    </p:spTree>
+    <p:extLst>
+      <p:ext uri="{BB962C8B-B14F-4D97-AF65-F5344CB8AC3E}">
+        <p14:creationId xmlns:p14="http://schemas.microsoft.com/office/powerpoint/2010/main" val="446564736"/>
+      </p:ext>
+    </p:extLst>
+  </p:cSld>
+  <p:clrMapOvr>
+    <a:masterClrMapping/>
+  </p:clrMapOvr>
+</p:notes>
+</file>
+
+<file path=ppt/notesSlides/notesSlide6.xml><?xml version="1.0" encoding="utf-8"?>
+<p:notes xmlns:a="http://schemas.openxmlformats.org/drawingml/2006/main" xmlns:r="http://schemas.openxmlformats.org/officeDocument/2006/relationships" xmlns:p="http://schemas.openxmlformats.org/presentationml/2006/main">
+  <p:cSld>
+    <p:spTree>
+      <p:nvGrpSpPr>
+        <p:cNvPr id="1" name=""/>
+        <p:cNvGrpSpPr/>
+        <p:nvPr/>
+      </p:nvGrpSpPr>
+      <p:grpSpPr>
+        <a:xfrm>
+          <a:off x="0" y="0"/>
+          <a:ext cx="0" cy="0"/>
+          <a:chOff x="0" y="0"/>
+          <a:chExt cx="0" cy="0"/>
+        </a:xfrm>
+      </p:grpSpPr>
+      <p:sp>
+        <p:nvSpPr>
+          <p:cNvPr id="2" name="Segnaposto immagine diapositiva 1"/>
+          <p:cNvSpPr>
+            <a:spLocks noGrp="1" noRot="1" noChangeAspect="1"/>
+          </p:cNvSpPr>
+          <p:nvPr>
+            <p:ph type="sldImg"/>
+          </p:nvPr>
+        </p:nvSpPr>
+        <p:spPr/>
+      </p:sp>
+      <p:sp>
+        <p:nvSpPr>
+          <p:cNvPr id="3" name="Segnaposto note 2"/>
+          <p:cNvSpPr>
+            <a:spLocks noGrp="1"/>
+          </p:cNvSpPr>
+          <p:nvPr>
+            <p:ph type="body" idx="1"/>
+          </p:nvPr>
+        </p:nvSpPr>
+        <p:spPr/>
+        <p:txBody>
+          <a:bodyPr/>
+          <a:lstStyle/>
+          <a:p>
+            <a:endParaRPr lang="it-IT" dirty="0"/>
+          </a:p>
+        </p:txBody>
+      </p:sp>
+      <p:sp>
+        <p:nvSpPr>
+          <p:cNvPr id="4" name="Segnaposto numero diapositiva 3"/>
+          <p:cNvSpPr>
+            <a:spLocks noGrp="1"/>
+          </p:cNvSpPr>
+          <p:nvPr>
+            <p:ph type="sldNum" sz="quarter" idx="10"/>
+          </p:nvPr>
+        </p:nvSpPr>
+        <p:spPr/>
+        <p:txBody>
+          <a:bodyPr/>
+          <a:lstStyle/>
+          <a:p>
+            <a:fld id="{BA521C96-A9D3-4B92-95F8-5669AF865DB6}" type="slidenum">
+              <a:rPr lang="it-IT" smtClean="0"/>
+              <a:t>10</a:t>
+            </a:fld>
+            <a:endParaRPr lang="it-IT"/>
+          </a:p>
+        </p:txBody>
+      </p:sp>
+    </p:spTree>
+    <p:extLst>
+      <p:ext uri="{BB962C8B-B14F-4D97-AF65-F5344CB8AC3E}">
+        <p14:creationId xmlns:p14="http://schemas.microsoft.com/office/powerpoint/2010/main" val="3407056482"/>
+      </p:ext>
+    </p:extLst>
+  </p:cSld>
+  <p:clrMapOvr>
+    <a:masterClrMapping/>
+  </p:clrMapOvr>
+</p:notes>
+</file>
+
+<file path=ppt/notesSlides/notesSlide7.xml><?xml version="1.0" encoding="utf-8"?>
+<p:notes xmlns:a="http://schemas.openxmlformats.org/drawingml/2006/main" xmlns:r="http://schemas.openxmlformats.org/officeDocument/2006/relationships" xmlns:p="http://schemas.openxmlformats.org/presentationml/2006/main">
+  <p:cSld>
+    <p:spTree>
+      <p:nvGrpSpPr>
+        <p:cNvPr id="1" name=""/>
+        <p:cNvGrpSpPr/>
+        <p:nvPr/>
+      </p:nvGrpSpPr>
+      <p:grpSpPr>
+        <a:xfrm>
+          <a:off x="0" y="0"/>
+          <a:ext cx="0" cy="0"/>
+          <a:chOff x="0" y="0"/>
+          <a:chExt cx="0" cy="0"/>
+        </a:xfrm>
+      </p:grpSpPr>
+      <p:sp>
+        <p:nvSpPr>
+          <p:cNvPr id="2" name="Segnaposto immagine diapositiva 1"/>
+          <p:cNvSpPr>
+            <a:spLocks noGrp="1" noRot="1" noChangeAspect="1"/>
+          </p:cNvSpPr>
+          <p:nvPr>
+            <p:ph type="sldImg"/>
+          </p:nvPr>
+        </p:nvSpPr>
+        <p:spPr/>
+      </p:sp>
+      <p:sp>
+        <p:nvSpPr>
+          <p:cNvPr id="3" name="Segnaposto note 2"/>
+          <p:cNvSpPr>
+            <a:spLocks noGrp="1"/>
+          </p:cNvSpPr>
+          <p:nvPr>
+            <p:ph type="body" idx="1"/>
+          </p:nvPr>
+        </p:nvSpPr>
+        <p:spPr/>
+        <p:txBody>
+          <a:bodyPr/>
+          <a:lstStyle/>
+          <a:p>
+            <a:r>
+              <a:rPr lang="it-IT" dirty="0" smtClean="0"/>
+              <a:t>Questa è</a:t>
+            </a:r>
+            <a:r>
+              <a:rPr lang="it-IT" baseline="0" dirty="0" smtClean="0"/>
+              <a:t> la curva di </a:t>
+            </a:r>
+            <a:r>
+              <a:rPr lang="it-IT" baseline="0" dirty="0" err="1" smtClean="0"/>
+              <a:t>sopravvienza</a:t>
+            </a:r>
+            <a:r>
+              <a:rPr lang="it-IT" baseline="0" dirty="0" smtClean="0"/>
+              <a:t> per LNR come </a:t>
+            </a:r>
+            <a:r>
+              <a:rPr lang="it-IT" baseline="0" dirty="0" err="1" smtClean="0"/>
+              <a:t>covariata</a:t>
+            </a:r>
+            <a:r>
+              <a:rPr lang="it-IT" baseline="0" dirty="0" smtClean="0"/>
+              <a:t>. </a:t>
+            </a:r>
+            <a:br>
+              <a:rPr lang="it-IT" baseline="0" dirty="0" smtClean="0"/>
+            </a:br>
+            <a:r>
+              <a:rPr lang="it-IT" baseline="0" dirty="0" smtClean="0"/>
+              <a:t>Da questo è possibile notare che:</a:t>
+            </a:r>
+          </a:p>
+          <a:p>
+            <a:pPr marL="171450" indent="-171450">
+              <a:buFont typeface="Arial" panose="020B0604020202020204" pitchFamily="34" charset="0"/>
+              <a:buChar char="•"/>
+            </a:pPr>
+            <a:r>
+              <a:rPr lang="it-IT" baseline="0" dirty="0" smtClean="0"/>
+              <a:t>I soggetti allo stadio 2 rendono a morire più rapidamente rispetto a quelli dei restanti due gruppi</a:t>
+            </a:r>
+          </a:p>
+          <a:p>
+            <a:pPr marL="171450" indent="-171450">
+              <a:buFont typeface="Arial" panose="020B0604020202020204" pitchFamily="34" charset="0"/>
+              <a:buChar char="•"/>
+            </a:pPr>
+            <a:r>
+              <a:rPr lang="it-IT" baseline="0" dirty="0" smtClean="0"/>
+              <a:t>I soggetti allo stadio 0 e 1 non sono significativamente differenti. Lo si vede chiaramente dagli intervalli di confidenza. Lo si nota anche dal modello di </a:t>
+            </a:r>
+            <a:r>
+              <a:rPr lang="it-IT" baseline="0" dirty="0" err="1" smtClean="0"/>
+              <a:t>Cox</a:t>
+            </a:r>
+            <a:r>
+              <a:rPr lang="it-IT" baseline="0" dirty="0" smtClean="0"/>
+              <a:t> </a:t>
+            </a:r>
+            <a:r>
+              <a:rPr lang="it-IT" baseline="0" dirty="0" err="1" smtClean="0"/>
+              <a:t>univariato</a:t>
+            </a:r>
+            <a:r>
+              <a:rPr lang="it-IT" baseline="0" dirty="0" smtClean="0"/>
+              <a:t>, che analizzeremo successivamente. </a:t>
+            </a:r>
+          </a:p>
+          <a:p>
+            <a:pPr marL="0" indent="0">
+              <a:buFont typeface="Arial" panose="020B0604020202020204" pitchFamily="34" charset="0"/>
+              <a:buNone/>
+            </a:pPr>
+            <a:endParaRPr lang="it-IT" baseline="0" dirty="0" smtClean="0"/>
+          </a:p>
+          <a:p>
+            <a:pPr marL="0" marR="0" lvl="0" indent="0" algn="l" defTabSz="914400" rtl="0" eaLnBrk="1" fontAlgn="auto" latinLnBrk="0" hangingPunct="1">
+              <a:lnSpc>
+                <a:spcPct val="100000"/>
+              </a:lnSpc>
+              <a:spcBef>
+                <a:spcPts val="0"/>
+              </a:spcBef>
+              <a:spcAft>
+                <a:spcPts val="0"/>
+              </a:spcAft>
+              <a:buClrTx/>
+              <a:buSzTx/>
+              <a:buFont typeface="Arial" panose="020B0604020202020204" pitchFamily="34" charset="0"/>
+              <a:buNone/>
+              <a:tabLst/>
+              <a:defRPr/>
+            </a:pPr>
+            <a:r>
+              <a:rPr lang="it-IT" baseline="0" dirty="0" smtClean="0"/>
+              <a:t>Rifiutiamo l’ipotesi di uguaglianza tra le curve di sopravvivenza.</a:t>
+            </a:r>
+            <a:endParaRPr lang="it-IT" baseline="0" dirty="0" smtClean="0"/>
+          </a:p>
+          <a:p>
+            <a:pPr marL="0" indent="0">
+              <a:buFont typeface="Arial" panose="020B0604020202020204" pitchFamily="34" charset="0"/>
+              <a:buNone/>
+            </a:pPr>
+            <a:r>
+              <a:rPr lang="it-IT" dirty="0" smtClean="0"/>
+              <a:t>Log </a:t>
+            </a:r>
+            <a:r>
+              <a:rPr lang="it-IT" dirty="0" err="1" smtClean="0"/>
+              <a:t>Rank</a:t>
+            </a:r>
+            <a:r>
+              <a:rPr lang="it-IT" dirty="0" smtClean="0"/>
+              <a:t> </a:t>
+            </a:r>
+            <a:r>
+              <a:rPr lang="it-IT" dirty="0" err="1" smtClean="0"/>
+              <a:t>Tests</a:t>
+            </a:r>
+            <a:r>
+              <a:rPr lang="it-IT" dirty="0" smtClean="0"/>
+              <a:t>: </a:t>
+            </a:r>
+            <a:r>
+              <a:rPr lang="it-IT" dirty="0" err="1" smtClean="0"/>
+              <a:t>p.value</a:t>
+            </a:r>
+            <a:r>
+              <a:rPr lang="it-IT" baseline="0" dirty="0" smtClean="0"/>
+              <a:t> = </a:t>
+            </a:r>
+            <a:r>
+              <a:rPr lang="it-IT" dirty="0" smtClean="0"/>
+              <a:t>6.48e-06</a:t>
+            </a:r>
+            <a:endParaRPr lang="it-IT" baseline="0" dirty="0" smtClean="0"/>
+          </a:p>
+          <a:p>
+            <a:pPr marL="0" indent="0">
+              <a:buFont typeface="Arial" panose="020B0604020202020204" pitchFamily="34" charset="0"/>
+              <a:buNone/>
+            </a:pPr>
+            <a:endParaRPr lang="it-IT" dirty="0"/>
+          </a:p>
+        </p:txBody>
+      </p:sp>
+      <p:sp>
+        <p:nvSpPr>
+          <p:cNvPr id="4" name="Segnaposto numero diapositiva 3"/>
+          <p:cNvSpPr>
+            <a:spLocks noGrp="1"/>
+          </p:cNvSpPr>
+          <p:nvPr>
+            <p:ph type="sldNum" sz="quarter" idx="10"/>
+          </p:nvPr>
+        </p:nvSpPr>
+        <p:spPr/>
+        <p:txBody>
+          <a:bodyPr/>
+          <a:lstStyle/>
+          <a:p>
+            <a:fld id="{BA521C96-A9D3-4B92-95F8-5669AF865DB6}" type="slidenum">
+              <a:rPr lang="it-IT" smtClean="0"/>
+              <a:t>11</a:t>
+            </a:fld>
+            <a:endParaRPr lang="it-IT"/>
+          </a:p>
+        </p:txBody>
+      </p:sp>
+    </p:spTree>
+    <p:extLst>
+      <p:ext uri="{BB962C8B-B14F-4D97-AF65-F5344CB8AC3E}">
+        <p14:creationId xmlns:p14="http://schemas.microsoft.com/office/powerpoint/2010/main" val="2304519608"/>
+      </p:ext>
+    </p:extLst>
+  </p:cSld>
+  <p:clrMapOvr>
+    <a:masterClrMapping/>
+  </p:clrMapOvr>
+</p:notes>
+</file>
+
+<file path=ppt/notesSlides/notesSlide8.xml><?xml version="1.0" encoding="utf-8"?>
+<p:notes xmlns:a="http://schemas.openxmlformats.org/drawingml/2006/main" xmlns:r="http://schemas.openxmlformats.org/officeDocument/2006/relationships" xmlns:p="http://schemas.openxmlformats.org/presentationml/2006/main">
+  <p:cSld>
+    <p:spTree>
+      <p:nvGrpSpPr>
+        <p:cNvPr id="1" name=""/>
+        <p:cNvGrpSpPr/>
+        <p:nvPr/>
+      </p:nvGrpSpPr>
+      <p:grpSpPr>
+        <a:xfrm>
+          <a:off x="0" y="0"/>
+          <a:ext cx="0" cy="0"/>
+          <a:chOff x="0" y="0"/>
+          <a:chExt cx="0" cy="0"/>
+        </a:xfrm>
+      </p:grpSpPr>
+      <p:sp>
+        <p:nvSpPr>
+          <p:cNvPr id="2" name="Segnaposto immagine diapositiva 1"/>
+          <p:cNvSpPr>
+            <a:spLocks noGrp="1" noRot="1" noChangeAspect="1"/>
+          </p:cNvSpPr>
+          <p:nvPr>
+            <p:ph type="sldImg"/>
+          </p:nvPr>
+        </p:nvSpPr>
+        <p:spPr/>
+      </p:sp>
+      <p:sp>
+        <p:nvSpPr>
+          <p:cNvPr id="3" name="Segnaposto note 2"/>
+          <p:cNvSpPr>
+            <a:spLocks noGrp="1"/>
+          </p:cNvSpPr>
+          <p:nvPr>
+            <p:ph type="body" idx="1"/>
+          </p:nvPr>
+        </p:nvSpPr>
+        <p:spPr/>
+        <p:txBody>
+          <a:bodyPr/>
+          <a:lstStyle/>
+          <a:p>
+            <a:r>
+              <a:rPr lang="it-IT" dirty="0" smtClean="0"/>
+              <a:t>Analogamente</a:t>
+            </a:r>
+            <a:r>
+              <a:rPr lang="it-IT" baseline="0" dirty="0" smtClean="0"/>
+              <a:t> a quella per LNR anche in quella di LODDS troviamo che:</a:t>
+            </a:r>
+          </a:p>
+          <a:p>
+            <a:pPr marL="171450" indent="-171450">
+              <a:buFont typeface="Arial" panose="020B0604020202020204" pitchFamily="34" charset="0"/>
+              <a:buChar char="•"/>
+            </a:pPr>
+            <a:r>
+              <a:rPr lang="it-IT" baseline="0" dirty="0" smtClean="0"/>
+              <a:t>I soggetti allo stadio 2 rendono a morire più rapidamente rispetto a quelli dei restanti due gruppi</a:t>
+            </a:r>
+          </a:p>
+          <a:p>
+            <a:pPr marL="171450" indent="-171450">
+              <a:buFont typeface="Arial" panose="020B0604020202020204" pitchFamily="34" charset="0"/>
+              <a:buChar char="•"/>
+            </a:pPr>
+            <a:r>
+              <a:rPr lang="it-IT" baseline="0" dirty="0" smtClean="0"/>
+              <a:t>I soggetti allo stadio 0 e 1 non sono significativamente differenti. Questo non lo si nota bene negli intervalli di confidenza. Nel modello di </a:t>
+            </a:r>
+            <a:r>
+              <a:rPr lang="it-IT" baseline="0" dirty="0" err="1" smtClean="0"/>
+              <a:t>Cox</a:t>
+            </a:r>
+            <a:r>
+              <a:rPr lang="it-IT" baseline="0" dirty="0" smtClean="0"/>
+              <a:t> </a:t>
+            </a:r>
+            <a:r>
+              <a:rPr lang="it-IT" baseline="0" dirty="0" err="1" smtClean="0"/>
+              <a:t>univariato</a:t>
+            </a:r>
+            <a:r>
+              <a:rPr lang="it-IT" baseline="0" dirty="0" smtClean="0"/>
+              <a:t>, però, il coefficiente relativo alla classe 1 risulta non significativo.</a:t>
+            </a:r>
+          </a:p>
+          <a:p>
+            <a:pPr marL="171450" indent="-171450">
+              <a:buFont typeface="Arial" panose="020B0604020202020204" pitchFamily="34" charset="0"/>
+              <a:buChar char="•"/>
+            </a:pPr>
+            <a:endParaRPr lang="it-IT" baseline="0" dirty="0"/>
+          </a:p>
+          <a:p>
+            <a:pPr marL="0" indent="0">
+              <a:buFont typeface="Arial" panose="020B0604020202020204" pitchFamily="34" charset="0"/>
+              <a:buNone/>
+            </a:pPr>
+            <a:r>
+              <a:rPr lang="it-IT" baseline="0" dirty="0" smtClean="0"/>
+              <a:t>Rifiutiamo l’ipotesi di uguaglianza tra le curve di sopravvivenza.</a:t>
+            </a:r>
+            <a:endParaRPr lang="it-IT" baseline="0" dirty="0"/>
+          </a:p>
+          <a:p>
+            <a:pPr marL="0" indent="0">
+              <a:buFont typeface="Arial" panose="020B0604020202020204" pitchFamily="34" charset="0"/>
+              <a:buNone/>
+            </a:pPr>
+            <a:r>
+              <a:rPr lang="it-IT" baseline="0" dirty="0" smtClean="0"/>
+              <a:t>Log </a:t>
+            </a:r>
+            <a:r>
+              <a:rPr lang="it-IT" baseline="0" dirty="0" err="1" smtClean="0"/>
+              <a:t>Rank</a:t>
+            </a:r>
+            <a:r>
+              <a:rPr lang="it-IT" baseline="0" dirty="0" smtClean="0"/>
+              <a:t> Test: </a:t>
+            </a:r>
+            <a:r>
+              <a:rPr lang="it-IT" baseline="0" dirty="0" err="1" smtClean="0"/>
+              <a:t>p.value</a:t>
+            </a:r>
+            <a:r>
+              <a:rPr lang="it-IT" baseline="0" dirty="0" smtClean="0"/>
+              <a:t> = </a:t>
+            </a:r>
+            <a:r>
+              <a:rPr lang="it-IT" dirty="0" smtClean="0"/>
+              <a:t>8.75e-07 </a:t>
+            </a:r>
+            <a:endParaRPr lang="it-IT" baseline="0" dirty="0" smtClean="0"/>
+          </a:p>
+        </p:txBody>
+      </p:sp>
+      <p:sp>
+        <p:nvSpPr>
+          <p:cNvPr id="4" name="Segnaposto numero diapositiva 3"/>
+          <p:cNvSpPr>
+            <a:spLocks noGrp="1"/>
+          </p:cNvSpPr>
+          <p:nvPr>
+            <p:ph type="sldNum" sz="quarter" idx="10"/>
+          </p:nvPr>
+        </p:nvSpPr>
+        <p:spPr/>
+        <p:txBody>
+          <a:bodyPr/>
+          <a:lstStyle/>
+          <a:p>
+            <a:fld id="{BA521C96-A9D3-4B92-95F8-5669AF865DB6}" type="slidenum">
+              <a:rPr lang="it-IT" smtClean="0"/>
+              <a:t>12</a:t>
+            </a:fld>
+            <a:endParaRPr lang="it-IT"/>
+          </a:p>
+        </p:txBody>
+      </p:sp>
+    </p:spTree>
+    <p:extLst>
+      <p:ext uri="{BB962C8B-B14F-4D97-AF65-F5344CB8AC3E}">
+        <p14:creationId xmlns:p14="http://schemas.microsoft.com/office/powerpoint/2010/main" val="3075789732"/>
+      </p:ext>
+    </p:extLst>
+  </p:cSld>
+  <p:clrMapOvr>
+    <a:masterClrMapping/>
+  </p:clrMapOvr>
+</p:notes>
+</file>
+
+<file path=ppt/notesSlides/notesSlide9.xml><?xml version="1.0" encoding="utf-8"?>
+<p:notes xmlns:a="http://schemas.openxmlformats.org/drawingml/2006/main" xmlns:r="http://schemas.openxmlformats.org/officeDocument/2006/relationships" xmlns:p="http://schemas.openxmlformats.org/presentationml/2006/main">
+  <p:cSld>
+    <p:spTree>
+      <p:nvGrpSpPr>
+        <p:cNvPr id="1" name=""/>
+        <p:cNvGrpSpPr/>
+        <p:nvPr/>
+      </p:nvGrpSpPr>
+      <p:grpSpPr>
+        <a:xfrm>
+          <a:off x="0" y="0"/>
+          <a:ext cx="0" cy="0"/>
+          <a:chOff x="0" y="0"/>
+          <a:chExt cx="0" cy="0"/>
+        </a:xfrm>
+      </p:grpSpPr>
+      <p:sp>
+        <p:nvSpPr>
+          <p:cNvPr id="2" name="Segnaposto immagine diapositiva 1"/>
+          <p:cNvSpPr>
+            <a:spLocks noGrp="1" noRot="1" noChangeAspect="1"/>
+          </p:cNvSpPr>
+          <p:nvPr>
+            <p:ph type="sldImg"/>
+          </p:nvPr>
+        </p:nvSpPr>
+        <p:spPr/>
+      </p:sp>
+      <p:sp>
+        <p:nvSpPr>
+          <p:cNvPr id="3" name="Segnaposto note 2"/>
+          <p:cNvSpPr>
+            <a:spLocks noGrp="1"/>
+          </p:cNvSpPr>
+          <p:nvPr>
+            <p:ph type="body" idx="1"/>
+          </p:nvPr>
+        </p:nvSpPr>
+        <p:spPr/>
+        <p:txBody>
+          <a:bodyPr/>
+          <a:lstStyle/>
+          <a:p>
+            <a:r>
+              <a:rPr lang="nn-NO" sz="1200" b="0" i="0" u="none" strike="noStrike" kern="1200" baseline="0" dirty="0" smtClean="0">
+                <a:solidFill>
+                  <a:schemeClr val="tx1"/>
+                </a:solidFill>
+                <a:latin typeface="+mn-lt"/>
+                <a:ea typeface="+mn-ea"/>
+                <a:cs typeface="+mn-cs"/>
+              </a:rPr>
+              <a:t>Dallo studio condotto da N. C. Arslan, S. Sokmen vediamo che le curve di sopravvienza per LODDS sono compatibili (le nostre a destra).</a:t>
+            </a:r>
+            <a:endParaRPr lang="it-IT" dirty="0"/>
+          </a:p>
+        </p:txBody>
+      </p:sp>
+      <p:sp>
+        <p:nvSpPr>
+          <p:cNvPr id="4" name="Segnaposto numero diapositiva 3"/>
+          <p:cNvSpPr>
+            <a:spLocks noGrp="1"/>
+          </p:cNvSpPr>
+          <p:nvPr>
+            <p:ph type="sldNum" sz="quarter" idx="10"/>
+          </p:nvPr>
+        </p:nvSpPr>
+        <p:spPr/>
+        <p:txBody>
+          <a:bodyPr/>
+          <a:lstStyle/>
+          <a:p>
+            <a:fld id="{BA521C96-A9D3-4B92-95F8-5669AF865DB6}" type="slidenum">
+              <a:rPr lang="it-IT" smtClean="0"/>
+              <a:t>13</a:t>
+            </a:fld>
+            <a:endParaRPr lang="it-IT"/>
+          </a:p>
+        </p:txBody>
+      </p:sp>
+    </p:spTree>
+    <p:extLst>
+      <p:ext uri="{BB962C8B-B14F-4D97-AF65-F5344CB8AC3E}">
+        <p14:creationId xmlns:p14="http://schemas.microsoft.com/office/powerpoint/2010/main" val="95015995"/>
       </p:ext>
     </p:extLst>
   </p:cSld>
@@ -4473,8 +5976,227 @@
         </p:blipFill>
         <p:spPr>
           <a:xfrm>
-            <a:off x="5275556" y="236679"/>
+            <a:off x="3936949" y="166890"/>
             <a:ext cx="1707389" cy="1698852"/>
+          </a:xfrm>
+          <a:prstGeom prst="rect">
+            <a:avLst/>
+          </a:prstGeom>
+        </p:spPr>
+      </p:pic>
+      <p:sp>
+        <p:nvSpPr>
+          <p:cNvPr id="4" name="CasellaDiTesto 3"/>
+          <p:cNvSpPr txBox="1"/>
+          <p:nvPr/>
+        </p:nvSpPr>
+        <p:spPr>
+          <a:xfrm>
+            <a:off x="5901180" y="323818"/>
+            <a:ext cx="4114172" cy="1815882"/>
+          </a:xfrm>
+          <a:prstGeom prst="rect">
+            <a:avLst/>
+          </a:prstGeom>
+          <a:noFill/>
+        </p:spPr>
+        <p:txBody>
+          <a:bodyPr wrap="square" rtlCol="0">
+            <a:spAutoFit/>
+          </a:bodyPr>
+          <a:lstStyle/>
+          <a:p>
+            <a:r>
+              <a:rPr lang="it-IT" sz="2800" dirty="0" smtClean="0">
+                <a:solidFill>
+                  <a:srgbClr val="FF0000"/>
+                </a:solidFill>
+                <a:latin typeface="Comic Sans MS" panose="030F0702030302020204" pitchFamily="66" charset="0"/>
+              </a:rPr>
+              <a:t>Alma Mater </a:t>
+            </a:r>
+          </a:p>
+          <a:p>
+            <a:r>
+              <a:rPr lang="it-IT" sz="2800" dirty="0" err="1" smtClean="0">
+                <a:solidFill>
+                  <a:srgbClr val="FF0000"/>
+                </a:solidFill>
+                <a:latin typeface="Comic Sans MS" panose="030F0702030302020204" pitchFamily="66" charset="0"/>
+              </a:rPr>
+              <a:t>Studiorum</a:t>
+            </a:r>
+            <a:r>
+              <a:rPr lang="it-IT" sz="2800" dirty="0" smtClean="0">
+                <a:solidFill>
+                  <a:srgbClr val="FF0000"/>
+                </a:solidFill>
+                <a:latin typeface="Comic Sans MS" panose="030F0702030302020204" pitchFamily="66" charset="0"/>
+              </a:rPr>
+              <a:t> </a:t>
+            </a:r>
+            <a:r>
+              <a:rPr lang="it-IT" sz="2800" dirty="0" err="1" smtClean="0">
+                <a:solidFill>
+                  <a:srgbClr val="FF0000"/>
+                </a:solidFill>
+                <a:latin typeface="Comic Sans MS" panose="030F0702030302020204" pitchFamily="66" charset="0"/>
+              </a:rPr>
+              <a:t>Universitàdi</a:t>
+            </a:r>
+            <a:r>
+              <a:rPr lang="it-IT" sz="2800" dirty="0" smtClean="0">
+                <a:solidFill>
+                  <a:srgbClr val="FF0000"/>
+                </a:solidFill>
+                <a:latin typeface="Comic Sans MS" panose="030F0702030302020204" pitchFamily="66" charset="0"/>
+              </a:rPr>
+              <a:t> </a:t>
+            </a:r>
+            <a:r>
+              <a:rPr lang="it-IT" sz="2800" dirty="0" err="1" smtClean="0">
+                <a:solidFill>
+                  <a:srgbClr val="FF0000"/>
+                </a:solidFill>
+                <a:latin typeface="Comic Sans MS" panose="030F0702030302020204" pitchFamily="66" charset="0"/>
+              </a:rPr>
+              <a:t>Bologa</a:t>
+            </a:r>
+            <a:r>
+              <a:rPr lang="it-IT" sz="2800" dirty="0" smtClean="0">
+                <a:solidFill>
+                  <a:srgbClr val="FF0000"/>
+                </a:solidFill>
+                <a:latin typeface="Comic Sans MS" panose="030F0702030302020204" pitchFamily="66" charset="0"/>
+              </a:rPr>
+              <a:t> AD </a:t>
+            </a:r>
+          </a:p>
+          <a:p>
+            <a:r>
+              <a:rPr lang="it-IT" sz="2800" dirty="0" smtClean="0">
+                <a:solidFill>
+                  <a:srgbClr val="FF0000"/>
+                </a:solidFill>
+                <a:latin typeface="Comic Sans MS" panose="030F0702030302020204" pitchFamily="66" charset="0"/>
+              </a:rPr>
+              <a:t>10888</a:t>
+            </a:r>
+            <a:endParaRPr lang="it-IT" sz="2800" dirty="0">
+              <a:solidFill>
+                <a:srgbClr val="FF0000"/>
+              </a:solidFill>
+              <a:latin typeface="Comic Sans MS" panose="030F0702030302020204" pitchFamily="66" charset="0"/>
+            </a:endParaRPr>
+          </a:p>
+        </p:txBody>
+      </p:sp>
+    </p:spTree>
+    <p:extLst>
+      <p:ext uri="{BB962C8B-B14F-4D97-AF65-F5344CB8AC3E}">
+        <p14:creationId xmlns:p14="http://schemas.microsoft.com/office/powerpoint/2010/main" val="3348442330"/>
+      </p:ext>
+    </p:extLst>
+  </p:cSld>
+  <p:clrMapOvr>
+    <a:masterClrMapping/>
+  </p:clrMapOvr>
+  <p:timing>
+    <p:tnLst>
+      <p:par>
+        <p:cTn id="1" dur="indefinite" restart="never" nodeType="tmRoot"/>
+      </p:par>
+    </p:tnLst>
+  </p:timing>
+</p:sld>
+</file>
+
+<file path=ppt/slides/slide10.xml><?xml version="1.0" encoding="utf-8"?>
+<p:sld xmlns:a="http://schemas.openxmlformats.org/drawingml/2006/main" xmlns:r="http://schemas.openxmlformats.org/officeDocument/2006/relationships" xmlns:p="http://schemas.openxmlformats.org/presentationml/2006/main">
+  <p:cSld>
+    <p:spTree>
+      <p:nvGrpSpPr>
+        <p:cNvPr id="1" name=""/>
+        <p:cNvGrpSpPr/>
+        <p:nvPr/>
+      </p:nvGrpSpPr>
+      <p:grpSpPr>
+        <a:xfrm>
+          <a:off x="0" y="0"/>
+          <a:ext cx="0" cy="0"/>
+          <a:chOff x="0" y="0"/>
+          <a:chExt cx="0" cy="0"/>
+        </a:xfrm>
+      </p:grpSpPr>
+      <p:sp>
+        <p:nvSpPr>
+          <p:cNvPr id="2" name="Titolo 1"/>
+          <p:cNvSpPr>
+            <a:spLocks noGrp="1"/>
+          </p:cNvSpPr>
+          <p:nvPr>
+            <p:ph type="title"/>
+          </p:nvPr>
+        </p:nvSpPr>
+        <p:spPr/>
+        <p:txBody>
+          <a:bodyPr/>
+          <a:lstStyle/>
+          <a:p>
+            <a:r>
+              <a:rPr lang="it-IT" dirty="0" smtClean="0"/>
+              <a:t>Confronto funzioni cumulative di rischio</a:t>
+            </a:r>
+            <a:endParaRPr lang="it-IT" dirty="0"/>
+          </a:p>
+        </p:txBody>
+      </p:sp>
+      <p:pic>
+        <p:nvPicPr>
+          <p:cNvPr id="5" name="Segnaposto contenuto 4"/>
+          <p:cNvPicPr>
+            <a:picLocks noGrp="1" noChangeAspect="1"/>
+          </p:cNvPicPr>
+          <p:nvPr>
+            <p:ph sz="half" idx="1"/>
+          </p:nvPr>
+        </p:nvPicPr>
+        <p:blipFill>
+          <a:blip r:embed="rId3"/>
+          <a:stretch>
+            <a:fillRect/>
+          </a:stretch>
+        </p:blipFill>
+        <p:spPr>
+          <a:xfrm>
+            <a:off x="1097280" y="1846262"/>
+            <a:ext cx="4900671" cy="4450365"/>
+          </a:xfrm>
+          <a:prstGeom prst="rect">
+            <a:avLst/>
+          </a:prstGeom>
+        </p:spPr>
+      </p:pic>
+      <p:pic>
+        <p:nvPicPr>
+          <p:cNvPr id="6" name="Segnaposto contenuto 5"/>
+          <p:cNvPicPr>
+            <a:picLocks noGrp="1" noChangeAspect="1"/>
+          </p:cNvPicPr>
+          <p:nvPr>
+            <p:ph sz="half" idx="2"/>
+          </p:nvPr>
+        </p:nvPicPr>
+        <p:blipFill>
+          <a:blip r:embed="rId4"/>
+          <a:stretch>
+            <a:fillRect/>
+          </a:stretch>
+        </p:blipFill>
+        <p:spPr>
+          <a:xfrm>
+            <a:off x="6255009" y="1846263"/>
+            <a:ext cx="4900671" cy="4450365"/>
           </a:xfrm>
           <a:prstGeom prst="rect">
             <a:avLst/>
@@ -4484,7 +6206,589 @@
     </p:spTree>
     <p:extLst>
       <p:ext uri="{BB962C8B-B14F-4D97-AF65-F5344CB8AC3E}">
-        <p14:creationId xmlns:p14="http://schemas.microsoft.com/office/powerpoint/2010/main" val="3348442330"/>
+        <p14:creationId xmlns:p14="http://schemas.microsoft.com/office/powerpoint/2010/main" val="239332255"/>
+      </p:ext>
+    </p:extLst>
+  </p:cSld>
+  <p:clrMapOvr>
+    <a:masterClrMapping/>
+  </p:clrMapOvr>
+</p:sld>
+</file>
+
+<file path=ppt/slides/slide11.xml><?xml version="1.0" encoding="utf-8"?>
+<p:sld xmlns:a="http://schemas.openxmlformats.org/drawingml/2006/main" xmlns:r="http://schemas.openxmlformats.org/officeDocument/2006/relationships" xmlns:p="http://schemas.openxmlformats.org/presentationml/2006/main">
+  <p:cSld>
+    <p:spTree>
+      <p:nvGrpSpPr>
+        <p:cNvPr id="1" name=""/>
+        <p:cNvGrpSpPr/>
+        <p:nvPr/>
+      </p:nvGrpSpPr>
+      <p:grpSpPr>
+        <a:xfrm>
+          <a:off x="0" y="0"/>
+          <a:ext cx="0" cy="0"/>
+          <a:chOff x="0" y="0"/>
+          <a:chExt cx="0" cy="0"/>
+        </a:xfrm>
+      </p:grpSpPr>
+      <p:pic>
+        <p:nvPicPr>
+          <p:cNvPr id="4" name="Immagine 3"/>
+          <p:cNvPicPr>
+            <a:picLocks noChangeAspect="1"/>
+          </p:cNvPicPr>
+          <p:nvPr/>
+        </p:nvPicPr>
+        <p:blipFill>
+          <a:blip r:embed="rId3"/>
+          <a:stretch>
+            <a:fillRect/>
+          </a:stretch>
+        </p:blipFill>
+        <p:spPr>
+          <a:xfrm>
+            <a:off x="498216" y="0"/>
+            <a:ext cx="11354260" cy="6215275"/>
+          </a:xfrm>
+          <a:prstGeom prst="rect">
+            <a:avLst/>
+          </a:prstGeom>
+        </p:spPr>
+      </p:pic>
+    </p:spTree>
+    <p:extLst>
+      <p:ext uri="{BB962C8B-B14F-4D97-AF65-F5344CB8AC3E}">
+        <p14:creationId xmlns:p14="http://schemas.microsoft.com/office/powerpoint/2010/main" val="81786864"/>
+      </p:ext>
+    </p:extLst>
+  </p:cSld>
+  <p:clrMapOvr>
+    <a:masterClrMapping/>
+  </p:clrMapOvr>
+</p:sld>
+</file>
+
+<file path=ppt/slides/slide12.xml><?xml version="1.0" encoding="utf-8"?>
+<p:sld xmlns:a="http://schemas.openxmlformats.org/drawingml/2006/main" xmlns:r="http://schemas.openxmlformats.org/officeDocument/2006/relationships" xmlns:p="http://schemas.openxmlformats.org/presentationml/2006/main">
+  <p:cSld>
+    <p:spTree>
+      <p:nvGrpSpPr>
+        <p:cNvPr id="1" name=""/>
+        <p:cNvGrpSpPr/>
+        <p:nvPr/>
+      </p:nvGrpSpPr>
+      <p:grpSpPr>
+        <a:xfrm>
+          <a:off x="0" y="0"/>
+          <a:ext cx="0" cy="0"/>
+          <a:chOff x="0" y="0"/>
+          <a:chExt cx="0" cy="0"/>
+        </a:xfrm>
+      </p:grpSpPr>
+      <p:pic>
+        <p:nvPicPr>
+          <p:cNvPr id="3" name="Immagine 2"/>
+          <p:cNvPicPr>
+            <a:picLocks noChangeAspect="1"/>
+          </p:cNvPicPr>
+          <p:nvPr/>
+        </p:nvPicPr>
+        <p:blipFill>
+          <a:blip r:embed="rId3"/>
+          <a:stretch>
+            <a:fillRect/>
+          </a:stretch>
+        </p:blipFill>
+        <p:spPr>
+          <a:xfrm>
+            <a:off x="346388" y="0"/>
+            <a:ext cx="11526138" cy="6309360"/>
+          </a:xfrm>
+          <a:prstGeom prst="rect">
+            <a:avLst/>
+          </a:prstGeom>
+        </p:spPr>
+      </p:pic>
+    </p:spTree>
+    <p:extLst>
+      <p:ext uri="{BB962C8B-B14F-4D97-AF65-F5344CB8AC3E}">
+        <p14:creationId xmlns:p14="http://schemas.microsoft.com/office/powerpoint/2010/main" val="3598981869"/>
+      </p:ext>
+    </p:extLst>
+  </p:cSld>
+  <p:clrMapOvr>
+    <a:masterClrMapping/>
+  </p:clrMapOvr>
+</p:sld>
+</file>
+
+<file path=ppt/slides/slide13.xml><?xml version="1.0" encoding="utf-8"?>
+<p:sld xmlns:a="http://schemas.openxmlformats.org/drawingml/2006/main" xmlns:r="http://schemas.openxmlformats.org/officeDocument/2006/relationships" xmlns:p="http://schemas.openxmlformats.org/presentationml/2006/main">
+  <p:cSld>
+    <p:spTree>
+      <p:nvGrpSpPr>
+        <p:cNvPr id="1" name=""/>
+        <p:cNvGrpSpPr/>
+        <p:nvPr/>
+      </p:nvGrpSpPr>
+      <p:grpSpPr>
+        <a:xfrm>
+          <a:off x="0" y="0"/>
+          <a:ext cx="0" cy="0"/>
+          <a:chOff x="0" y="0"/>
+          <a:chExt cx="0" cy="0"/>
+        </a:xfrm>
+      </p:grpSpPr>
+      <p:pic>
+        <p:nvPicPr>
+          <p:cNvPr id="9" name="Immagine 8"/>
+          <p:cNvPicPr>
+            <a:picLocks noChangeAspect="1"/>
+          </p:cNvPicPr>
+          <p:nvPr/>
+        </p:nvPicPr>
+        <p:blipFill>
+          <a:blip r:embed="rId3"/>
+          <a:stretch>
+            <a:fillRect/>
+          </a:stretch>
+        </p:blipFill>
+        <p:spPr>
+          <a:xfrm>
+            <a:off x="307411" y="349324"/>
+            <a:ext cx="6056776" cy="5727385"/>
+          </a:xfrm>
+          <a:prstGeom prst="rect">
+            <a:avLst/>
+          </a:prstGeom>
+        </p:spPr>
+      </p:pic>
+      <p:pic>
+        <p:nvPicPr>
+          <p:cNvPr id="16" name="Immagine 15"/>
+          <p:cNvPicPr>
+            <a:picLocks noChangeAspect="1"/>
+          </p:cNvPicPr>
+          <p:nvPr/>
+        </p:nvPicPr>
+        <p:blipFill>
+          <a:blip r:embed="rId4"/>
+          <a:stretch>
+            <a:fillRect/>
+          </a:stretch>
+        </p:blipFill>
+        <p:spPr>
+          <a:xfrm>
+            <a:off x="6410943" y="452382"/>
+            <a:ext cx="5465499" cy="5389019"/>
+          </a:xfrm>
+          <a:prstGeom prst="rect">
+            <a:avLst/>
+          </a:prstGeom>
+        </p:spPr>
+      </p:pic>
+    </p:spTree>
+    <p:extLst>
+      <p:ext uri="{BB962C8B-B14F-4D97-AF65-F5344CB8AC3E}">
+        <p14:creationId xmlns:p14="http://schemas.microsoft.com/office/powerpoint/2010/main" val="4203211960"/>
+      </p:ext>
+    </p:extLst>
+  </p:cSld>
+  <p:clrMapOvr>
+    <a:masterClrMapping/>
+  </p:clrMapOvr>
+</p:sld>
+</file>
+
+<file path=ppt/slides/slide14.xml><?xml version="1.0" encoding="utf-8"?>
+<p:sld xmlns:a="http://schemas.openxmlformats.org/drawingml/2006/main" xmlns:r="http://schemas.openxmlformats.org/officeDocument/2006/relationships" xmlns:p="http://schemas.openxmlformats.org/presentationml/2006/main">
+  <p:cSld>
+    <p:spTree>
+      <p:nvGrpSpPr>
+        <p:cNvPr id="1" name=""/>
+        <p:cNvGrpSpPr/>
+        <p:nvPr/>
+      </p:nvGrpSpPr>
+      <p:grpSpPr>
+        <a:xfrm>
+          <a:off x="0" y="0"/>
+          <a:ext cx="0" cy="0"/>
+          <a:chOff x="0" y="0"/>
+          <a:chExt cx="0" cy="0"/>
+        </a:xfrm>
+      </p:grpSpPr>
+      <p:pic>
+        <p:nvPicPr>
+          <p:cNvPr id="2" name="Immagine 1"/>
+          <p:cNvPicPr>
+            <a:picLocks noChangeAspect="1"/>
+          </p:cNvPicPr>
+          <p:nvPr/>
+        </p:nvPicPr>
+        <p:blipFill>
+          <a:blip r:embed="rId3"/>
+          <a:stretch>
+            <a:fillRect/>
+          </a:stretch>
+        </p:blipFill>
+        <p:spPr>
+          <a:xfrm>
+            <a:off x="279924" y="501340"/>
+            <a:ext cx="5701329" cy="5512185"/>
+          </a:xfrm>
+          <a:prstGeom prst="rect">
+            <a:avLst/>
+          </a:prstGeom>
+        </p:spPr>
+      </p:pic>
+      <p:pic>
+        <p:nvPicPr>
+          <p:cNvPr id="3" name="Immagine 2"/>
+          <p:cNvPicPr>
+            <a:picLocks noChangeAspect="1"/>
+          </p:cNvPicPr>
+          <p:nvPr/>
+        </p:nvPicPr>
+        <p:blipFill>
+          <a:blip r:embed="rId4"/>
+          <a:stretch>
+            <a:fillRect/>
+          </a:stretch>
+        </p:blipFill>
+        <p:spPr>
+          <a:xfrm>
+            <a:off x="6435730" y="501340"/>
+            <a:ext cx="5481310" cy="5404608"/>
+          </a:xfrm>
+          <a:prstGeom prst="rect">
+            <a:avLst/>
+          </a:prstGeom>
+        </p:spPr>
+      </p:pic>
+    </p:spTree>
+    <p:extLst>
+      <p:ext uri="{BB962C8B-B14F-4D97-AF65-F5344CB8AC3E}">
+        <p14:creationId xmlns:p14="http://schemas.microsoft.com/office/powerpoint/2010/main" val="2042401429"/>
+      </p:ext>
+    </p:extLst>
+  </p:cSld>
+  <p:clrMapOvr>
+    <a:masterClrMapping/>
+  </p:clrMapOvr>
+</p:sld>
+</file>
+
+<file path=ppt/slides/slide15.xml><?xml version="1.0" encoding="utf-8"?>
+<p:sld xmlns:a="http://schemas.openxmlformats.org/drawingml/2006/main" xmlns:r="http://schemas.openxmlformats.org/officeDocument/2006/relationships" xmlns:p="http://schemas.openxmlformats.org/presentationml/2006/main">
+  <p:cSld>
+    <p:spTree>
+      <p:nvGrpSpPr>
+        <p:cNvPr id="1" name=""/>
+        <p:cNvGrpSpPr/>
+        <p:nvPr/>
+      </p:nvGrpSpPr>
+      <p:grpSpPr>
+        <a:xfrm>
+          <a:off x="0" y="0"/>
+          <a:ext cx="0" cy="0"/>
+          <a:chOff x="0" y="0"/>
+          <a:chExt cx="0" cy="0"/>
+        </a:xfrm>
+      </p:grpSpPr>
+      <p:pic>
+        <p:nvPicPr>
+          <p:cNvPr id="2" name="Immagine 1"/>
+          <p:cNvPicPr>
+            <a:picLocks noChangeAspect="1"/>
+          </p:cNvPicPr>
+          <p:nvPr/>
+        </p:nvPicPr>
+        <p:blipFill>
+          <a:blip r:embed="rId3"/>
+          <a:stretch>
+            <a:fillRect/>
+          </a:stretch>
+        </p:blipFill>
+        <p:spPr>
+          <a:xfrm>
+            <a:off x="0" y="124233"/>
+            <a:ext cx="6156103" cy="6069958"/>
+          </a:xfrm>
+          <a:prstGeom prst="rect">
+            <a:avLst/>
+          </a:prstGeom>
+        </p:spPr>
+      </p:pic>
+      <p:pic>
+        <p:nvPicPr>
+          <p:cNvPr id="3" name="Immagine 2"/>
+          <p:cNvPicPr>
+            <a:picLocks noChangeAspect="1"/>
+          </p:cNvPicPr>
+          <p:nvPr/>
+        </p:nvPicPr>
+        <p:blipFill>
+          <a:blip r:embed="rId4"/>
+          <a:stretch>
+            <a:fillRect/>
+          </a:stretch>
+        </p:blipFill>
+        <p:spPr>
+          <a:xfrm>
+            <a:off x="6070862" y="180397"/>
+            <a:ext cx="6121138" cy="6035482"/>
+          </a:xfrm>
+          <a:prstGeom prst="rect">
+            <a:avLst/>
+          </a:prstGeom>
+        </p:spPr>
+      </p:pic>
+    </p:spTree>
+    <p:extLst>
+      <p:ext uri="{BB962C8B-B14F-4D97-AF65-F5344CB8AC3E}">
+        <p14:creationId xmlns:p14="http://schemas.microsoft.com/office/powerpoint/2010/main" val="3185911874"/>
+      </p:ext>
+    </p:extLst>
+  </p:cSld>
+  <p:clrMapOvr>
+    <a:masterClrMapping/>
+  </p:clrMapOvr>
+  <p:timing>
+    <p:tnLst>
+      <p:par>
+        <p:cTn id="1" dur="indefinite" restart="never" nodeType="tmRoot"/>
+      </p:par>
+    </p:tnLst>
+  </p:timing>
+</p:sld>
+</file>
+
+<file path=ppt/slides/slide16.xml><?xml version="1.0" encoding="utf-8"?>
+<p:sld xmlns:a="http://schemas.openxmlformats.org/drawingml/2006/main" xmlns:r="http://schemas.openxmlformats.org/officeDocument/2006/relationships" xmlns:p="http://schemas.openxmlformats.org/presentationml/2006/main">
+  <p:cSld>
+    <p:spTree>
+      <p:nvGrpSpPr>
+        <p:cNvPr id="1" name=""/>
+        <p:cNvGrpSpPr/>
+        <p:nvPr/>
+      </p:nvGrpSpPr>
+      <p:grpSpPr>
+        <a:xfrm>
+          <a:off x="0" y="0"/>
+          <a:ext cx="0" cy="0"/>
+          <a:chOff x="0" y="0"/>
+          <a:chExt cx="0" cy="0"/>
+        </a:xfrm>
+      </p:grpSpPr>
+      <p:sp>
+        <p:nvSpPr>
+          <p:cNvPr id="2" name="Titolo 1"/>
+          <p:cNvSpPr>
+            <a:spLocks noGrp="1"/>
+          </p:cNvSpPr>
+          <p:nvPr>
+            <p:ph type="title"/>
+          </p:nvPr>
+        </p:nvSpPr>
+        <p:spPr/>
+        <p:txBody>
+          <a:bodyPr/>
+          <a:lstStyle/>
+          <a:p>
+            <a:r>
+              <a:rPr lang="it-IT" dirty="0" smtClean="0"/>
+              <a:t>Ipotesi di rischi proporzionali</a:t>
+            </a:r>
+            <a:endParaRPr lang="it-IT" dirty="0"/>
+          </a:p>
+        </p:txBody>
+      </p:sp>
+      <p:pic>
+        <p:nvPicPr>
+          <p:cNvPr id="4" name="Segnaposto contenuto 3"/>
+          <p:cNvPicPr>
+            <a:picLocks noGrp="1" noChangeAspect="1"/>
+          </p:cNvPicPr>
+          <p:nvPr>
+            <p:ph idx="1"/>
+          </p:nvPr>
+        </p:nvPicPr>
+        <p:blipFill>
+          <a:blip r:embed="rId3"/>
+          <a:stretch>
+            <a:fillRect/>
+          </a:stretch>
+        </p:blipFill>
+        <p:spPr>
+          <a:xfrm>
+            <a:off x="2074601" y="1865117"/>
+            <a:ext cx="8103758" cy="4435963"/>
+          </a:xfrm>
+          <a:prstGeom prst="rect">
+            <a:avLst/>
+          </a:prstGeom>
+        </p:spPr>
+      </p:pic>
+    </p:spTree>
+    <p:extLst>
+      <p:ext uri="{BB962C8B-B14F-4D97-AF65-F5344CB8AC3E}">
+        <p14:creationId xmlns:p14="http://schemas.microsoft.com/office/powerpoint/2010/main" val="220282012"/>
+      </p:ext>
+    </p:extLst>
+  </p:cSld>
+  <p:clrMapOvr>
+    <a:masterClrMapping/>
+  </p:clrMapOvr>
+  <p:timing>
+    <p:tnLst>
+      <p:par>
+        <p:cTn id="1" dur="indefinite" restart="never" nodeType="tmRoot"/>
+      </p:par>
+    </p:tnLst>
+  </p:timing>
+</p:sld>
+</file>
+
+<file path=ppt/slides/slide17.xml><?xml version="1.0" encoding="utf-8"?>
+<p:sld xmlns:a="http://schemas.openxmlformats.org/drawingml/2006/main" xmlns:r="http://schemas.openxmlformats.org/officeDocument/2006/relationships" xmlns:p="http://schemas.openxmlformats.org/presentationml/2006/main">
+  <p:cSld>
+    <p:spTree>
+      <p:nvGrpSpPr>
+        <p:cNvPr id="1" name=""/>
+        <p:cNvGrpSpPr/>
+        <p:nvPr/>
+      </p:nvGrpSpPr>
+      <p:grpSpPr>
+        <a:xfrm>
+          <a:off x="0" y="0"/>
+          <a:ext cx="0" cy="0"/>
+          <a:chOff x="0" y="0"/>
+          <a:chExt cx="0" cy="0"/>
+        </a:xfrm>
+      </p:grpSpPr>
+      <p:sp>
+        <p:nvSpPr>
+          <p:cNvPr id="2" name="Titolo 1"/>
+          <p:cNvSpPr>
+            <a:spLocks noGrp="1"/>
+          </p:cNvSpPr>
+          <p:nvPr>
+            <p:ph type="title"/>
+          </p:nvPr>
+        </p:nvSpPr>
+        <p:spPr/>
+        <p:txBody>
+          <a:bodyPr/>
+          <a:lstStyle/>
+          <a:p>
+            <a:r>
+              <a:rPr lang="it-IT" dirty="0" smtClean="0"/>
+              <a:t>Modelli di </a:t>
+            </a:r>
+            <a:r>
+              <a:rPr lang="it-IT" dirty="0" err="1" smtClean="0"/>
+              <a:t>Cox</a:t>
+            </a:r>
+            <a:r>
+              <a:rPr lang="it-IT" dirty="0"/>
+              <a:t> </a:t>
+            </a:r>
+            <a:r>
+              <a:rPr lang="it-IT" dirty="0" err="1" smtClean="0"/>
+              <a:t>univariati</a:t>
+            </a:r>
+            <a:endParaRPr lang="it-IT" dirty="0"/>
+          </a:p>
+        </p:txBody>
+      </p:sp>
+      <p:cxnSp>
+        <p:nvCxnSpPr>
+          <p:cNvPr id="11" name="Connettore diritto 10"/>
+          <p:cNvCxnSpPr/>
+          <p:nvPr/>
+        </p:nvCxnSpPr>
+        <p:spPr>
+          <a:xfrm>
+            <a:off x="6038540" y="2185295"/>
+            <a:ext cx="0" cy="3242820"/>
+          </a:xfrm>
+          <a:prstGeom prst="line">
+            <a:avLst/>
+          </a:prstGeom>
+        </p:spPr>
+        <p:style>
+          <a:lnRef idx="1">
+            <a:schemeClr val="accent1"/>
+          </a:lnRef>
+          <a:fillRef idx="0">
+            <a:schemeClr val="accent1"/>
+          </a:fillRef>
+          <a:effectRef idx="0">
+            <a:schemeClr val="accent1"/>
+          </a:effectRef>
+          <a:fontRef idx="minor">
+            <a:schemeClr val="tx1"/>
+          </a:fontRef>
+        </p:style>
+      </p:cxnSp>
+      <p:pic>
+        <p:nvPicPr>
+          <p:cNvPr id="14" name="Segnaposto contenuto 13"/>
+          <p:cNvPicPr>
+            <a:picLocks noGrp="1" noChangeAspect="1"/>
+          </p:cNvPicPr>
+          <p:nvPr>
+            <p:ph sz="half" idx="1"/>
+          </p:nvPr>
+        </p:nvPicPr>
+        <p:blipFill>
+          <a:blip r:embed="rId3"/>
+          <a:stretch>
+            <a:fillRect/>
+          </a:stretch>
+        </p:blipFill>
+        <p:spPr>
+          <a:xfrm>
+            <a:off x="1096963" y="2397178"/>
+            <a:ext cx="4938712" cy="2920895"/>
+          </a:xfrm>
+          <a:prstGeom prst="rect">
+            <a:avLst/>
+          </a:prstGeom>
+        </p:spPr>
+      </p:pic>
+      <p:pic>
+        <p:nvPicPr>
+          <p:cNvPr id="15" name="Segnaposto contenuto 14"/>
+          <p:cNvPicPr>
+            <a:picLocks noGrp="1" noChangeAspect="1"/>
+          </p:cNvPicPr>
+          <p:nvPr>
+            <p:ph sz="half" idx="2"/>
+          </p:nvPr>
+        </p:nvPicPr>
+        <p:blipFill>
+          <a:blip r:embed="rId4"/>
+          <a:stretch>
+            <a:fillRect/>
+          </a:stretch>
+        </p:blipFill>
+        <p:spPr>
+          <a:xfrm>
+            <a:off x="6218238" y="2423811"/>
+            <a:ext cx="4937125" cy="2867629"/>
+          </a:xfrm>
+          <a:prstGeom prst="rect">
+            <a:avLst/>
+          </a:prstGeom>
+        </p:spPr>
+      </p:pic>
+    </p:spTree>
+    <p:extLst>
+      <p:ext uri="{BB962C8B-B14F-4D97-AF65-F5344CB8AC3E}">
+        <p14:creationId xmlns:p14="http://schemas.microsoft.com/office/powerpoint/2010/main" val="2859867437"/>
       </p:ext>
     </p:extLst>
   </p:cSld>
@@ -4870,7 +7174,11 @@
           <a:p>
             <a:r>
               <a:rPr lang="it-IT" dirty="0" smtClean="0"/>
-              <a:t>Variabile oggetto di studio: morti</a:t>
+              <a:t>Variabile oggetto di studio: </a:t>
+            </a:r>
+            <a:r>
+              <a:rPr lang="it-IT" dirty="0" smtClean="0"/>
+              <a:t>morte</a:t>
             </a:r>
             <a:endParaRPr lang="it-IT" dirty="0"/>
           </a:p>
@@ -4954,7 +7262,15 @@
           <a:bodyPr/>
           <a:lstStyle/>
           <a:p>
-            <a:endParaRPr lang="it-IT"/>
+            <a:r>
+              <a:rPr lang="it-IT" dirty="0"/>
+              <a:t>Variabile oggetto di studio: </a:t>
+            </a:r>
+            <a:r>
+              <a:rPr lang="it-IT" dirty="0" smtClean="0"/>
+              <a:t>ricaduta</a:t>
+            </a:r>
+            <a:endParaRPr lang="it-IT" dirty="0"/>
           </a:p>
         </p:txBody>
       </p:sp>
@@ -4968,7 +7284,12 @@
             <p:ph sz="half" idx="1"/>
           </p:nvPr>
         </p:nvSpPr>
-        <p:spPr/>
+        <p:spPr>
+          <a:xfrm>
+            <a:off x="1097279" y="2097740"/>
+            <a:ext cx="4937760" cy="3771353"/>
+          </a:xfrm>
+        </p:spPr>
         <p:txBody>
           <a:bodyPr/>
           <a:lstStyle/>
@@ -5076,6 +7397,879 @@
       </p:par>
     </p:tnLst>
   </p:timing>
+</p:sld>
+</file>
+
+<file path=ppt/slides/slide6.xml><?xml version="1.0" encoding="utf-8"?>
+<p:sld xmlns:a="http://schemas.openxmlformats.org/drawingml/2006/main" xmlns:r="http://schemas.openxmlformats.org/officeDocument/2006/relationships" xmlns:p="http://schemas.openxmlformats.org/presentationml/2006/main">
+  <p:cSld>
+    <p:spTree>
+      <p:nvGrpSpPr>
+        <p:cNvPr id="1" name=""/>
+        <p:cNvGrpSpPr/>
+        <p:nvPr/>
+      </p:nvGrpSpPr>
+      <p:grpSpPr>
+        <a:xfrm>
+          <a:off x="0" y="0"/>
+          <a:ext cx="0" cy="0"/>
+          <a:chOff x="0" y="0"/>
+          <a:chExt cx="0" cy="0"/>
+        </a:xfrm>
+      </p:grpSpPr>
+      <p:sp>
+        <p:nvSpPr>
+          <p:cNvPr id="2" name="Titolo 1"/>
+          <p:cNvSpPr>
+            <a:spLocks noGrp="1"/>
+          </p:cNvSpPr>
+          <p:nvPr>
+            <p:ph type="title"/>
+          </p:nvPr>
+        </p:nvSpPr>
+        <p:spPr/>
+        <p:txBody>
+          <a:bodyPr/>
+          <a:lstStyle/>
+          <a:p>
+            <a:r>
+              <a:rPr lang="it-IT" dirty="0" err="1" smtClean="0"/>
+              <a:t>Covariate</a:t>
+            </a:r>
+            <a:r>
+              <a:rPr lang="it-IT" dirty="0" smtClean="0"/>
+              <a:t>: LNR e LODDS</a:t>
+            </a:r>
+            <a:endParaRPr lang="it-IT" dirty="0"/>
+          </a:p>
+        </p:txBody>
+      </p:sp>
+      <p:pic>
+        <p:nvPicPr>
+          <p:cNvPr id="5" name="Segnaposto contenuto 4"/>
+          <p:cNvPicPr>
+            <a:picLocks noGrp="1" noChangeAspect="1"/>
+          </p:cNvPicPr>
+          <p:nvPr>
+            <p:ph sz="half" idx="1"/>
+          </p:nvPr>
+        </p:nvPicPr>
+        <p:blipFill>
+          <a:blip r:embed="rId3"/>
+          <a:stretch>
+            <a:fillRect/>
+          </a:stretch>
+        </p:blipFill>
+        <p:spPr>
+          <a:xfrm>
+            <a:off x="1379585" y="1846263"/>
+            <a:ext cx="4373468" cy="4022725"/>
+          </a:xfrm>
+          <a:prstGeom prst="rect">
+            <a:avLst/>
+          </a:prstGeom>
+        </p:spPr>
+      </p:pic>
+      <p:pic>
+        <p:nvPicPr>
+          <p:cNvPr id="6" name="Segnaposto contenuto 5"/>
+          <p:cNvPicPr>
+            <a:picLocks noGrp="1" noChangeAspect="1"/>
+          </p:cNvPicPr>
+          <p:nvPr>
+            <p:ph sz="half" idx="2"/>
+          </p:nvPr>
+        </p:nvPicPr>
+        <p:blipFill>
+          <a:blip r:embed="rId4"/>
+          <a:stretch>
+            <a:fillRect/>
+          </a:stretch>
+        </p:blipFill>
+        <p:spPr>
+          <a:xfrm>
+            <a:off x="6500066" y="1846263"/>
+            <a:ext cx="4373468" cy="4022725"/>
+          </a:xfrm>
+          <a:prstGeom prst="rect">
+            <a:avLst/>
+          </a:prstGeom>
+        </p:spPr>
+      </p:pic>
+    </p:spTree>
+    <p:extLst>
+      <p:ext uri="{BB962C8B-B14F-4D97-AF65-F5344CB8AC3E}">
+        <p14:creationId xmlns:p14="http://schemas.microsoft.com/office/powerpoint/2010/main" val="1739474644"/>
+      </p:ext>
+    </p:extLst>
+  </p:cSld>
+  <p:clrMapOvr>
+    <a:masterClrMapping/>
+  </p:clrMapOvr>
+</p:sld>
+</file>
+
+<file path=ppt/slides/slide7.xml><?xml version="1.0" encoding="utf-8"?>
+<p:sld xmlns:a="http://schemas.openxmlformats.org/drawingml/2006/main" xmlns:r="http://schemas.openxmlformats.org/officeDocument/2006/relationships" xmlns:p="http://schemas.openxmlformats.org/presentationml/2006/main">
+  <p:cSld>
+    <p:spTree>
+      <p:nvGrpSpPr>
+        <p:cNvPr id="1" name=""/>
+        <p:cNvGrpSpPr/>
+        <p:nvPr/>
+      </p:nvGrpSpPr>
+      <p:grpSpPr>
+        <a:xfrm>
+          <a:off x="0" y="0"/>
+          <a:ext cx="0" cy="0"/>
+          <a:chOff x="0" y="0"/>
+          <a:chExt cx="0" cy="0"/>
+        </a:xfrm>
+      </p:grpSpPr>
+      <p:sp>
+        <p:nvSpPr>
+          <p:cNvPr id="2" name="Titolo 1"/>
+          <p:cNvSpPr>
+            <a:spLocks noGrp="1"/>
+          </p:cNvSpPr>
+          <p:nvPr>
+            <p:ph type="title"/>
+          </p:nvPr>
+        </p:nvSpPr>
+        <p:spPr/>
+        <p:txBody>
+          <a:bodyPr/>
+          <a:lstStyle/>
+          <a:p>
+            <a:r>
+              <a:rPr lang="it-IT" dirty="0" smtClean="0"/>
+              <a:t>Stima della curva di sopravvivenza</a:t>
+            </a:r>
+            <a:endParaRPr lang="it-IT" dirty="0"/>
+          </a:p>
+        </p:txBody>
+      </p:sp>
+      <p:sp>
+        <p:nvSpPr>
+          <p:cNvPr id="5" name="Segnaposto contenuto 4"/>
+          <p:cNvSpPr>
+            <a:spLocks noGrp="1"/>
+          </p:cNvSpPr>
+          <p:nvPr>
+            <p:ph idx="1"/>
+          </p:nvPr>
+        </p:nvSpPr>
+        <p:spPr>
+          <a:xfrm>
+            <a:off x="1097280" y="1845734"/>
+            <a:ext cx="10058400" cy="886708"/>
+          </a:xfrm>
+        </p:spPr>
+        <p:txBody>
+          <a:bodyPr/>
+          <a:lstStyle/>
+          <a:p>
+            <a:r>
+              <a:rPr lang="it-IT" dirty="0" smtClean="0"/>
+              <a:t>Per la stima di entrambe le curve della sopravvivenza totale e </a:t>
+            </a:r>
+            <a:r>
+              <a:rPr lang="it-IT" dirty="0" err="1" smtClean="0"/>
+              <a:t>Disease</a:t>
+            </a:r>
+            <a:r>
+              <a:rPr lang="it-IT" dirty="0" smtClean="0"/>
+              <a:t>-Free è stato adoperato lo stimatore di </a:t>
+            </a:r>
+            <a:r>
+              <a:rPr lang="it-IT" dirty="0" err="1" smtClean="0"/>
+              <a:t>Kaplan</a:t>
+            </a:r>
+            <a:r>
+              <a:rPr lang="it-IT" dirty="0" smtClean="0"/>
+              <a:t>-Meier (1959):</a:t>
+            </a:r>
+          </a:p>
+        </p:txBody>
+      </p:sp>
+      <mc:AlternateContent xmlns:mc="http://schemas.openxmlformats.org/markup-compatibility/2006">
+        <mc:Choice xmlns:a14="http://schemas.microsoft.com/office/drawing/2010/main" Requires="a14">
+          <p:sp>
+            <p:nvSpPr>
+              <p:cNvPr id="6" name="Segnaposto contenuto 5"/>
+              <p:cNvSpPr>
+                <a:spLocks noGrp="1"/>
+              </p:cNvSpPr>
+              <p:nvPr>
+                <p:ph sz="half" idx="4294967295"/>
+              </p:nvPr>
+            </p:nvSpPr>
+            <p:spPr>
+              <a:xfrm>
+                <a:off x="4690334" y="2732442"/>
+                <a:ext cx="2614613" cy="731520"/>
+              </a:xfrm>
+            </p:spPr>
+            <p:txBody>
+              <a:bodyPr/>
+              <a:lstStyle/>
+              <a:p>
+                <a14:m>
+                  <m:oMath xmlns:m="http://schemas.openxmlformats.org/officeDocument/2006/math">
+                    <m:acc>
+                      <m:accPr>
+                        <m:chr m:val="̂"/>
+                        <m:ctrlPr>
+                          <a:rPr lang="it-IT" i="1" smtClean="0">
+                            <a:latin typeface="Cambria Math" panose="02040503050406030204" pitchFamily="18" charset="0"/>
+                          </a:rPr>
+                        </m:ctrlPr>
+                      </m:accPr>
+                      <m:e>
+                        <m:r>
+                          <a:rPr lang="it-IT" b="0" i="1" smtClean="0">
+                            <a:latin typeface="Cambria Math" panose="02040503050406030204" pitchFamily="18" charset="0"/>
+                          </a:rPr>
+                          <m:t>𝑆</m:t>
+                        </m:r>
+                      </m:e>
+                    </m:acc>
+                    <m:d>
+                      <m:dPr>
+                        <m:ctrlPr>
+                          <a:rPr lang="it-IT" b="0" i="1" smtClean="0">
+                            <a:latin typeface="Cambria Math" panose="02040503050406030204" pitchFamily="18" charset="0"/>
+                          </a:rPr>
+                        </m:ctrlPr>
+                      </m:dPr>
+                      <m:e>
+                        <m:r>
+                          <a:rPr lang="it-IT" b="0" i="1" smtClean="0">
+                            <a:latin typeface="Cambria Math" panose="02040503050406030204" pitchFamily="18" charset="0"/>
+                          </a:rPr>
+                          <m:t>𝑡</m:t>
+                        </m:r>
+                      </m:e>
+                    </m:d>
+                    <m:r>
+                      <a:rPr lang="it-IT" b="0" i="1" smtClean="0">
+                        <a:latin typeface="Cambria Math" panose="02040503050406030204" pitchFamily="18" charset="0"/>
+                      </a:rPr>
+                      <m:t>=</m:t>
+                    </m:r>
+                    <m:nary>
+                      <m:naryPr>
+                        <m:chr m:val="∏"/>
+                        <m:supHide m:val="on"/>
+                        <m:ctrlPr>
+                          <a:rPr lang="it-IT" b="0" i="1" smtClean="0">
+                            <a:latin typeface="Cambria Math" panose="02040503050406030204" pitchFamily="18" charset="0"/>
+                          </a:rPr>
+                        </m:ctrlPr>
+                      </m:naryPr>
+                      <m:sub>
+                        <m:r>
+                          <m:rPr>
+                            <m:brk m:alnAt="7"/>
+                          </m:rPr>
+                          <a:rPr lang="it-IT" b="0" i="1" smtClean="0">
+                            <a:latin typeface="Cambria Math" panose="02040503050406030204" pitchFamily="18" charset="0"/>
+                          </a:rPr>
+                          <m:t>𝑆</m:t>
+                        </m:r>
+                        <m:sSub>
+                          <m:sSubPr>
+                            <m:ctrlPr>
+                              <a:rPr lang="it-IT" b="0" i="1" smtClean="0">
+                                <a:latin typeface="Cambria Math" panose="02040503050406030204" pitchFamily="18" charset="0"/>
+                              </a:rPr>
+                            </m:ctrlPr>
+                          </m:sSubPr>
+                          <m:e>
+                            <m:r>
+                              <a:rPr lang="it-IT" b="0" i="1" smtClean="0">
+                                <a:latin typeface="Cambria Math" panose="02040503050406030204" pitchFamily="18" charset="0"/>
+                              </a:rPr>
+                              <m:t>𝑡</m:t>
+                            </m:r>
+                          </m:e>
+                          <m:sub>
+                            <m:r>
+                              <a:rPr lang="it-IT" b="0" i="1" smtClean="0">
+                                <a:latin typeface="Cambria Math" panose="02040503050406030204" pitchFamily="18" charset="0"/>
+                              </a:rPr>
+                              <m:t>𝑗</m:t>
+                            </m:r>
+                          </m:sub>
+                        </m:sSub>
+                        <m:r>
+                          <m:rPr>
+                            <m:brk m:alnAt="7"/>
+                          </m:rPr>
+                          <a:rPr lang="it-IT" b="0" i="1" smtClean="0">
+                            <a:latin typeface="Cambria Math" panose="02040503050406030204" pitchFamily="18" charset="0"/>
+                          </a:rPr>
+                          <m:t>&lt;</m:t>
+                        </m:r>
+                        <m:r>
+                          <a:rPr lang="it-IT" b="0" i="1" smtClean="0">
+                            <a:latin typeface="Cambria Math" panose="02040503050406030204" pitchFamily="18" charset="0"/>
+                          </a:rPr>
+                          <m:t>𝑡</m:t>
+                        </m:r>
+                      </m:sub>
+                      <m:sup/>
+                      <m:e>
+                        <m:r>
+                          <a:rPr lang="it-IT" b="0" i="1" smtClean="0">
+                            <a:latin typeface="Cambria Math" panose="02040503050406030204" pitchFamily="18" charset="0"/>
+                          </a:rPr>
+                          <m:t>(1−</m:t>
+                        </m:r>
+                        <m:f>
+                          <m:fPr>
+                            <m:ctrlPr>
+                              <a:rPr lang="it-IT" b="0" i="1" smtClean="0">
+                                <a:latin typeface="Cambria Math" panose="02040503050406030204" pitchFamily="18" charset="0"/>
+                              </a:rPr>
+                            </m:ctrlPr>
+                          </m:fPr>
+                          <m:num>
+                            <m:sSub>
+                              <m:sSubPr>
+                                <m:ctrlPr>
+                                  <a:rPr lang="it-IT" b="0" i="1" smtClean="0">
+                                    <a:latin typeface="Cambria Math" panose="02040503050406030204" pitchFamily="18" charset="0"/>
+                                  </a:rPr>
+                                </m:ctrlPr>
+                              </m:sSubPr>
+                              <m:e>
+                                <m:r>
+                                  <a:rPr lang="it-IT" b="0" i="1" smtClean="0">
+                                    <a:latin typeface="Cambria Math" panose="02040503050406030204" pitchFamily="18" charset="0"/>
+                                  </a:rPr>
+                                  <m:t>𝑑</m:t>
+                                </m:r>
+                              </m:e>
+                              <m:sub>
+                                <m:r>
+                                  <a:rPr lang="it-IT" b="0" i="1" smtClean="0">
+                                    <a:latin typeface="Cambria Math" panose="02040503050406030204" pitchFamily="18" charset="0"/>
+                                  </a:rPr>
+                                  <m:t>𝑗</m:t>
+                                </m:r>
+                              </m:sub>
+                            </m:sSub>
+                          </m:num>
+                          <m:den>
+                            <m:sSub>
+                              <m:sSubPr>
+                                <m:ctrlPr>
+                                  <a:rPr lang="it-IT" b="0" i="1" smtClean="0">
+                                    <a:latin typeface="Cambria Math" panose="02040503050406030204" pitchFamily="18" charset="0"/>
+                                  </a:rPr>
+                                </m:ctrlPr>
+                              </m:sSubPr>
+                              <m:e>
+                                <m:r>
+                                  <a:rPr lang="it-IT" b="0" i="1" smtClean="0">
+                                    <a:latin typeface="Cambria Math" panose="02040503050406030204" pitchFamily="18" charset="0"/>
+                                  </a:rPr>
+                                  <m:t>𝑛</m:t>
+                                </m:r>
+                              </m:e>
+                              <m:sub>
+                                <m:r>
+                                  <a:rPr lang="it-IT" b="0" i="1" smtClean="0">
+                                    <a:latin typeface="Cambria Math" panose="02040503050406030204" pitchFamily="18" charset="0"/>
+                                  </a:rPr>
+                                  <m:t>𝑗</m:t>
+                                </m:r>
+                              </m:sub>
+                            </m:sSub>
+                          </m:den>
+                        </m:f>
+                      </m:e>
+                    </m:nary>
+                  </m:oMath>
+                </a14:m>
+                <a:r>
+                  <a:rPr lang="it-IT" dirty="0" smtClean="0"/>
+                  <a:t>)</a:t>
+                </a:r>
+                <a:endParaRPr lang="it-IT" dirty="0"/>
+              </a:p>
+            </p:txBody>
+          </p:sp>
+        </mc:Choice>
+        <mc:Fallback>
+          <p:sp>
+            <p:nvSpPr>
+              <p:cNvPr id="6" name="Segnaposto contenuto 5"/>
+              <p:cNvSpPr>
+                <a:spLocks noGrp="1" noRot="1" noChangeAspect="1" noMove="1" noResize="1" noEditPoints="1" noAdjustHandles="1" noChangeArrowheads="1" noChangeShapeType="1" noTextEdit="1"/>
+              </p:cNvSpPr>
+              <p:nvPr>
+                <p:ph sz="half" idx="4294967295"/>
+              </p:nvPr>
+            </p:nvSpPr>
+            <p:spPr>
+              <a:xfrm>
+                <a:off x="4690334" y="2732442"/>
+                <a:ext cx="2614613" cy="731520"/>
+              </a:xfrm>
+              <a:blipFill>
+                <a:blip r:embed="rId2"/>
+                <a:stretch>
+                  <a:fillRect/>
+                </a:stretch>
+              </a:blipFill>
+            </p:spPr>
+            <p:txBody>
+              <a:bodyPr/>
+              <a:lstStyle/>
+              <a:p>
+                <a:r>
+                  <a:rPr lang="it-IT">
+                    <a:noFill/>
+                  </a:rPr>
+                  <a:t> </a:t>
+                </a:r>
+              </a:p>
+            </p:txBody>
+          </p:sp>
+        </mc:Fallback>
+      </mc:AlternateContent>
+      <p:sp>
+        <p:nvSpPr>
+          <p:cNvPr id="7" name="Segnaposto contenuto 4"/>
+          <p:cNvSpPr txBox="1">
+            <a:spLocks/>
+          </p:cNvSpPr>
+          <p:nvPr/>
+        </p:nvSpPr>
+        <p:spPr>
+          <a:xfrm>
+            <a:off x="1097280" y="3773146"/>
+            <a:ext cx="10058400" cy="2509320"/>
+          </a:xfrm>
+          <a:prstGeom prst="rect">
+            <a:avLst/>
+          </a:prstGeom>
+        </p:spPr>
+        <p:txBody>
+          <a:bodyPr vert="horz" lIns="0" tIns="45720" rIns="0" bIns="45720" rtlCol="0">
+            <a:normAutofit/>
+          </a:bodyPr>
+          <a:lstStyle>
+            <a:lvl1pPr marL="91440" indent="-91440" algn="l" defTabSz="914400" rtl="0" eaLnBrk="1" latinLnBrk="0" hangingPunct="1">
+              <a:lnSpc>
+                <a:spcPct val="90000"/>
+              </a:lnSpc>
+              <a:spcBef>
+                <a:spcPts val="1200"/>
+              </a:spcBef>
+              <a:spcAft>
+                <a:spcPts val="200"/>
+              </a:spcAft>
+              <a:buClr>
+                <a:schemeClr val="accent1"/>
+              </a:buClr>
+              <a:buSzPct val="100000"/>
+              <a:buFont typeface="Calibri" panose="020F0502020204030204" pitchFamily="34" charset="0"/>
+              <a:buChar char=" "/>
+              <a:defRPr sz="2000" kern="1200">
+                <a:solidFill>
+                  <a:schemeClr val="tx1">
+                    <a:lumMod val="75000"/>
+                    <a:lumOff val="25000"/>
+                  </a:schemeClr>
+                </a:solidFill>
+                <a:latin typeface="+mn-lt"/>
+                <a:ea typeface="+mn-ea"/>
+                <a:cs typeface="+mn-cs"/>
+              </a:defRPr>
+            </a:lvl1pPr>
+            <a:lvl2pPr marL="384048" indent="-182880" algn="l" defTabSz="914400" rtl="0" eaLnBrk="1" latinLnBrk="0" hangingPunct="1">
+              <a:lnSpc>
+                <a:spcPct val="90000"/>
+              </a:lnSpc>
+              <a:spcBef>
+                <a:spcPts val="200"/>
+              </a:spcBef>
+              <a:spcAft>
+                <a:spcPts val="400"/>
+              </a:spcAft>
+              <a:buClr>
+                <a:schemeClr val="accent1"/>
+              </a:buClr>
+              <a:buFont typeface="Calibri" pitchFamily="34" charset="0"/>
+              <a:buChar char="◦"/>
+              <a:defRPr sz="1800" kern="1200">
+                <a:solidFill>
+                  <a:schemeClr val="tx1">
+                    <a:lumMod val="75000"/>
+                    <a:lumOff val="25000"/>
+                  </a:schemeClr>
+                </a:solidFill>
+                <a:latin typeface="+mn-lt"/>
+                <a:ea typeface="+mn-ea"/>
+                <a:cs typeface="+mn-cs"/>
+              </a:defRPr>
+            </a:lvl2pPr>
+            <a:lvl3pPr marL="566928" indent="-182880" algn="l" defTabSz="914400" rtl="0" eaLnBrk="1" latinLnBrk="0" hangingPunct="1">
+              <a:lnSpc>
+                <a:spcPct val="90000"/>
+              </a:lnSpc>
+              <a:spcBef>
+                <a:spcPts val="200"/>
+              </a:spcBef>
+              <a:spcAft>
+                <a:spcPts val="400"/>
+              </a:spcAft>
+              <a:buClr>
+                <a:schemeClr val="accent1"/>
+              </a:buClr>
+              <a:buFont typeface="Calibri" pitchFamily="34" charset="0"/>
+              <a:buChar char="◦"/>
+              <a:defRPr sz="1400" kern="1200">
+                <a:solidFill>
+                  <a:schemeClr val="tx1">
+                    <a:lumMod val="75000"/>
+                    <a:lumOff val="25000"/>
+                  </a:schemeClr>
+                </a:solidFill>
+                <a:latin typeface="+mn-lt"/>
+                <a:ea typeface="+mn-ea"/>
+                <a:cs typeface="+mn-cs"/>
+              </a:defRPr>
+            </a:lvl3pPr>
+            <a:lvl4pPr marL="749808" indent="-182880" algn="l" defTabSz="914400" rtl="0" eaLnBrk="1" latinLnBrk="0" hangingPunct="1">
+              <a:lnSpc>
+                <a:spcPct val="90000"/>
+              </a:lnSpc>
+              <a:spcBef>
+                <a:spcPts val="200"/>
+              </a:spcBef>
+              <a:spcAft>
+                <a:spcPts val="400"/>
+              </a:spcAft>
+              <a:buClr>
+                <a:schemeClr val="accent1"/>
+              </a:buClr>
+              <a:buFont typeface="Calibri" pitchFamily="34" charset="0"/>
+              <a:buChar char="◦"/>
+              <a:defRPr sz="1400" kern="1200">
+                <a:solidFill>
+                  <a:schemeClr val="tx1">
+                    <a:lumMod val="75000"/>
+                    <a:lumOff val="25000"/>
+                  </a:schemeClr>
+                </a:solidFill>
+                <a:latin typeface="+mn-lt"/>
+                <a:ea typeface="+mn-ea"/>
+                <a:cs typeface="+mn-cs"/>
+              </a:defRPr>
+            </a:lvl4pPr>
+            <a:lvl5pPr marL="932688" indent="-182880" algn="l" defTabSz="914400" rtl="0" eaLnBrk="1" latinLnBrk="0" hangingPunct="1">
+              <a:lnSpc>
+                <a:spcPct val="90000"/>
+              </a:lnSpc>
+              <a:spcBef>
+                <a:spcPts val="200"/>
+              </a:spcBef>
+              <a:spcAft>
+                <a:spcPts val="400"/>
+              </a:spcAft>
+              <a:buClr>
+                <a:schemeClr val="accent1"/>
+              </a:buClr>
+              <a:buFont typeface="Calibri" pitchFamily="34" charset="0"/>
+              <a:buChar char="◦"/>
+              <a:defRPr sz="1400" kern="1200">
+                <a:solidFill>
+                  <a:schemeClr val="tx1">
+                    <a:lumMod val="75000"/>
+                    <a:lumOff val="25000"/>
+                  </a:schemeClr>
+                </a:solidFill>
+                <a:latin typeface="+mn-lt"/>
+                <a:ea typeface="+mn-ea"/>
+                <a:cs typeface="+mn-cs"/>
+              </a:defRPr>
+            </a:lvl5pPr>
+            <a:lvl6pPr marL="1100000" indent="-228600" algn="l" defTabSz="914400" rtl="0" eaLnBrk="1" latinLnBrk="0" hangingPunct="1">
+              <a:lnSpc>
+                <a:spcPct val="90000"/>
+              </a:lnSpc>
+              <a:spcBef>
+                <a:spcPts val="200"/>
+              </a:spcBef>
+              <a:spcAft>
+                <a:spcPts val="400"/>
+              </a:spcAft>
+              <a:buClr>
+                <a:schemeClr val="accent1"/>
+              </a:buClr>
+              <a:buFont typeface="Calibri" pitchFamily="34" charset="0"/>
+              <a:buChar char="◦"/>
+              <a:defRPr sz="1400" kern="1200">
+                <a:solidFill>
+                  <a:schemeClr val="tx1">
+                    <a:lumMod val="75000"/>
+                    <a:lumOff val="25000"/>
+                  </a:schemeClr>
+                </a:solidFill>
+                <a:latin typeface="+mn-lt"/>
+                <a:ea typeface="+mn-ea"/>
+                <a:cs typeface="+mn-cs"/>
+              </a:defRPr>
+            </a:lvl6pPr>
+            <a:lvl7pPr marL="1300000" indent="-228600" algn="l" defTabSz="914400" rtl="0" eaLnBrk="1" latinLnBrk="0" hangingPunct="1">
+              <a:lnSpc>
+                <a:spcPct val="90000"/>
+              </a:lnSpc>
+              <a:spcBef>
+                <a:spcPts val="200"/>
+              </a:spcBef>
+              <a:spcAft>
+                <a:spcPts val="400"/>
+              </a:spcAft>
+              <a:buClr>
+                <a:schemeClr val="accent1"/>
+              </a:buClr>
+              <a:buFont typeface="Calibri" pitchFamily="34" charset="0"/>
+              <a:buChar char="◦"/>
+              <a:defRPr sz="1400" kern="1200">
+                <a:solidFill>
+                  <a:schemeClr val="tx1">
+                    <a:lumMod val="75000"/>
+                    <a:lumOff val="25000"/>
+                  </a:schemeClr>
+                </a:solidFill>
+                <a:latin typeface="+mn-lt"/>
+                <a:ea typeface="+mn-ea"/>
+                <a:cs typeface="+mn-cs"/>
+              </a:defRPr>
+            </a:lvl7pPr>
+            <a:lvl8pPr marL="1500000" indent="-228600" algn="l" defTabSz="914400" rtl="0" eaLnBrk="1" latinLnBrk="0" hangingPunct="1">
+              <a:lnSpc>
+                <a:spcPct val="90000"/>
+              </a:lnSpc>
+              <a:spcBef>
+                <a:spcPts val="200"/>
+              </a:spcBef>
+              <a:spcAft>
+                <a:spcPts val="400"/>
+              </a:spcAft>
+              <a:buClr>
+                <a:schemeClr val="accent1"/>
+              </a:buClr>
+              <a:buFont typeface="Calibri" pitchFamily="34" charset="0"/>
+              <a:buChar char="◦"/>
+              <a:defRPr sz="1400" kern="1200">
+                <a:solidFill>
+                  <a:schemeClr val="tx1">
+                    <a:lumMod val="75000"/>
+                    <a:lumOff val="25000"/>
+                  </a:schemeClr>
+                </a:solidFill>
+                <a:latin typeface="+mn-lt"/>
+                <a:ea typeface="+mn-ea"/>
+                <a:cs typeface="+mn-cs"/>
+              </a:defRPr>
+            </a:lvl8pPr>
+            <a:lvl9pPr marL="1700000" indent="-228600" algn="l" defTabSz="914400" rtl="0" eaLnBrk="1" latinLnBrk="0" hangingPunct="1">
+              <a:lnSpc>
+                <a:spcPct val="90000"/>
+              </a:lnSpc>
+              <a:spcBef>
+                <a:spcPts val="200"/>
+              </a:spcBef>
+              <a:spcAft>
+                <a:spcPts val="400"/>
+              </a:spcAft>
+              <a:buClr>
+                <a:schemeClr val="accent1"/>
+              </a:buClr>
+              <a:buFont typeface="Calibri" pitchFamily="34" charset="0"/>
+              <a:buChar char="◦"/>
+              <a:defRPr sz="1400" kern="1200">
+                <a:solidFill>
+                  <a:schemeClr val="tx1">
+                    <a:lumMod val="75000"/>
+                    <a:lumOff val="25000"/>
+                  </a:schemeClr>
+                </a:solidFill>
+                <a:latin typeface="+mn-lt"/>
+                <a:ea typeface="+mn-ea"/>
+                <a:cs typeface="+mn-cs"/>
+              </a:defRPr>
+            </a:lvl9pPr>
+          </a:lstStyle>
+          <a:p>
+            <a:r>
+              <a:rPr lang="it-IT" dirty="0" smtClean="0"/>
+              <a:t>Le analisi sono state condotte tramite il linguaggio di programmazione per l’analisi statistica R versione 3.3.3, per Windows.</a:t>
+            </a:r>
+          </a:p>
+          <a:p>
+            <a:r>
+              <a:rPr lang="it-IT" dirty="0" smtClean="0"/>
+              <a:t>Per l’analisi della sopravvivenza sono stati adoperati i </a:t>
+            </a:r>
+            <a:r>
+              <a:rPr lang="it-IT" dirty="0" err="1" smtClean="0"/>
+              <a:t>pachetti</a:t>
+            </a:r>
+            <a:r>
+              <a:rPr lang="it-IT" dirty="0" smtClean="0"/>
+              <a:t> ‘</a:t>
+            </a:r>
+            <a:r>
+              <a:rPr lang="it-IT" dirty="0" err="1" smtClean="0"/>
+              <a:t>Epicalc</a:t>
+            </a:r>
+            <a:r>
+              <a:rPr lang="it-IT" dirty="0" smtClean="0"/>
+              <a:t>’ e ‘</a:t>
+            </a:r>
+            <a:r>
+              <a:rPr lang="it-IT" dirty="0" err="1" smtClean="0"/>
+              <a:t>Survival</a:t>
+            </a:r>
+            <a:r>
+              <a:rPr lang="it-IT" dirty="0" smtClean="0"/>
+              <a:t>’.</a:t>
+            </a:r>
+          </a:p>
+          <a:p>
+            <a:r>
+              <a:rPr lang="it-IT" dirty="0" smtClean="0"/>
+              <a:t>I grafici sono stati realizzati con il pacchetto ‘ggplot2’. </a:t>
+            </a:r>
+            <a:endParaRPr lang="it-IT" dirty="0" smtClean="0"/>
+          </a:p>
+        </p:txBody>
+      </p:sp>
+    </p:spTree>
+    <p:extLst>
+      <p:ext uri="{BB962C8B-B14F-4D97-AF65-F5344CB8AC3E}">
+        <p14:creationId xmlns:p14="http://schemas.microsoft.com/office/powerpoint/2010/main" val="322613582"/>
+      </p:ext>
+    </p:extLst>
+  </p:cSld>
+  <p:clrMapOvr>
+    <a:masterClrMapping/>
+  </p:clrMapOvr>
+</p:sld>
+</file>
+
+<file path=ppt/slides/slide8.xml><?xml version="1.0" encoding="utf-8"?>
+<p:sld xmlns:a="http://schemas.openxmlformats.org/drawingml/2006/main" xmlns:r="http://schemas.openxmlformats.org/officeDocument/2006/relationships" xmlns:p="http://schemas.openxmlformats.org/presentationml/2006/main">
+  <p:cSld>
+    <p:spTree>
+      <p:nvGrpSpPr>
+        <p:cNvPr id="1" name=""/>
+        <p:cNvGrpSpPr/>
+        <p:nvPr/>
+      </p:nvGrpSpPr>
+      <p:grpSpPr>
+        <a:xfrm>
+          <a:off x="0" y="0"/>
+          <a:ext cx="0" cy="0"/>
+          <a:chOff x="0" y="0"/>
+          <a:chExt cx="0" cy="0"/>
+        </a:xfrm>
+      </p:grpSpPr>
+      <p:pic>
+        <p:nvPicPr>
+          <p:cNvPr id="3" name="Immagine 2"/>
+          <p:cNvPicPr>
+            <a:picLocks noChangeAspect="1"/>
+          </p:cNvPicPr>
+          <p:nvPr/>
+        </p:nvPicPr>
+        <p:blipFill>
+          <a:blip r:embed="rId3"/>
+          <a:stretch>
+            <a:fillRect/>
+          </a:stretch>
+        </p:blipFill>
+        <p:spPr>
+          <a:xfrm>
+            <a:off x="347240" y="112930"/>
+            <a:ext cx="11320041" cy="6196544"/>
+          </a:xfrm>
+          <a:prstGeom prst="rect">
+            <a:avLst/>
+          </a:prstGeom>
+        </p:spPr>
+      </p:pic>
+    </p:spTree>
+    <p:extLst>
+      <p:ext uri="{BB962C8B-B14F-4D97-AF65-F5344CB8AC3E}">
+        <p14:creationId xmlns:p14="http://schemas.microsoft.com/office/powerpoint/2010/main" val="3898262473"/>
+      </p:ext>
+    </p:extLst>
+  </p:cSld>
+  <p:clrMapOvr>
+    <a:masterClrMapping/>
+  </p:clrMapOvr>
+</p:sld>
+</file>
+
+<file path=ppt/slides/slide9.xml><?xml version="1.0" encoding="utf-8"?>
+<p:sld xmlns:a="http://schemas.openxmlformats.org/drawingml/2006/main" xmlns:r="http://schemas.openxmlformats.org/officeDocument/2006/relationships" xmlns:p="http://schemas.openxmlformats.org/presentationml/2006/main">
+  <p:cSld>
+    <p:spTree>
+      <p:nvGrpSpPr>
+        <p:cNvPr id="1" name=""/>
+        <p:cNvGrpSpPr/>
+        <p:nvPr/>
+      </p:nvGrpSpPr>
+      <p:grpSpPr>
+        <a:xfrm>
+          <a:off x="0" y="0"/>
+          <a:ext cx="0" cy="0"/>
+          <a:chOff x="0" y="0"/>
+          <a:chExt cx="0" cy="0"/>
+        </a:xfrm>
+      </p:grpSpPr>
+      <p:pic>
+        <p:nvPicPr>
+          <p:cNvPr id="2" name="Immagine 1"/>
+          <p:cNvPicPr>
+            <a:picLocks noChangeAspect="1"/>
+          </p:cNvPicPr>
+          <p:nvPr/>
+        </p:nvPicPr>
+        <p:blipFill>
+          <a:blip r:embed="rId3"/>
+          <a:stretch>
+            <a:fillRect/>
+          </a:stretch>
+        </p:blipFill>
+        <p:spPr>
+          <a:xfrm>
+            <a:off x="423255" y="196771"/>
+            <a:ext cx="11058831" cy="6053558"/>
+          </a:xfrm>
+          <a:prstGeom prst="rect">
+            <a:avLst/>
+          </a:prstGeom>
+        </p:spPr>
+      </p:pic>
+    </p:spTree>
+    <p:extLst>
+      <p:ext uri="{BB962C8B-B14F-4D97-AF65-F5344CB8AC3E}">
+        <p14:creationId xmlns:p14="http://schemas.microsoft.com/office/powerpoint/2010/main" val="4050836725"/>
+      </p:ext>
+    </p:extLst>
+  </p:cSld>
+  <p:clrMapOvr>
+    <a:masterClrMapping/>
+  </p:clrMapOvr>
 </p:sld>
 </file>
 

</xml_diff>

<commit_message>
Aggiunta l'età, il modello è migliorato
</commit_message>
<xml_diff>
--- a/2017-5 - 10 gruppo 8.pptx
+++ b/2017-5 - 10 gruppo 8.pptx
@@ -5,7 +5,7 @@
     <p:sldMasterId id="2147483732" r:id="rId1"/>
   </p:sldMasterIdLst>
   <p:notesMasterIdLst>
-    <p:notesMasterId r:id="rId19"/>
+    <p:notesMasterId r:id="rId21"/>
   </p:notesMasterIdLst>
   <p:sldIdLst>
     <p:sldId id="256" r:id="rId2"/>
@@ -25,6 +25,8 @@
     <p:sldId id="277" r:id="rId16"/>
     <p:sldId id="279" r:id="rId17"/>
     <p:sldId id="280" r:id="rId18"/>
+    <p:sldId id="282" r:id="rId19"/>
+    <p:sldId id="283" r:id="rId20"/>
   </p:sldIdLst>
   <p:sldSz cx="12192000" cy="6858000"/>
   <p:notesSz cx="6858000" cy="9144000"/>
@@ -157,6 +159,8 @@
           <p14:sldIdLst>
             <p14:sldId id="279"/>
             <p14:sldId id="280"/>
+            <p14:sldId id="282"/>
+            <p14:sldId id="283"/>
           </p14:sldIdLst>
         </p14:section>
       </p14:sectionLst>
@@ -166,6 +170,10 @@
     </p:ext>
   </p:extLst>
 </p:presentation>
+</file>
+
+<file path=ppt/revisionInfo.xml><?xml version="1.0" encoding="utf-8"?>
+<p1510:revInfo xmlns:a="http://schemas.openxmlformats.org/drawingml/2006/main" xmlns:r="http://schemas.openxmlformats.org/officeDocument/2006/relationships" xmlns:p1510="http://schemas.microsoft.com/office/powerpoint/2015/10/main"/>
 </file>
 
 <file path=ppt/notesMasters/notesMaster1.xml><?xml version="1.0" encoding="utf-8"?>
@@ -250,7 +258,7 @@
           <a:p>
             <a:fld id="{0679B769-5A28-446B-BCC4-FA0AD2C4FFEB}" type="datetimeFigureOut">
               <a:rPr lang="it-IT" smtClean="0"/>
-              <a:t>05/05/2017</a:t>
+              <a:t>08/05/2017</a:t>
             </a:fld>
             <a:endParaRPr lang="it-IT"/>
           </a:p>
@@ -314,38 +322,37 @@
           <a:p>
             <a:pPr lvl="0"/>
             <a:r>
-              <a:rPr lang="it-IT" smtClean="0"/>
+              <a:rPr lang="it-IT"/>
               <a:t>Modifica gli stili del testo dello schema</a:t>
             </a:r>
           </a:p>
           <a:p>
             <a:pPr lvl="1"/>
             <a:r>
-              <a:rPr lang="it-IT" smtClean="0"/>
+              <a:rPr lang="it-IT"/>
               <a:t>Secondo livello</a:t>
             </a:r>
           </a:p>
           <a:p>
             <a:pPr lvl="2"/>
             <a:r>
-              <a:rPr lang="it-IT" smtClean="0"/>
+              <a:rPr lang="it-IT"/>
               <a:t>Terzo livello</a:t>
             </a:r>
           </a:p>
           <a:p>
             <a:pPr lvl="3"/>
             <a:r>
-              <a:rPr lang="it-IT" smtClean="0"/>
+              <a:rPr lang="it-IT"/>
               <a:t>Quarto livello</a:t>
             </a:r>
           </a:p>
           <a:p>
             <a:pPr lvl="4"/>
             <a:r>
-              <a:rPr lang="it-IT" smtClean="0"/>
+              <a:rPr lang="it-IT"/>
               <a:t>Quinto livello</a:t>
             </a:r>
-            <a:endParaRPr lang="it-IT"/>
           </a:p>
         </p:txBody>
       </p:sp>
@@ -563,43 +570,43 @@
           <a:lstStyle/>
           <a:p>
             <a:r>
-              <a:rPr lang="it-IT" dirty="0" smtClean="0"/>
+              <a:rPr lang="it-IT" dirty="0"/>
               <a:t>I</a:t>
             </a:r>
             <a:r>
-              <a:rPr lang="it-IT" baseline="0" dirty="0" smtClean="0"/>
+              <a:rPr lang="it-IT" baseline="0" dirty="0"/>
               <a:t> sessi sono ben ripartiti. Con 1 abbiamo gli uomini, con 2 le donne.</a:t>
             </a:r>
           </a:p>
           <a:p>
             <a:r>
-              <a:rPr lang="it-IT" u="none" dirty="0" smtClean="0"/>
+              <a:rPr lang="it-IT" u="none" dirty="0"/>
               <a:t>Come vediamo</a:t>
             </a:r>
             <a:r>
-              <a:rPr lang="it-IT" u="none" baseline="0" dirty="0" smtClean="0"/>
+              <a:rPr lang="it-IT" u="none" baseline="0" dirty="0"/>
               <a:t> dall’istogramma le età si distribuiscono tendendo alle classi più anziane. </a:t>
             </a:r>
           </a:p>
           <a:p>
             <a:r>
-              <a:rPr lang="it-IT" u="none" baseline="0" dirty="0" smtClean="0"/>
+              <a:rPr lang="it-IT" u="none" baseline="0" dirty="0"/>
               <a:t>La media delle età è di 73 anni, mentre la mediana di 76.  Tramite il test di </a:t>
             </a:r>
             <a:r>
-              <a:rPr lang="it-IT" u="none" baseline="0" dirty="0" err="1" smtClean="0"/>
+              <a:rPr lang="it-IT" u="none" baseline="0" dirty="0" err="1"/>
               <a:t>Shapiro</a:t>
             </a:r>
             <a:r>
-              <a:rPr lang="it-IT" u="none" baseline="0" dirty="0" smtClean="0"/>
+              <a:rPr lang="it-IT" u="none" baseline="0" dirty="0"/>
               <a:t> </a:t>
             </a:r>
             <a:r>
-              <a:rPr lang="it-IT" u="none" baseline="0" dirty="0" err="1" smtClean="0"/>
+              <a:rPr lang="it-IT" u="none" baseline="0" dirty="0" err="1"/>
               <a:t>Willks</a:t>
             </a:r>
             <a:r>
-              <a:rPr lang="it-IT" u="none" baseline="0" dirty="0" smtClean="0"/>
+              <a:rPr lang="it-IT" u="none" baseline="0" dirty="0"/>
               <a:t> viene rifiutata l’ipotesi di normalità con intervalli di confidenza del 99%.</a:t>
             </a:r>
           </a:p>
@@ -703,7 +710,7 @@
               <a:defRPr/>
             </a:pPr>
             <a:r>
-              <a:rPr lang="nn-NO" sz="1200" b="0" i="0" u="none" strike="noStrike" kern="1200" baseline="0" dirty="0" smtClean="0">
+              <a:rPr lang="nn-NO" sz="1200" b="0" i="0" u="none" strike="noStrike" kern="1200" baseline="0" dirty="0">
                 <a:solidFill>
                   <a:schemeClr val="tx1"/>
                 </a:solidFill>
@@ -713,15 +720,15 @@
               </a:rPr>
               <a:t>Dallo studio condotto da N. C. Arslan, S. Sokmen vediamo che le curve di sopravvienza per LNR sono compatibili (le nostre a destra). </a:t>
             </a:r>
-            <a:endParaRPr lang="it-IT" dirty="0" smtClean="0"/>
-          </a:p>
-          <a:p>
-            <a:r>
-              <a:rPr lang="it-IT" dirty="0" smtClean="0"/>
+            <a:endParaRPr lang="it-IT" dirty="0"/>
+          </a:p>
+          <a:p>
+            <a:r>
+              <a:rPr lang="it-IT" dirty="0"/>
               <a:t>Da questo</a:t>
             </a:r>
             <a:r>
-              <a:rPr lang="it-IT" baseline="0" dirty="0" smtClean="0"/>
+              <a:rPr lang="it-IT" baseline="0" dirty="0"/>
               <a:t> possiamo dire che l’analisi da noi condotta conferma lo studio precedentemente citato. </a:t>
             </a:r>
             <a:endParaRPr lang="it-IT" dirty="0"/>
@@ -809,19 +816,19 @@
           <a:lstStyle/>
           <a:p>
             <a:r>
-              <a:rPr lang="it-IT" dirty="0" smtClean="0"/>
+              <a:rPr lang="it-IT" dirty="0"/>
               <a:t>Queste sono le curve della</a:t>
             </a:r>
             <a:r>
-              <a:rPr lang="it-IT" baseline="0" dirty="0" smtClean="0"/>
+              <a:rPr lang="it-IT" baseline="0" dirty="0"/>
               <a:t> sopravvivenza per il </a:t>
             </a:r>
             <a:r>
-              <a:rPr lang="it-IT" baseline="0" dirty="0" err="1" smtClean="0"/>
+              <a:rPr lang="it-IT" baseline="0" dirty="0" err="1"/>
               <a:t>disease</a:t>
             </a:r>
             <a:r>
-              <a:rPr lang="it-IT" baseline="0" dirty="0" smtClean="0"/>
+              <a:rPr lang="it-IT" baseline="0" dirty="0"/>
               <a:t> free. Anche in questo caso notiamo che la classe LNR 2 e la classe LODDS 2 sono significativamente differenti rispetto ai restanti. </a:t>
             </a:r>
             <a:endParaRPr lang="it-IT" dirty="0"/>
@@ -909,19 +916,19 @@
           <a:lstStyle/>
           <a:p>
             <a:r>
-              <a:rPr lang="it-IT" dirty="0" smtClean="0"/>
+              <a:rPr lang="it-IT" dirty="0"/>
               <a:t>Abbiamo</a:t>
             </a:r>
             <a:r>
-              <a:rPr lang="it-IT" baseline="0" dirty="0" smtClean="0"/>
+              <a:rPr lang="it-IT" baseline="0" dirty="0"/>
               <a:t> modo di credere che l’ipotesi dei rischi proporzionali non sia rispettata. Pertanto il modello di </a:t>
             </a:r>
             <a:r>
-              <a:rPr lang="it-IT" baseline="0" dirty="0" err="1" smtClean="0"/>
+              <a:rPr lang="it-IT" baseline="0" dirty="0" err="1"/>
               <a:t>Cox</a:t>
             </a:r>
             <a:r>
-              <a:rPr lang="it-IT" baseline="0" dirty="0" smtClean="0"/>
+              <a:rPr lang="it-IT" baseline="0" dirty="0"/>
               <a:t> che stiamo per proporre probabilmente è errato.</a:t>
             </a:r>
             <a:endParaRPr lang="it-IT" dirty="0"/>
@@ -1013,41 +1020,41 @@
               <a:buChar char="•"/>
             </a:pPr>
             <a:r>
-              <a:rPr lang="it-IT" dirty="0" smtClean="0"/>
+              <a:rPr lang="it-IT" dirty="0"/>
               <a:t>Come già visto, il coefficiente riferito alla classe 1 di LNR non è significativo.</a:t>
             </a:r>
             <a:r>
-              <a:rPr lang="it-IT" baseline="0" dirty="0" smtClean="0"/>
+              <a:rPr lang="it-IT" baseline="0" dirty="0"/>
               <a:t> </a:t>
             </a:r>
             <a:r>
-              <a:rPr lang="it-IT" b="1" dirty="0" smtClean="0"/>
+              <a:rPr lang="it-IT" b="1" dirty="0"/>
               <a:t>Il coefficiente relativo alla classe 2, invece, risulta essere significativo. </a:t>
             </a:r>
             <a:r>
-              <a:rPr lang="it-IT" dirty="0" smtClean="0"/>
+              <a:rPr lang="it-IT" dirty="0"/>
               <a:t>L'</a:t>
             </a:r>
             <a:r>
-              <a:rPr lang="it-IT" dirty="0" err="1" smtClean="0"/>
+              <a:rPr lang="it-IT" dirty="0" err="1"/>
               <a:t>hazard</a:t>
             </a:r>
             <a:r>
-              <a:rPr lang="it-IT" dirty="0" smtClean="0"/>
+              <a:rPr lang="it-IT" dirty="0"/>
               <a:t> ratio risulta essere, infatti, di 3.055</a:t>
             </a:r>
             <a:r>
-              <a:rPr lang="it-IT" baseline="0" dirty="0" smtClean="0"/>
+              <a:rPr lang="it-IT" baseline="0" dirty="0"/>
               <a:t> </a:t>
             </a:r>
             <a:r>
-              <a:rPr lang="it-IT" dirty="0" smtClean="0"/>
+              <a:rPr lang="it-IT" dirty="0"/>
               <a:t>con valori che oscillano tra 1.89 e 4.9 con intervalli di confidenza del 95%</a:t>
             </a:r>
             <a:br>
-              <a:rPr lang="it-IT" dirty="0" smtClean="0"/>
+              <a:rPr lang="it-IT" dirty="0"/>
             </a:br>
-            <a:endParaRPr lang="it-IT" dirty="0" smtClean="0"/>
+            <a:endParaRPr lang="it-IT" dirty="0"/>
           </a:p>
           <a:p>
             <a:pPr marL="171450" indent="-171450">
@@ -1055,26 +1062,25 @@
               <a:buChar char="•"/>
             </a:pPr>
             <a:r>
-              <a:rPr lang="it-IT" dirty="0" smtClean="0"/>
+              <a:rPr lang="it-IT" dirty="0"/>
               <a:t>Situazione analoga per LODDS. La prima classe non risulta significativa pe </a:t>
             </a:r>
             <a:r>
-              <a:rPr lang="it-IT" dirty="0" err="1" smtClean="0"/>
+              <a:rPr lang="it-IT" dirty="0" err="1"/>
               <a:t>run</a:t>
             </a:r>
             <a:r>
-              <a:rPr lang="it-IT" dirty="0" smtClean="0"/>
+              <a:rPr lang="it-IT" dirty="0"/>
               <a:t> intervallo di confidenza del 95%. </a:t>
             </a:r>
             <a:r>
-              <a:rPr lang="it-IT" b="1" dirty="0" smtClean="0"/>
+              <a:rPr lang="it-IT" b="1" dirty="0"/>
               <a:t>La classe 2, invece, è significativa,</a:t>
             </a:r>
             <a:r>
-              <a:rPr lang="it-IT" dirty="0" smtClean="0"/>
+              <a:rPr lang="it-IT" dirty="0"/>
               <a:t> con un HR di 3.8, con intervalli di confidenza al 95% che oscillano da 2.257 a 6.396</a:t>
             </a:r>
-            <a:endParaRPr lang="it-IT" dirty="0"/>
           </a:p>
         </p:txBody>
       </p:sp>
@@ -1105,6 +1111,188 @@
     <p:extLst>
       <p:ext uri="{BB962C8B-B14F-4D97-AF65-F5344CB8AC3E}">
         <p14:creationId xmlns:p14="http://schemas.microsoft.com/office/powerpoint/2010/main" val="2655930392"/>
+      </p:ext>
+    </p:extLst>
+  </p:cSld>
+  <p:clrMapOvr>
+    <a:masterClrMapping/>
+  </p:clrMapOvr>
+</p:notes>
+</file>
+
+<file path=ppt/notesSlides/notesSlide14.xml><?xml version="1.0" encoding="utf-8"?>
+<p:notes xmlns:a="http://schemas.openxmlformats.org/drawingml/2006/main" xmlns:r="http://schemas.openxmlformats.org/officeDocument/2006/relationships" xmlns:p="http://schemas.openxmlformats.org/presentationml/2006/main">
+  <p:cSld>
+    <p:spTree>
+      <p:nvGrpSpPr>
+        <p:cNvPr id="1" name=""/>
+        <p:cNvGrpSpPr/>
+        <p:nvPr/>
+      </p:nvGrpSpPr>
+      <p:grpSpPr>
+        <a:xfrm>
+          <a:off x="0" y="0"/>
+          <a:ext cx="0" cy="0"/>
+          <a:chOff x="0" y="0"/>
+          <a:chExt cx="0" cy="0"/>
+        </a:xfrm>
+      </p:grpSpPr>
+      <p:sp>
+        <p:nvSpPr>
+          <p:cNvPr id="2" name="Segnaposto immagine diapositiva 1"/>
+          <p:cNvSpPr>
+            <a:spLocks noGrp="1" noRot="1" noChangeAspect="1"/>
+          </p:cNvSpPr>
+          <p:nvPr>
+            <p:ph type="sldImg"/>
+          </p:nvPr>
+        </p:nvSpPr>
+        <p:spPr/>
+      </p:sp>
+      <p:sp>
+        <p:nvSpPr>
+          <p:cNvPr id="3" name="Segnaposto note 2"/>
+          <p:cNvSpPr>
+            <a:spLocks noGrp="1"/>
+          </p:cNvSpPr>
+          <p:nvPr>
+            <p:ph type="body" idx="1"/>
+          </p:nvPr>
+        </p:nvSpPr>
+        <p:spPr/>
+        <p:txBody>
+          <a:bodyPr/>
+          <a:lstStyle/>
+          <a:p>
+            <a:r>
+              <a:rPr lang="it-IT" dirty="0"/>
+              <a:t>Il modello soffre chiaramente di </a:t>
+            </a:r>
+            <a:r>
+              <a:rPr lang="it-IT" dirty="0" err="1"/>
+              <a:t>overfitting</a:t>
+            </a:r>
+            <a:r>
+              <a:rPr lang="it-IT" dirty="0"/>
+              <a:t>.</a:t>
+            </a:r>
+          </a:p>
+          <a:p>
+            <a:endParaRPr lang="it-IT" dirty="0"/>
+          </a:p>
+        </p:txBody>
+      </p:sp>
+      <p:sp>
+        <p:nvSpPr>
+          <p:cNvPr id="4" name="Segnaposto numero diapositiva 3"/>
+          <p:cNvSpPr>
+            <a:spLocks noGrp="1"/>
+          </p:cNvSpPr>
+          <p:nvPr>
+            <p:ph type="sldNum" sz="quarter" idx="10"/>
+          </p:nvPr>
+        </p:nvSpPr>
+        <p:spPr/>
+        <p:txBody>
+          <a:bodyPr/>
+          <a:lstStyle/>
+          <a:p>
+            <a:fld id="{BA521C96-A9D3-4B92-95F8-5669AF865DB6}" type="slidenum">
+              <a:rPr lang="it-IT" smtClean="0"/>
+              <a:t>18</a:t>
+            </a:fld>
+            <a:endParaRPr lang="it-IT"/>
+          </a:p>
+        </p:txBody>
+      </p:sp>
+    </p:spTree>
+    <p:extLst>
+      <p:ext uri="{BB962C8B-B14F-4D97-AF65-F5344CB8AC3E}">
+        <p14:creationId xmlns:p14="http://schemas.microsoft.com/office/powerpoint/2010/main" val="4111585556"/>
+      </p:ext>
+    </p:extLst>
+  </p:cSld>
+  <p:clrMapOvr>
+    <a:masterClrMapping/>
+  </p:clrMapOvr>
+</p:notes>
+</file>
+
+<file path=ppt/notesSlides/notesSlide15.xml><?xml version="1.0" encoding="utf-8"?>
+<p:notes xmlns:a="http://schemas.openxmlformats.org/drawingml/2006/main" xmlns:r="http://schemas.openxmlformats.org/officeDocument/2006/relationships" xmlns:p="http://schemas.openxmlformats.org/presentationml/2006/main">
+  <p:cSld>
+    <p:spTree>
+      <p:nvGrpSpPr>
+        <p:cNvPr id="1" name=""/>
+        <p:cNvGrpSpPr/>
+        <p:nvPr/>
+      </p:nvGrpSpPr>
+      <p:grpSpPr>
+        <a:xfrm>
+          <a:off x="0" y="0"/>
+          <a:ext cx="0" cy="0"/>
+          <a:chOff x="0" y="0"/>
+          <a:chExt cx="0" cy="0"/>
+        </a:xfrm>
+      </p:grpSpPr>
+      <p:sp>
+        <p:nvSpPr>
+          <p:cNvPr id="2" name="Segnaposto immagine diapositiva 1"/>
+          <p:cNvSpPr>
+            <a:spLocks noGrp="1" noRot="1" noChangeAspect="1"/>
+          </p:cNvSpPr>
+          <p:nvPr>
+            <p:ph type="sldImg"/>
+          </p:nvPr>
+        </p:nvSpPr>
+        <p:spPr/>
+      </p:sp>
+      <p:sp>
+        <p:nvSpPr>
+          <p:cNvPr id="3" name="Segnaposto note 2"/>
+          <p:cNvSpPr>
+            <a:spLocks noGrp="1"/>
+          </p:cNvSpPr>
+          <p:nvPr>
+            <p:ph type="body" idx="1"/>
+          </p:nvPr>
+        </p:nvSpPr>
+        <p:spPr/>
+        <p:txBody>
+          <a:bodyPr/>
+          <a:lstStyle/>
+          <a:p>
+            <a:endParaRPr lang="it-IT" dirty="0"/>
+          </a:p>
+        </p:txBody>
+      </p:sp>
+      <p:sp>
+        <p:nvSpPr>
+          <p:cNvPr id="4" name="Segnaposto numero diapositiva 3"/>
+          <p:cNvSpPr>
+            <a:spLocks noGrp="1"/>
+          </p:cNvSpPr>
+          <p:nvPr>
+            <p:ph type="sldNum" sz="quarter" idx="10"/>
+          </p:nvPr>
+        </p:nvSpPr>
+        <p:spPr/>
+        <p:txBody>
+          <a:bodyPr/>
+          <a:lstStyle/>
+          <a:p>
+            <a:fld id="{BA521C96-A9D3-4B92-95F8-5669AF865DB6}" type="slidenum">
+              <a:rPr lang="it-IT" smtClean="0"/>
+              <a:t>19</a:t>
+            </a:fld>
+            <a:endParaRPr lang="it-IT"/>
+          </a:p>
+        </p:txBody>
+      </p:sp>
+    </p:spTree>
+    <p:extLst>
+      <p:ext uri="{BB962C8B-B14F-4D97-AF65-F5344CB8AC3E}">
+        <p14:creationId xmlns:p14="http://schemas.microsoft.com/office/powerpoint/2010/main" val="4182354152"/>
       </p:ext>
     </p:extLst>
   </p:cSld>
@@ -1159,11 +1347,11 @@
           <a:lstStyle/>
           <a:p>
             <a:r>
-              <a:rPr lang="it-IT" dirty="0" smtClean="0"/>
+              <a:rPr lang="it-IT" dirty="0"/>
               <a:t>Più</a:t>
             </a:r>
             <a:r>
-              <a:rPr lang="it-IT" baseline="0" dirty="0" smtClean="0"/>
+              <a:rPr lang="it-IT" baseline="0" dirty="0"/>
               <a:t> della metà della popolazione oggetto di studio è deceduta prima della fine dello studio. </a:t>
             </a:r>
           </a:p>
@@ -1186,7 +1374,7 @@
               <a:defRPr/>
             </a:pPr>
             <a:r>
-              <a:rPr lang="it-IT" sz="1200" dirty="0" smtClean="0"/>
+              <a:rPr lang="it-IT" sz="1200" dirty="0"/>
               <a:t>Sono definiti come deceduti tutti coloro che presentavano una data di morte.</a:t>
             </a:r>
           </a:p>
@@ -1273,70 +1461,70 @@
           <a:lstStyle/>
           <a:p>
             <a:r>
-              <a:rPr lang="it-IT" dirty="0" err="1" smtClean="0"/>
+              <a:rPr lang="it-IT" dirty="0" err="1"/>
               <a:t>Linfonode</a:t>
             </a:r>
             <a:r>
-              <a:rPr lang="it-IT" baseline="0" dirty="0" err="1" smtClean="0"/>
+              <a:rPr lang="it-IT" baseline="0" dirty="0" err="1"/>
               <a:t>s</a:t>
             </a:r>
             <a:r>
-              <a:rPr lang="it-IT" baseline="0" dirty="0" smtClean="0"/>
+              <a:rPr lang="it-IT" baseline="0" dirty="0"/>
               <a:t> Ratio e Log-</a:t>
             </a:r>
             <a:r>
-              <a:rPr lang="it-IT" baseline="0" dirty="0" err="1" smtClean="0"/>
+              <a:rPr lang="it-IT" baseline="0" dirty="0" err="1"/>
               <a:t>Odds</a:t>
             </a:r>
             <a:r>
-              <a:rPr lang="it-IT" baseline="0" dirty="0" smtClean="0"/>
+              <a:rPr lang="it-IT" baseline="0" dirty="0"/>
               <a:t> </a:t>
             </a:r>
             <a:r>
-              <a:rPr lang="it-IT" baseline="0" dirty="0" err="1" smtClean="0"/>
+              <a:rPr lang="it-IT" baseline="0" dirty="0" err="1"/>
               <a:t>Linfonodes</a:t>
             </a:r>
-            <a:endParaRPr lang="it-IT" baseline="0" dirty="0" smtClean="0"/>
-          </a:p>
-          <a:p>
-            <a:r>
-              <a:rPr lang="it-IT" dirty="0" smtClean="0"/>
+            <a:endParaRPr lang="it-IT" baseline="0" dirty="0"/>
+          </a:p>
+          <a:p>
+            <a:r>
+              <a:rPr lang="it-IT" dirty="0"/>
               <a:t>Ogni </a:t>
             </a:r>
             <a:r>
-              <a:rPr lang="it-IT" dirty="0" err="1" smtClean="0"/>
+              <a:rPr lang="it-IT" dirty="0" err="1"/>
               <a:t>varibile</a:t>
             </a:r>
             <a:r>
-              <a:rPr lang="it-IT" baseline="0" dirty="0" smtClean="0"/>
+              <a:rPr lang="it-IT" baseline="0" dirty="0"/>
               <a:t> presentava tre modalità. La correlazione tra le due </a:t>
             </a:r>
             <a:r>
-              <a:rPr lang="it-IT" baseline="0" dirty="0" err="1" smtClean="0"/>
+              <a:rPr lang="it-IT" baseline="0" dirty="0" err="1"/>
               <a:t>varibili</a:t>
             </a:r>
             <a:r>
-              <a:rPr lang="it-IT" baseline="0" dirty="0" smtClean="0"/>
+              <a:rPr lang="it-IT" baseline="0" dirty="0"/>
               <a:t> risulta essere di 0.88</a:t>
             </a:r>
           </a:p>
           <a:p>
             <a:r>
-              <a:rPr lang="it-IT" baseline="0" dirty="0" smtClean="0"/>
+              <a:rPr lang="it-IT" baseline="0" dirty="0"/>
               <a:t>Questo perché LODDS è una trasformazione lineare di LNR. </a:t>
             </a:r>
           </a:p>
           <a:p>
             <a:r>
-              <a:rPr lang="it-IT" baseline="0" dirty="0" smtClean="0"/>
+              <a:rPr lang="it-IT" baseline="0" dirty="0"/>
               <a:t>Secondo il </a:t>
             </a:r>
             <a:r>
-              <a:rPr lang="it-IT" baseline="0" dirty="0" err="1" smtClean="0"/>
+              <a:rPr lang="it-IT" baseline="0" dirty="0" err="1"/>
               <a:t>paper</a:t>
             </a:r>
             <a:r>
-              <a:rPr lang="it-IT" baseline="0" dirty="0" smtClean="0"/>
+              <a:rPr lang="it-IT" baseline="0" dirty="0"/>
               <a:t>:</a:t>
             </a:r>
             <a:endParaRPr lang="it-IT" dirty="0"/>
@@ -1424,19 +1612,19 @@
           <a:lstStyle/>
           <a:p>
             <a:r>
-              <a:rPr lang="it-IT" dirty="0" smtClean="0"/>
+              <a:rPr lang="it-IT" dirty="0"/>
               <a:t>Questa</a:t>
             </a:r>
             <a:r>
-              <a:rPr lang="it-IT" baseline="0" dirty="0" smtClean="0"/>
+              <a:rPr lang="it-IT" baseline="0" dirty="0"/>
               <a:t> è la funzione di </a:t>
             </a:r>
             <a:r>
-              <a:rPr lang="it-IT" baseline="0" dirty="0" err="1" smtClean="0"/>
+              <a:rPr lang="it-IT" baseline="0" dirty="0" err="1"/>
               <a:t>sopravvienza</a:t>
             </a:r>
             <a:r>
-              <a:rPr lang="it-IT" baseline="0" dirty="0" smtClean="0"/>
+              <a:rPr lang="it-IT" baseline="0" dirty="0"/>
               <a:t> generale.</a:t>
             </a:r>
             <a:endParaRPr lang="it-IT" dirty="0"/>
@@ -1541,45 +1729,45 @@
               <a:defRPr/>
             </a:pPr>
             <a:r>
-              <a:rPr lang="it-IT" dirty="0" smtClean="0"/>
+              <a:rPr lang="it-IT" dirty="0"/>
               <a:t>Questa</a:t>
             </a:r>
             <a:r>
-              <a:rPr lang="it-IT" baseline="0" dirty="0" smtClean="0"/>
+              <a:rPr lang="it-IT" baseline="0" dirty="0"/>
               <a:t> è la funzione di </a:t>
             </a:r>
             <a:r>
-              <a:rPr lang="it-IT" baseline="0" dirty="0" err="1" smtClean="0"/>
+              <a:rPr lang="it-IT" baseline="0" dirty="0" err="1"/>
               <a:t>sopravvienza</a:t>
             </a:r>
             <a:r>
-              <a:rPr lang="it-IT" baseline="0" dirty="0" smtClean="0"/>
+              <a:rPr lang="it-IT" baseline="0" dirty="0"/>
               <a:t> per quanto riguarda il </a:t>
             </a:r>
             <a:r>
-              <a:rPr lang="it-IT" baseline="0" dirty="0" err="1" smtClean="0"/>
+              <a:rPr lang="it-IT" baseline="0" dirty="0" err="1"/>
               <a:t>disease</a:t>
             </a:r>
             <a:r>
-              <a:rPr lang="it-IT" baseline="0" dirty="0" smtClean="0"/>
+              <a:rPr lang="it-IT" baseline="0" dirty="0"/>
               <a:t>-free. Ci accorgiamo che sul </a:t>
             </a:r>
             <a:r>
-              <a:rPr lang="it-IT" baseline="0" dirty="0" err="1" smtClean="0"/>
+              <a:rPr lang="it-IT" baseline="0" dirty="0" err="1"/>
               <a:t>disease</a:t>
             </a:r>
             <a:r>
-              <a:rPr lang="it-IT" baseline="0" dirty="0" smtClean="0"/>
+              <a:rPr lang="it-IT" baseline="0" dirty="0"/>
               <a:t> free la gran parte dei pazienti contrae una ricaduta. </a:t>
             </a:r>
             <a:br>
-              <a:rPr lang="it-IT" baseline="0" dirty="0" smtClean="0"/>
+              <a:rPr lang="it-IT" baseline="0" dirty="0"/>
             </a:br>
             <a:r>
-              <a:rPr lang="it-IT" baseline="0" dirty="0" smtClean="0"/>
+              <a:rPr lang="it-IT" baseline="0" dirty="0"/>
               <a:t>Inoltre il numero dei censurati è molto minore in questo caso.</a:t>
             </a:r>
-            <a:endParaRPr lang="it-IT" dirty="0" smtClean="0"/>
+            <a:endParaRPr lang="it-IT" dirty="0"/>
           </a:p>
           <a:p>
             <a:endParaRPr lang="it-IT" dirty="0"/>
@@ -1751,34 +1939,34 @@
           <a:lstStyle/>
           <a:p>
             <a:r>
-              <a:rPr lang="it-IT" dirty="0" smtClean="0"/>
+              <a:rPr lang="it-IT" dirty="0"/>
               <a:t>Questa è</a:t>
             </a:r>
             <a:r>
-              <a:rPr lang="it-IT" baseline="0" dirty="0" smtClean="0"/>
+              <a:rPr lang="it-IT" baseline="0" dirty="0"/>
               <a:t> la curva di </a:t>
             </a:r>
             <a:r>
-              <a:rPr lang="it-IT" baseline="0" dirty="0" err="1" smtClean="0"/>
+              <a:rPr lang="it-IT" baseline="0" dirty="0" err="1"/>
               <a:t>sopravvienza</a:t>
             </a:r>
             <a:r>
-              <a:rPr lang="it-IT" baseline="0" dirty="0" smtClean="0"/>
+              <a:rPr lang="it-IT" baseline="0" dirty="0"/>
               <a:t> per LNR come </a:t>
             </a:r>
             <a:r>
-              <a:rPr lang="it-IT" baseline="0" dirty="0" err="1" smtClean="0"/>
+              <a:rPr lang="it-IT" baseline="0" dirty="0" err="1"/>
               <a:t>covariata</a:t>
             </a:r>
             <a:r>
-              <a:rPr lang="it-IT" baseline="0" dirty="0" smtClean="0"/>
+              <a:rPr lang="it-IT" baseline="0" dirty="0"/>
               <a:t>. </a:t>
             </a:r>
             <a:br>
-              <a:rPr lang="it-IT" baseline="0" dirty="0" smtClean="0"/>
+              <a:rPr lang="it-IT" baseline="0" dirty="0"/>
             </a:br>
             <a:r>
-              <a:rPr lang="it-IT" baseline="0" dirty="0" smtClean="0"/>
+              <a:rPr lang="it-IT" baseline="0" dirty="0"/>
               <a:t>Da questo è possibile notare che:</a:t>
             </a:r>
           </a:p>
@@ -1788,7 +1976,7 @@
               <a:buChar char="•"/>
             </a:pPr>
             <a:r>
-              <a:rPr lang="it-IT" baseline="0" dirty="0" smtClean="0"/>
+              <a:rPr lang="it-IT" baseline="0" dirty="0"/>
               <a:t>I soggetti allo stadio 2 rendono a morire più rapidamente rispetto a quelli dei restanti due gruppi</a:t>
             </a:r>
           </a:p>
@@ -1798,23 +1986,23 @@
               <a:buChar char="•"/>
             </a:pPr>
             <a:r>
-              <a:rPr lang="it-IT" baseline="0" dirty="0" smtClean="0"/>
+              <a:rPr lang="it-IT" baseline="0" dirty="0"/>
               <a:t>I soggetti allo stadio 0 e 1 non sono significativamente differenti. Lo si vede chiaramente dagli intervalli di confidenza. Lo si nota anche dal modello di </a:t>
             </a:r>
             <a:r>
-              <a:rPr lang="it-IT" baseline="0" dirty="0" err="1" smtClean="0"/>
+              <a:rPr lang="it-IT" baseline="0" dirty="0" err="1"/>
               <a:t>Cox</a:t>
             </a:r>
             <a:r>
-              <a:rPr lang="it-IT" baseline="0" dirty="0" smtClean="0"/>
+              <a:rPr lang="it-IT" baseline="0" dirty="0"/>
               <a:t> </a:t>
             </a:r>
             <a:r>
-              <a:rPr lang="it-IT" baseline="0" dirty="0" err="1" smtClean="0"/>
+              <a:rPr lang="it-IT" baseline="0" dirty="0" err="1"/>
               <a:t>univariato</a:t>
             </a:r>
             <a:r>
-              <a:rPr lang="it-IT" baseline="0" dirty="0" smtClean="0"/>
+              <a:rPr lang="it-IT" baseline="0" dirty="0"/>
               <a:t>, che analizzeremo successivamente. </a:t>
             </a:r>
           </a:p>
@@ -1823,7 +2011,7 @@
               <a:buFont typeface="Arial" panose="020B0604020202020204" pitchFamily="34" charset="0"/>
               <a:buNone/>
             </a:pPr>
-            <a:endParaRPr lang="it-IT" baseline="0" dirty="0" smtClean="0"/>
+            <a:endParaRPr lang="it-IT" baseline="0" dirty="0"/>
           </a:p>
           <a:p>
             <a:pPr marL="0" marR="0" lvl="0" indent="0" algn="l" defTabSz="914400" rtl="0" eaLnBrk="1" fontAlgn="auto" latinLnBrk="0" hangingPunct="1">
@@ -1844,10 +2032,9 @@
               <a:defRPr/>
             </a:pPr>
             <a:r>
-              <a:rPr lang="it-IT" baseline="0" dirty="0" smtClean="0"/>
+              <a:rPr lang="it-IT" baseline="0" dirty="0"/>
               <a:t>Rifiutiamo l’ipotesi di uguaglianza tra le curve di sopravvivenza.</a:t>
             </a:r>
-            <a:endParaRPr lang="it-IT" baseline="0" dirty="0" smtClean="0"/>
           </a:p>
           <a:p>
             <a:pPr marL="0" indent="0">
@@ -1855,38 +2042,38 @@
               <a:buNone/>
             </a:pPr>
             <a:r>
-              <a:rPr lang="it-IT" dirty="0" smtClean="0"/>
+              <a:rPr lang="it-IT" dirty="0"/>
               <a:t>Log </a:t>
             </a:r>
             <a:r>
-              <a:rPr lang="it-IT" dirty="0" err="1" smtClean="0"/>
+              <a:rPr lang="it-IT" dirty="0" err="1"/>
               <a:t>Rank</a:t>
             </a:r>
             <a:r>
-              <a:rPr lang="it-IT" dirty="0" smtClean="0"/>
+              <a:rPr lang="it-IT" dirty="0"/>
               <a:t> </a:t>
             </a:r>
             <a:r>
-              <a:rPr lang="it-IT" dirty="0" err="1" smtClean="0"/>
+              <a:rPr lang="it-IT" dirty="0" err="1"/>
               <a:t>Tests</a:t>
             </a:r>
             <a:r>
-              <a:rPr lang="it-IT" dirty="0" smtClean="0"/>
+              <a:rPr lang="it-IT" dirty="0"/>
               <a:t>: </a:t>
             </a:r>
             <a:r>
-              <a:rPr lang="it-IT" dirty="0" err="1" smtClean="0"/>
+              <a:rPr lang="it-IT" dirty="0" err="1"/>
               <a:t>p.value</a:t>
             </a:r>
             <a:r>
-              <a:rPr lang="it-IT" baseline="0" dirty="0" smtClean="0"/>
+              <a:rPr lang="it-IT" baseline="0" dirty="0"/>
               <a:t> = </a:t>
             </a:r>
             <a:r>
-              <a:rPr lang="it-IT" dirty="0" smtClean="0"/>
+              <a:rPr lang="it-IT" dirty="0"/>
               <a:t>6.48e-06</a:t>
             </a:r>
-            <a:endParaRPr lang="it-IT" baseline="0" dirty="0" smtClean="0"/>
+            <a:endParaRPr lang="it-IT" baseline="0" dirty="0"/>
           </a:p>
           <a:p>
             <a:pPr marL="0" indent="0">
@@ -1978,11 +2165,11 @@
           <a:lstStyle/>
           <a:p>
             <a:r>
-              <a:rPr lang="it-IT" dirty="0" smtClean="0"/>
+              <a:rPr lang="it-IT" dirty="0"/>
               <a:t>Analogamente</a:t>
             </a:r>
             <a:r>
-              <a:rPr lang="it-IT" baseline="0" dirty="0" smtClean="0"/>
+              <a:rPr lang="it-IT" baseline="0" dirty="0"/>
               <a:t> a quella per LNR anche in quella di LODDS troviamo che:</a:t>
             </a:r>
           </a:p>
@@ -1992,7 +2179,7 @@
               <a:buChar char="•"/>
             </a:pPr>
             <a:r>
-              <a:rPr lang="it-IT" baseline="0" dirty="0" smtClean="0"/>
+              <a:rPr lang="it-IT" baseline="0" dirty="0"/>
               <a:t>I soggetti allo stadio 2 rendono a morire più rapidamente rispetto a quelli dei restanti due gruppi</a:t>
             </a:r>
           </a:p>
@@ -2002,23 +2189,23 @@
               <a:buChar char="•"/>
             </a:pPr>
             <a:r>
-              <a:rPr lang="it-IT" baseline="0" dirty="0" smtClean="0"/>
+              <a:rPr lang="it-IT" baseline="0" dirty="0"/>
               <a:t>I soggetti allo stadio 0 e 1 non sono significativamente differenti. Questo non lo si nota bene negli intervalli di confidenza. Nel modello di </a:t>
             </a:r>
             <a:r>
-              <a:rPr lang="it-IT" baseline="0" dirty="0" err="1" smtClean="0"/>
+              <a:rPr lang="it-IT" baseline="0" dirty="0" err="1"/>
               <a:t>Cox</a:t>
             </a:r>
             <a:r>
-              <a:rPr lang="it-IT" baseline="0" dirty="0" smtClean="0"/>
+              <a:rPr lang="it-IT" baseline="0" dirty="0"/>
               <a:t> </a:t>
             </a:r>
             <a:r>
-              <a:rPr lang="it-IT" baseline="0" dirty="0" err="1" smtClean="0"/>
+              <a:rPr lang="it-IT" baseline="0" dirty="0" err="1"/>
               <a:t>univariato</a:t>
             </a:r>
             <a:r>
-              <a:rPr lang="it-IT" baseline="0" dirty="0" smtClean="0"/>
+              <a:rPr lang="it-IT" baseline="0" dirty="0"/>
               <a:t>, però, il coefficiente relativo alla classe 1 risulta non significativo.</a:t>
             </a:r>
           </a:p>
@@ -2035,10 +2222,9 @@
               <a:buNone/>
             </a:pPr>
             <a:r>
-              <a:rPr lang="it-IT" baseline="0" dirty="0" smtClean="0"/>
+              <a:rPr lang="it-IT" baseline="0" dirty="0"/>
               <a:t>Rifiutiamo l’ipotesi di uguaglianza tra le curve di sopravvivenza.</a:t>
             </a:r>
-            <a:endParaRPr lang="it-IT" baseline="0" dirty="0"/>
           </a:p>
           <a:p>
             <a:pPr marL="0" indent="0">
@@ -2046,30 +2232,30 @@
               <a:buNone/>
             </a:pPr>
             <a:r>
-              <a:rPr lang="it-IT" baseline="0" dirty="0" smtClean="0"/>
+              <a:rPr lang="it-IT" baseline="0" dirty="0"/>
               <a:t>Log </a:t>
             </a:r>
             <a:r>
-              <a:rPr lang="it-IT" baseline="0" dirty="0" err="1" smtClean="0"/>
+              <a:rPr lang="it-IT" baseline="0" dirty="0" err="1"/>
               <a:t>Rank</a:t>
             </a:r>
             <a:r>
-              <a:rPr lang="it-IT" baseline="0" dirty="0" smtClean="0"/>
+              <a:rPr lang="it-IT" baseline="0" dirty="0"/>
               <a:t> Test: </a:t>
             </a:r>
             <a:r>
-              <a:rPr lang="it-IT" baseline="0" dirty="0" err="1" smtClean="0"/>
+              <a:rPr lang="it-IT" baseline="0" dirty="0" err="1"/>
               <a:t>p.value</a:t>
             </a:r>
             <a:r>
-              <a:rPr lang="it-IT" baseline="0" dirty="0" smtClean="0"/>
+              <a:rPr lang="it-IT" baseline="0" dirty="0"/>
               <a:t> = </a:t>
             </a:r>
             <a:r>
-              <a:rPr lang="it-IT" dirty="0" smtClean="0"/>
+              <a:rPr lang="it-IT" dirty="0"/>
               <a:t>8.75e-07 </a:t>
             </a:r>
-            <a:endParaRPr lang="it-IT" baseline="0" dirty="0" smtClean="0"/>
+            <a:endParaRPr lang="it-IT" baseline="0" dirty="0"/>
           </a:p>
         </p:txBody>
       </p:sp>
@@ -2154,7 +2340,7 @@
           <a:lstStyle/>
           <a:p>
             <a:r>
-              <a:rPr lang="nn-NO" sz="1200" b="0" i="0" u="none" strike="noStrike" kern="1200" baseline="0" dirty="0" smtClean="0">
+              <a:rPr lang="nn-NO" sz="1200" b="0" i="0" u="none" strike="noStrike" kern="1200" baseline="0" dirty="0">
                 <a:solidFill>
                   <a:schemeClr val="tx1"/>
                 </a:solidFill>
@@ -2334,7 +2520,7 @@
           </a:lstStyle>
           <a:p>
             <a:r>
-              <a:rPr lang="it-IT" smtClean="0"/>
+              <a:rPr lang="it-IT"/>
               <a:t>Fare clic per modificare lo stile del titolo</a:t>
             </a:r>
             <a:endParaRPr lang="en-US" dirty="0"/>
@@ -2406,7 +2592,7 @@
           </a:lstStyle>
           <a:p>
             <a:r>
-              <a:rPr lang="it-IT" smtClean="0"/>
+              <a:rPr lang="it-IT"/>
               <a:t>Fare clic per modificare lo stile del sottotitolo dello schema</a:t>
             </a:r>
             <a:endParaRPr lang="en-US" dirty="0"/>
@@ -2430,7 +2616,7 @@
           <a:p>
             <a:fld id="{A2A5EAEC-CBB0-449A-A9CE-5377B44B413C}" type="datetimeFigureOut">
               <a:rPr lang="it-IT" smtClean="0"/>
-              <a:t>05/05/2017</a:t>
+              <a:t>08/05/2017</a:t>
             </a:fld>
             <a:endParaRPr lang="it-IT"/>
           </a:p>
@@ -2562,7 +2748,7 @@
           <a:lstStyle/>
           <a:p>
             <a:r>
-              <a:rPr lang="it-IT" smtClean="0"/>
+              <a:rPr lang="it-IT"/>
               <a:t>Fare clic per modificare lo stile del titolo</a:t>
             </a:r>
             <a:endParaRPr lang="en-US" dirty="0"/>
@@ -2586,35 +2772,35 @@
           <a:p>
             <a:pPr lvl="0"/>
             <a:r>
-              <a:rPr lang="it-IT" smtClean="0"/>
+              <a:rPr lang="it-IT"/>
               <a:t>Modifica gli stili del testo dello schema</a:t>
             </a:r>
           </a:p>
           <a:p>
             <a:pPr lvl="1"/>
             <a:r>
-              <a:rPr lang="it-IT" smtClean="0"/>
+              <a:rPr lang="it-IT"/>
               <a:t>Secondo livello</a:t>
             </a:r>
           </a:p>
           <a:p>
             <a:pPr lvl="2"/>
             <a:r>
-              <a:rPr lang="it-IT" smtClean="0"/>
+              <a:rPr lang="it-IT"/>
               <a:t>Terzo livello</a:t>
             </a:r>
           </a:p>
           <a:p>
             <a:pPr lvl="3"/>
             <a:r>
-              <a:rPr lang="it-IT" smtClean="0"/>
+              <a:rPr lang="it-IT"/>
               <a:t>Quarto livello</a:t>
             </a:r>
           </a:p>
           <a:p>
             <a:pPr lvl="4"/>
             <a:r>
-              <a:rPr lang="it-IT" smtClean="0"/>
+              <a:rPr lang="it-IT"/>
               <a:t>Quinto livello</a:t>
             </a:r>
             <a:endParaRPr lang="en-US" dirty="0"/>
@@ -2638,7 +2824,7 @@
           <a:p>
             <a:fld id="{A2A5EAEC-CBB0-449A-A9CE-5377B44B413C}" type="datetimeFigureOut">
               <a:rPr lang="it-IT" smtClean="0"/>
-              <a:t>05/05/2017</a:t>
+              <a:t>08/05/2017</a:t>
             </a:fld>
             <a:endParaRPr lang="it-IT"/>
           </a:p>
@@ -2813,7 +2999,7 @@
           <a:lstStyle/>
           <a:p>
             <a:r>
-              <a:rPr lang="it-IT" smtClean="0"/>
+              <a:rPr lang="it-IT"/>
               <a:t>Fare clic per modificare lo stile del titolo</a:t>
             </a:r>
             <a:endParaRPr lang="en-US" dirty="0"/>
@@ -2842,35 +3028,35 @@
           <a:p>
             <a:pPr lvl="0"/>
             <a:r>
-              <a:rPr lang="it-IT" smtClean="0"/>
+              <a:rPr lang="it-IT"/>
               <a:t>Modifica gli stili del testo dello schema</a:t>
             </a:r>
           </a:p>
           <a:p>
             <a:pPr lvl="1"/>
             <a:r>
-              <a:rPr lang="it-IT" smtClean="0"/>
+              <a:rPr lang="it-IT"/>
               <a:t>Secondo livello</a:t>
             </a:r>
           </a:p>
           <a:p>
             <a:pPr lvl="2"/>
             <a:r>
-              <a:rPr lang="it-IT" smtClean="0"/>
+              <a:rPr lang="it-IT"/>
               <a:t>Terzo livello</a:t>
             </a:r>
           </a:p>
           <a:p>
             <a:pPr lvl="3"/>
             <a:r>
-              <a:rPr lang="it-IT" smtClean="0"/>
+              <a:rPr lang="it-IT"/>
               <a:t>Quarto livello</a:t>
             </a:r>
           </a:p>
           <a:p>
             <a:pPr lvl="4"/>
             <a:r>
-              <a:rPr lang="it-IT" smtClean="0"/>
+              <a:rPr lang="it-IT"/>
               <a:t>Quinto livello</a:t>
             </a:r>
             <a:endParaRPr lang="en-US" dirty="0"/>
@@ -2894,7 +3080,7 @@
           <a:p>
             <a:fld id="{A2A5EAEC-CBB0-449A-A9CE-5377B44B413C}" type="datetimeFigureOut">
               <a:rPr lang="it-IT" smtClean="0"/>
-              <a:t>05/05/2017</a:t>
+              <a:t>08/05/2017</a:t>
             </a:fld>
             <a:endParaRPr lang="it-IT"/>
           </a:p>
@@ -2992,7 +3178,7 @@
           </a:lstStyle>
           <a:p>
             <a:r>
-              <a:rPr lang="it-IT" smtClean="0"/>
+              <a:rPr lang="it-IT"/>
               <a:t>Fare clic per modificare lo stile del titolo</a:t>
             </a:r>
             <a:endParaRPr lang="en-US" dirty="0"/>
@@ -3016,35 +3202,35 @@
           <a:p>
             <a:pPr lvl="0"/>
             <a:r>
-              <a:rPr lang="it-IT" smtClean="0"/>
+              <a:rPr lang="it-IT"/>
               <a:t>Modifica gli stili del testo dello schema</a:t>
             </a:r>
           </a:p>
           <a:p>
             <a:pPr lvl="1"/>
             <a:r>
-              <a:rPr lang="it-IT" smtClean="0"/>
+              <a:rPr lang="it-IT"/>
               <a:t>Secondo livello</a:t>
             </a:r>
           </a:p>
           <a:p>
             <a:pPr lvl="2"/>
             <a:r>
-              <a:rPr lang="it-IT" smtClean="0"/>
+              <a:rPr lang="it-IT"/>
               <a:t>Terzo livello</a:t>
             </a:r>
           </a:p>
           <a:p>
             <a:pPr lvl="3"/>
             <a:r>
-              <a:rPr lang="it-IT" smtClean="0"/>
+              <a:rPr lang="it-IT"/>
               <a:t>Quarto livello</a:t>
             </a:r>
           </a:p>
           <a:p>
             <a:pPr lvl="4"/>
             <a:r>
-              <a:rPr lang="it-IT" smtClean="0"/>
+              <a:rPr lang="it-IT"/>
               <a:t>Quinto livello</a:t>
             </a:r>
             <a:endParaRPr lang="en-US" dirty="0"/>
@@ -3068,7 +3254,7 @@
           <a:p>
             <a:fld id="{A2A5EAEC-CBB0-449A-A9CE-5377B44B413C}" type="datetimeFigureOut">
               <a:rPr lang="it-IT" smtClean="0"/>
-              <a:t>05/05/2017</a:t>
+              <a:t>08/05/2017</a:t>
             </a:fld>
             <a:endParaRPr lang="it-IT"/>
           </a:p>
@@ -3267,7 +3453,7 @@
           </a:lstStyle>
           <a:p>
             <a:r>
-              <a:rPr lang="it-IT" smtClean="0"/>
+              <a:rPr lang="it-IT"/>
               <a:t>Fare clic per modificare lo stile del titolo</a:t>
             </a:r>
             <a:endParaRPr lang="en-US" dirty="0"/>
@@ -3388,7 +3574,7 @@
           <a:p>
             <a:pPr lvl="0"/>
             <a:r>
-              <a:rPr lang="it-IT" smtClean="0"/>
+              <a:rPr lang="it-IT"/>
               <a:t>Modifica gli stili del testo dello schema</a:t>
             </a:r>
           </a:p>
@@ -3411,7 +3597,7 @@
           <a:p>
             <a:fld id="{A2A5EAEC-CBB0-449A-A9CE-5377B44B413C}" type="datetimeFigureOut">
               <a:rPr lang="it-IT" smtClean="0"/>
-              <a:t>05/05/2017</a:t>
+              <a:t>08/05/2017</a:t>
             </a:fld>
             <a:endParaRPr lang="it-IT"/>
           </a:p>
@@ -3548,7 +3734,7 @@
           <a:lstStyle/>
           <a:p>
             <a:r>
-              <a:rPr lang="it-IT" smtClean="0"/>
+              <a:rPr lang="it-IT"/>
               <a:t>Fare clic per modificare lo stile del titolo</a:t>
             </a:r>
             <a:endParaRPr lang="en-US" dirty="0"/>
@@ -3577,35 +3763,35 @@
           <a:p>
             <a:pPr lvl="0"/>
             <a:r>
-              <a:rPr lang="it-IT" smtClean="0"/>
+              <a:rPr lang="it-IT"/>
               <a:t>Modifica gli stili del testo dello schema</a:t>
             </a:r>
           </a:p>
           <a:p>
             <a:pPr lvl="1"/>
             <a:r>
-              <a:rPr lang="it-IT" smtClean="0"/>
+              <a:rPr lang="it-IT"/>
               <a:t>Secondo livello</a:t>
             </a:r>
           </a:p>
           <a:p>
             <a:pPr lvl="2"/>
             <a:r>
-              <a:rPr lang="it-IT" smtClean="0"/>
+              <a:rPr lang="it-IT"/>
               <a:t>Terzo livello</a:t>
             </a:r>
           </a:p>
           <a:p>
             <a:pPr lvl="3"/>
             <a:r>
-              <a:rPr lang="it-IT" smtClean="0"/>
+              <a:rPr lang="it-IT"/>
               <a:t>Quarto livello</a:t>
             </a:r>
           </a:p>
           <a:p>
             <a:pPr lvl="4"/>
             <a:r>
-              <a:rPr lang="it-IT" smtClean="0"/>
+              <a:rPr lang="it-IT"/>
               <a:t>Quinto livello</a:t>
             </a:r>
             <a:endParaRPr lang="en-US" dirty="0"/>
@@ -3634,35 +3820,35 @@
           <a:p>
             <a:pPr lvl="0"/>
             <a:r>
-              <a:rPr lang="it-IT" smtClean="0"/>
+              <a:rPr lang="it-IT"/>
               <a:t>Modifica gli stili del testo dello schema</a:t>
             </a:r>
           </a:p>
           <a:p>
             <a:pPr lvl="1"/>
             <a:r>
-              <a:rPr lang="it-IT" smtClean="0"/>
+              <a:rPr lang="it-IT"/>
               <a:t>Secondo livello</a:t>
             </a:r>
           </a:p>
           <a:p>
             <a:pPr lvl="2"/>
             <a:r>
-              <a:rPr lang="it-IT" smtClean="0"/>
+              <a:rPr lang="it-IT"/>
               <a:t>Terzo livello</a:t>
             </a:r>
           </a:p>
           <a:p>
             <a:pPr lvl="3"/>
             <a:r>
-              <a:rPr lang="it-IT" smtClean="0"/>
+              <a:rPr lang="it-IT"/>
               <a:t>Quarto livello</a:t>
             </a:r>
           </a:p>
           <a:p>
             <a:pPr lvl="4"/>
             <a:r>
-              <a:rPr lang="it-IT" smtClean="0"/>
+              <a:rPr lang="it-IT"/>
               <a:t>Quinto livello</a:t>
             </a:r>
             <a:endParaRPr lang="en-US" dirty="0"/>
@@ -3686,7 +3872,7 @@
           <a:p>
             <a:fld id="{A2A5EAEC-CBB0-449A-A9CE-5377B44B413C}" type="datetimeFigureOut">
               <a:rPr lang="it-IT" smtClean="0"/>
-              <a:t>05/05/2017</a:t>
+              <a:t>08/05/2017</a:t>
             </a:fld>
             <a:endParaRPr lang="it-IT"/>
           </a:p>
@@ -3785,7 +3971,7 @@
           <a:lstStyle/>
           <a:p>
             <a:r>
-              <a:rPr lang="it-IT" smtClean="0"/>
+              <a:rPr lang="it-IT"/>
               <a:t>Fare clic per modificare lo stile del titolo</a:t>
             </a:r>
             <a:endParaRPr lang="en-US" dirty="0"/>
@@ -3857,7 +4043,7 @@
           <a:p>
             <a:pPr lvl="0"/>
             <a:r>
-              <a:rPr lang="it-IT" smtClean="0"/>
+              <a:rPr lang="it-IT"/>
               <a:t>Modifica gli stili del testo dello schema</a:t>
             </a:r>
           </a:p>
@@ -3885,35 +4071,35 @@
           <a:p>
             <a:pPr lvl="0"/>
             <a:r>
-              <a:rPr lang="it-IT" smtClean="0"/>
+              <a:rPr lang="it-IT"/>
               <a:t>Modifica gli stili del testo dello schema</a:t>
             </a:r>
           </a:p>
           <a:p>
             <a:pPr lvl="1"/>
             <a:r>
-              <a:rPr lang="it-IT" smtClean="0"/>
+              <a:rPr lang="it-IT"/>
               <a:t>Secondo livello</a:t>
             </a:r>
           </a:p>
           <a:p>
             <a:pPr lvl="2"/>
             <a:r>
-              <a:rPr lang="it-IT" smtClean="0"/>
+              <a:rPr lang="it-IT"/>
               <a:t>Terzo livello</a:t>
             </a:r>
           </a:p>
           <a:p>
             <a:pPr lvl="3"/>
             <a:r>
-              <a:rPr lang="it-IT" smtClean="0"/>
+              <a:rPr lang="it-IT"/>
               <a:t>Quarto livello</a:t>
             </a:r>
           </a:p>
           <a:p>
             <a:pPr lvl="4"/>
             <a:r>
-              <a:rPr lang="it-IT" smtClean="0"/>
+              <a:rPr lang="it-IT"/>
               <a:t>Quinto livello</a:t>
             </a:r>
             <a:endParaRPr lang="en-US" dirty="0"/>
@@ -3985,7 +4171,7 @@
           <a:p>
             <a:pPr lvl="0"/>
             <a:r>
-              <a:rPr lang="it-IT" smtClean="0"/>
+              <a:rPr lang="it-IT"/>
               <a:t>Modifica gli stili del testo dello schema</a:t>
             </a:r>
           </a:p>
@@ -4013,35 +4199,35 @@
           <a:p>
             <a:pPr lvl="0"/>
             <a:r>
-              <a:rPr lang="it-IT" smtClean="0"/>
+              <a:rPr lang="it-IT"/>
               <a:t>Modifica gli stili del testo dello schema</a:t>
             </a:r>
           </a:p>
           <a:p>
             <a:pPr lvl="1"/>
             <a:r>
-              <a:rPr lang="it-IT" smtClean="0"/>
+              <a:rPr lang="it-IT"/>
               <a:t>Secondo livello</a:t>
             </a:r>
           </a:p>
           <a:p>
             <a:pPr lvl="2"/>
             <a:r>
-              <a:rPr lang="it-IT" smtClean="0"/>
+              <a:rPr lang="it-IT"/>
               <a:t>Terzo livello</a:t>
             </a:r>
           </a:p>
           <a:p>
             <a:pPr lvl="3"/>
             <a:r>
-              <a:rPr lang="it-IT" smtClean="0"/>
+              <a:rPr lang="it-IT"/>
               <a:t>Quarto livello</a:t>
             </a:r>
           </a:p>
           <a:p>
             <a:pPr lvl="4"/>
             <a:r>
-              <a:rPr lang="it-IT" smtClean="0"/>
+              <a:rPr lang="it-IT"/>
               <a:t>Quinto livello</a:t>
             </a:r>
             <a:endParaRPr lang="en-US" dirty="0"/>
@@ -4065,7 +4251,7 @@
           <a:p>
             <a:fld id="{A2A5EAEC-CBB0-449A-A9CE-5377B44B413C}" type="datetimeFigureOut">
               <a:rPr lang="it-IT" smtClean="0"/>
-              <a:t>05/05/2017</a:t>
+              <a:t>08/05/2017</a:t>
             </a:fld>
             <a:endParaRPr lang="it-IT"/>
           </a:p>
@@ -4159,7 +4345,7 @@
           <a:lstStyle/>
           <a:p>
             <a:r>
-              <a:rPr lang="it-IT" smtClean="0"/>
+              <a:rPr lang="it-IT"/>
               <a:t>Fare clic per modificare lo stile del titolo</a:t>
             </a:r>
             <a:endParaRPr lang="en-US" dirty="0"/>
@@ -4183,7 +4369,7 @@
           <a:p>
             <a:fld id="{A2A5EAEC-CBB0-449A-A9CE-5377B44B413C}" type="datetimeFigureOut">
               <a:rPr lang="it-IT" smtClean="0"/>
-              <a:t>05/05/2017</a:t>
+              <a:t>08/05/2017</a:t>
             </a:fld>
             <a:endParaRPr lang="it-IT"/>
           </a:p>
@@ -4354,7 +4540,7 @@
           <a:p>
             <a:fld id="{A2A5EAEC-CBB0-449A-A9CE-5377B44B413C}" type="datetimeFigureOut">
               <a:rPr lang="it-IT" smtClean="0"/>
-              <a:t>05/05/2017</a:t>
+              <a:t>08/05/2017</a:t>
             </a:fld>
             <a:endParaRPr lang="it-IT"/>
           </a:p>
@@ -4547,7 +4733,7 @@
           </a:lstStyle>
           <a:p>
             <a:r>
-              <a:rPr lang="it-IT" smtClean="0"/>
+              <a:rPr lang="it-IT"/>
               <a:t>Fare clic per modificare lo stile del titolo</a:t>
             </a:r>
             <a:endParaRPr lang="en-US" dirty="0"/>
@@ -4576,35 +4762,35 @@
           <a:p>
             <a:pPr lvl="0"/>
             <a:r>
-              <a:rPr lang="it-IT" smtClean="0"/>
+              <a:rPr lang="it-IT"/>
               <a:t>Modifica gli stili del testo dello schema</a:t>
             </a:r>
           </a:p>
           <a:p>
             <a:pPr lvl="1"/>
             <a:r>
-              <a:rPr lang="it-IT" smtClean="0"/>
+              <a:rPr lang="it-IT"/>
               <a:t>Secondo livello</a:t>
             </a:r>
           </a:p>
           <a:p>
             <a:pPr lvl="2"/>
             <a:r>
-              <a:rPr lang="it-IT" smtClean="0"/>
+              <a:rPr lang="it-IT"/>
               <a:t>Terzo livello</a:t>
             </a:r>
           </a:p>
           <a:p>
             <a:pPr lvl="3"/>
             <a:r>
-              <a:rPr lang="it-IT" smtClean="0"/>
+              <a:rPr lang="it-IT"/>
               <a:t>Quarto livello</a:t>
             </a:r>
           </a:p>
           <a:p>
             <a:pPr lvl="4"/>
             <a:r>
-              <a:rPr lang="it-IT" smtClean="0"/>
+              <a:rPr lang="it-IT"/>
               <a:t>Quinto livello</a:t>
             </a:r>
             <a:endParaRPr lang="en-US" dirty="0"/>
@@ -4676,7 +4862,7 @@
           <a:p>
             <a:pPr lvl="0"/>
             <a:r>
-              <a:rPr lang="it-IT" smtClean="0"/>
+              <a:rPr lang="it-IT"/>
               <a:t>Modifica gli stili del testo dello schema</a:t>
             </a:r>
           </a:p>
@@ -4708,7 +4894,7 @@
           <a:p>
             <a:fld id="{A2A5EAEC-CBB0-449A-A9CE-5377B44B413C}" type="datetimeFigureOut">
               <a:rPr lang="it-IT" smtClean="0"/>
-              <a:t>05/05/2017</a:t>
+              <a:t>08/05/2017</a:t>
             </a:fld>
             <a:endParaRPr lang="it-IT"/>
           </a:p>
@@ -4914,7 +5100,7 @@
           </a:lstStyle>
           <a:p>
             <a:r>
-              <a:rPr lang="it-IT" smtClean="0"/>
+              <a:rPr lang="it-IT"/>
               <a:t>Fare clic per modificare lo stile del titolo</a:t>
             </a:r>
             <a:endParaRPr lang="en-US" dirty="0"/>
@@ -4989,7 +5175,7 @@
           </a:lstStyle>
           <a:p>
             <a:r>
-              <a:rPr lang="it-IT" smtClean="0"/>
+              <a:rPr lang="it-IT"/>
               <a:t>Fare clic sull'icona per inserire un'immagine</a:t>
             </a:r>
             <a:endParaRPr lang="en-US" dirty="0"/>
@@ -5067,7 +5253,7 @@
           <a:p>
             <a:pPr lvl="0"/>
             <a:r>
-              <a:rPr lang="it-IT" smtClean="0"/>
+              <a:rPr lang="it-IT"/>
               <a:t>Modifica gli stili del testo dello schema</a:t>
             </a:r>
           </a:p>
@@ -5090,7 +5276,7 @@
           <a:p>
             <a:fld id="{A2A5EAEC-CBB0-449A-A9CE-5377B44B413C}" type="datetimeFigureOut">
               <a:rPr lang="it-IT" smtClean="0"/>
-              <a:t>05/05/2017</a:t>
+              <a:t>08/05/2017</a:t>
             </a:fld>
             <a:endParaRPr lang="it-IT"/>
           </a:p>
@@ -5275,7 +5461,7 @@
           <a:lstStyle/>
           <a:p>
             <a:r>
-              <a:rPr lang="it-IT" smtClean="0"/>
+              <a:rPr lang="it-IT"/>
               <a:t>Fare clic per modificare lo stile del titolo</a:t>
             </a:r>
             <a:endParaRPr lang="en-US" dirty="0"/>
@@ -5309,35 +5495,35 @@
           <a:p>
             <a:pPr lvl="0"/>
             <a:r>
-              <a:rPr lang="it-IT" smtClean="0"/>
+              <a:rPr lang="it-IT"/>
               <a:t>Modifica gli stili del testo dello schema</a:t>
             </a:r>
           </a:p>
           <a:p>
             <a:pPr lvl="1"/>
             <a:r>
-              <a:rPr lang="it-IT" smtClean="0"/>
+              <a:rPr lang="it-IT"/>
               <a:t>Secondo livello</a:t>
             </a:r>
           </a:p>
           <a:p>
             <a:pPr lvl="2"/>
             <a:r>
-              <a:rPr lang="it-IT" smtClean="0"/>
+              <a:rPr lang="it-IT"/>
               <a:t>Terzo livello</a:t>
             </a:r>
           </a:p>
           <a:p>
             <a:pPr lvl="3"/>
             <a:r>
-              <a:rPr lang="it-IT" smtClean="0"/>
+              <a:rPr lang="it-IT"/>
               <a:t>Quarto livello</a:t>
             </a:r>
           </a:p>
           <a:p>
             <a:pPr lvl="4"/>
             <a:r>
-              <a:rPr lang="it-IT" smtClean="0"/>
+              <a:rPr lang="it-IT"/>
               <a:t>Quinto livello</a:t>
             </a:r>
             <a:endParaRPr lang="en-US" dirty="0"/>
@@ -5377,7 +5563,7 @@
           <a:p>
             <a:fld id="{A2A5EAEC-CBB0-449A-A9CE-5377B44B413C}" type="datetimeFigureOut">
               <a:rPr lang="it-IT" smtClean="0"/>
-              <a:t>05/05/2017</a:t>
+              <a:t>08/05/2017</a:t>
             </a:fld>
             <a:endParaRPr lang="it-IT"/>
           </a:p>
@@ -5924,10 +6110,9 @@
           <a:lstStyle/>
           <a:p>
             <a:r>
-              <a:rPr lang="it-IT" dirty="0" smtClean="0"/>
+              <a:rPr lang="it-IT" dirty="0"/>
               <a:t>Analisi della sopravvivenza per il cancro al colon</a:t>
             </a:r>
-            <a:endParaRPr lang="it-IT" dirty="0"/>
           </a:p>
         </p:txBody>
       </p:sp>
@@ -5947,10 +6132,9 @@
           <a:lstStyle/>
           <a:p>
             <a:r>
-              <a:rPr lang="it-IT" dirty="0" smtClean="0"/>
+              <a:rPr lang="it-IT" dirty="0"/>
               <a:t>A cura di Carlo cavalieri, Marco Morigi e Gaetano romano</a:t>
             </a:r>
-            <a:endParaRPr lang="it-IT" dirty="0"/>
           </a:p>
         </p:txBody>
       </p:sp>
@@ -5976,7 +6160,7 @@
         </p:blipFill>
         <p:spPr>
           <a:xfrm>
-            <a:off x="3936949" y="166890"/>
+            <a:off x="3423993" y="169931"/>
             <a:ext cx="1707389" cy="1698852"/>
           </a:xfrm>
           <a:prstGeom prst="rect">
@@ -5992,8 +6176,8 @@
         </p:nvSpPr>
         <p:spPr>
           <a:xfrm>
-            <a:off x="5901180" y="323818"/>
-            <a:ext cx="4114172" cy="1815882"/>
+            <a:off x="5389114" y="172971"/>
+            <a:ext cx="4114172" cy="1692771"/>
           </a:xfrm>
           <a:prstGeom prst="rect">
             <a:avLst/>
@@ -6007,7 +6191,7 @@
           <a:lstStyle/>
           <a:p>
             <a:r>
-              <a:rPr lang="it-IT" sz="2800" dirty="0" smtClean="0">
+              <a:rPr lang="it-IT" sz="2600" dirty="0">
                 <a:solidFill>
                   <a:srgbClr val="FF0000"/>
                 </a:solidFill>
@@ -6018,7 +6202,7 @@
           </a:p>
           <a:p>
             <a:r>
-              <a:rPr lang="it-IT" sz="2800" dirty="0" err="1" smtClean="0">
+              <a:rPr lang="it-IT" sz="2600" dirty="0" err="1">
                 <a:solidFill>
                   <a:srgbClr val="FF0000"/>
                 </a:solidFill>
@@ -6027,67 +6211,25 @@
               <a:t>Studiorum</a:t>
             </a:r>
             <a:r>
-              <a:rPr lang="it-IT" sz="2800" dirty="0" smtClean="0">
+              <a:rPr lang="it-IT" sz="2600" dirty="0">
                 <a:solidFill>
                   <a:srgbClr val="FF0000"/>
                 </a:solidFill>
                 <a:latin typeface="Comic Sans MS" panose="030F0702030302020204" pitchFamily="66" charset="0"/>
               </a:rPr>
-              <a:t> </a:t>
-            </a:r>
-            <a:r>
-              <a:rPr lang="it-IT" sz="2800" dirty="0" err="1" smtClean="0">
+              <a:t> Università di Bologna AD </a:t>
+            </a:r>
+          </a:p>
+          <a:p>
+            <a:r>
+              <a:rPr lang="it-IT" sz="2600" dirty="0">
                 <a:solidFill>
                   <a:srgbClr val="FF0000"/>
                 </a:solidFill>
                 <a:latin typeface="Comic Sans MS" panose="030F0702030302020204" pitchFamily="66" charset="0"/>
               </a:rPr>
-              <a:t>Universitàdi</a:t>
-            </a:r>
-            <a:r>
-              <a:rPr lang="it-IT" sz="2800" dirty="0" smtClean="0">
-                <a:solidFill>
-                  <a:srgbClr val="FF0000"/>
-                </a:solidFill>
-                <a:latin typeface="Comic Sans MS" panose="030F0702030302020204" pitchFamily="66" charset="0"/>
-              </a:rPr>
-              <a:t> </a:t>
-            </a:r>
-            <a:r>
-              <a:rPr lang="it-IT" sz="2800" dirty="0" err="1" smtClean="0">
-                <a:solidFill>
-                  <a:srgbClr val="FF0000"/>
-                </a:solidFill>
-                <a:latin typeface="Comic Sans MS" panose="030F0702030302020204" pitchFamily="66" charset="0"/>
-              </a:rPr>
-              <a:t>Bologa</a:t>
-            </a:r>
-            <a:r>
-              <a:rPr lang="it-IT" sz="2800" dirty="0" smtClean="0">
-                <a:solidFill>
-                  <a:srgbClr val="FF0000"/>
-                </a:solidFill>
-                <a:latin typeface="Comic Sans MS" panose="030F0702030302020204" pitchFamily="66" charset="0"/>
-              </a:rPr>
-              <a:t> AD </a:t>
-            </a:r>
-          </a:p>
-          <a:p>
-            <a:r>
-              <a:rPr lang="it-IT" sz="2800" dirty="0" smtClean="0">
-                <a:solidFill>
-                  <a:srgbClr val="FF0000"/>
-                </a:solidFill>
-                <a:latin typeface="Comic Sans MS" panose="030F0702030302020204" pitchFamily="66" charset="0"/>
-              </a:rPr>
-              <a:t>10888</a:t>
-            </a:r>
-            <a:endParaRPr lang="it-IT" sz="2800" dirty="0">
-              <a:solidFill>
-                <a:srgbClr val="FF0000"/>
-              </a:solidFill>
-              <a:latin typeface="Comic Sans MS" panose="030F0702030302020204" pitchFamily="66" charset="0"/>
-            </a:endParaRPr>
+              <a:t>1088</a:t>
+            </a:r>
           </a:p>
         </p:txBody>
       </p:sp>
@@ -6101,13 +6243,6 @@
   <p:clrMapOvr>
     <a:masterClrMapping/>
   </p:clrMapOvr>
-  <p:timing>
-    <p:tnLst>
-      <p:par>
-        <p:cTn id="1" dur="indefinite" restart="never" nodeType="tmRoot"/>
-      </p:par>
-    </p:tnLst>
-  </p:timing>
 </p:sld>
 </file>
 
@@ -6144,10 +6279,9 @@
           <a:lstStyle/>
           <a:p>
             <a:r>
-              <a:rPr lang="it-IT" dirty="0" smtClean="0"/>
+              <a:rPr lang="it-IT" dirty="0"/>
               <a:t>Confronto funzioni cumulative di rischio</a:t>
             </a:r>
-            <a:endParaRPr lang="it-IT" dirty="0"/>
           </a:p>
         </p:txBody>
       </p:sp>
@@ -6555,13 +6689,6 @@
   <p:clrMapOvr>
     <a:masterClrMapping/>
   </p:clrMapOvr>
-  <p:timing>
-    <p:tnLst>
-      <p:par>
-        <p:cTn id="1" dur="indefinite" restart="never" nodeType="tmRoot"/>
-      </p:par>
-    </p:tnLst>
-  </p:timing>
 </p:sld>
 </file>
 
@@ -6598,10 +6725,9 @@
           <a:lstStyle/>
           <a:p>
             <a:r>
-              <a:rPr lang="it-IT" dirty="0" smtClean="0"/>
+              <a:rPr lang="it-IT" dirty="0"/>
               <a:t>Ipotesi di rischi proporzionali</a:t>
             </a:r>
-            <a:endParaRPr lang="it-IT" dirty="0"/>
           </a:p>
         </p:txBody>
       </p:sp>
@@ -6641,13 +6767,6 @@
   <p:clrMapOvr>
     <a:masterClrMapping/>
   </p:clrMapOvr>
-  <p:timing>
-    <p:tnLst>
-      <p:par>
-        <p:cTn id="1" dur="indefinite" restart="never" nodeType="tmRoot"/>
-      </p:par>
-    </p:tnLst>
-  </p:timing>
 </p:sld>
 </file>
 
@@ -6684,11 +6803,11 @@
           <a:lstStyle/>
           <a:p>
             <a:r>
-              <a:rPr lang="it-IT" dirty="0" smtClean="0"/>
+              <a:rPr lang="it-IT" dirty="0"/>
               <a:t>Modelli di </a:t>
             </a:r>
             <a:r>
-              <a:rPr lang="it-IT" dirty="0" err="1" smtClean="0"/>
+              <a:rPr lang="it-IT" dirty="0" err="1"/>
               <a:t>Cox</a:t>
             </a:r>
             <a:r>
@@ -6696,7 +6815,7 @@
               <a:t> </a:t>
             </a:r>
             <a:r>
-              <a:rPr lang="it-IT" dirty="0" err="1" smtClean="0"/>
+              <a:rPr lang="it-IT" dirty="0" err="1"/>
               <a:t>univariati</a:t>
             </a:r>
             <a:endParaRPr lang="it-IT" dirty="0"/>
@@ -6785,6 +6904,96 @@
           </a:prstGeom>
         </p:spPr>
       </p:pic>
+      <p:sp>
+        <p:nvSpPr>
+          <p:cNvPr id="3" name="Rettangolo 2"/>
+          <p:cNvSpPr/>
+          <p:nvPr/>
+        </p:nvSpPr>
+        <p:spPr>
+          <a:xfrm>
+            <a:off x="3962400" y="3261360"/>
+            <a:ext cx="1021080" cy="205740"/>
+          </a:xfrm>
+          <a:prstGeom prst="rect">
+            <a:avLst/>
+          </a:prstGeom>
+          <a:solidFill>
+            <a:srgbClr val="FFFF00">
+              <a:alpha val="33000"/>
+            </a:srgbClr>
+          </a:solidFill>
+        </p:spPr>
+        <p:style>
+          <a:lnRef idx="2">
+            <a:schemeClr val="accent1">
+              <a:shade val="50000"/>
+            </a:schemeClr>
+          </a:lnRef>
+          <a:fillRef idx="1">
+            <a:schemeClr val="accent1"/>
+          </a:fillRef>
+          <a:effectRef idx="0">
+            <a:schemeClr val="accent1"/>
+          </a:effectRef>
+          <a:fontRef idx="minor">
+            <a:schemeClr val="lt1"/>
+          </a:fontRef>
+        </p:style>
+        <p:txBody>
+          <a:bodyPr rtlCol="0" anchor="ctr"/>
+          <a:lstStyle/>
+          <a:p>
+            <a:pPr algn="ctr"/>
+            <a:endParaRPr lang="it-IT"/>
+          </a:p>
+        </p:txBody>
+      </p:sp>
+      <p:sp>
+        <p:nvSpPr>
+          <p:cNvPr id="7" name="Rettangolo 6"/>
+          <p:cNvSpPr/>
+          <p:nvPr/>
+        </p:nvSpPr>
+        <p:spPr>
+          <a:xfrm>
+            <a:off x="9235440" y="3261360"/>
+            <a:ext cx="1021080" cy="205740"/>
+          </a:xfrm>
+          <a:prstGeom prst="rect">
+            <a:avLst/>
+          </a:prstGeom>
+          <a:solidFill>
+            <a:srgbClr val="FFFF00">
+              <a:alpha val="33000"/>
+            </a:srgbClr>
+          </a:solidFill>
+        </p:spPr>
+        <p:style>
+          <a:lnRef idx="2">
+            <a:schemeClr val="accent1">
+              <a:shade val="50000"/>
+            </a:schemeClr>
+          </a:lnRef>
+          <a:fillRef idx="1">
+            <a:schemeClr val="accent1"/>
+          </a:fillRef>
+          <a:effectRef idx="0">
+            <a:schemeClr val="accent1"/>
+          </a:effectRef>
+          <a:fontRef idx="minor">
+            <a:schemeClr val="lt1"/>
+          </a:fontRef>
+        </p:style>
+        <p:txBody>
+          <a:bodyPr rtlCol="0" anchor="ctr"/>
+          <a:lstStyle/>
+          <a:p>
+            <a:pPr algn="ctr"/>
+            <a:endParaRPr lang="it-IT"/>
+          </a:p>
+        </p:txBody>
+      </p:sp>
     </p:spTree>
     <p:extLst>
       <p:ext uri="{BB962C8B-B14F-4D97-AF65-F5344CB8AC3E}">
@@ -6795,13 +7004,345 @@
   <p:clrMapOvr>
     <a:masterClrMapping/>
   </p:clrMapOvr>
-  <p:timing>
-    <p:tnLst>
-      <p:par>
-        <p:cTn id="1" dur="indefinite" restart="never" nodeType="tmRoot"/>
-      </p:par>
-    </p:tnLst>
-  </p:timing>
+</p:sld>
+</file>
+
+<file path=ppt/slides/slide18.xml><?xml version="1.0" encoding="utf-8"?>
+<p:sld xmlns:a="http://schemas.openxmlformats.org/drawingml/2006/main" xmlns:r="http://schemas.openxmlformats.org/officeDocument/2006/relationships" xmlns:p="http://schemas.openxmlformats.org/presentationml/2006/main">
+  <p:cSld>
+    <p:spTree>
+      <p:nvGrpSpPr>
+        <p:cNvPr id="1" name=""/>
+        <p:cNvGrpSpPr/>
+        <p:nvPr/>
+      </p:nvGrpSpPr>
+      <p:grpSpPr>
+        <a:xfrm>
+          <a:off x="0" y="0"/>
+          <a:ext cx="0" cy="0"/>
+          <a:chOff x="0" y="0"/>
+          <a:chExt cx="0" cy="0"/>
+        </a:xfrm>
+      </p:grpSpPr>
+      <p:sp>
+        <p:nvSpPr>
+          <p:cNvPr id="2" name="Titolo 1"/>
+          <p:cNvSpPr>
+            <a:spLocks noGrp="1"/>
+          </p:cNvSpPr>
+          <p:nvPr>
+            <p:ph type="title"/>
+          </p:nvPr>
+        </p:nvSpPr>
+        <p:spPr>
+          <a:xfrm>
+            <a:off x="1097280" y="286603"/>
+            <a:ext cx="10058400" cy="1450757"/>
+          </a:xfrm>
+        </p:spPr>
+        <p:txBody>
+          <a:bodyPr/>
+          <a:lstStyle/>
+          <a:p>
+            <a:r>
+              <a:rPr lang="it-IT" dirty="0"/>
+              <a:t>Modello Multivariato</a:t>
+            </a:r>
+          </a:p>
+        </p:txBody>
+      </p:sp>
+      <p:pic>
+        <p:nvPicPr>
+          <p:cNvPr id="3" name="Immagine 2"/>
+          <p:cNvPicPr>
+            <a:picLocks noChangeAspect="1"/>
+          </p:cNvPicPr>
+          <p:nvPr/>
+        </p:nvPicPr>
+        <p:blipFill>
+          <a:blip r:embed="rId3"/>
+          <a:stretch>
+            <a:fillRect/>
+          </a:stretch>
+        </p:blipFill>
+        <p:spPr>
+          <a:xfrm>
+            <a:off x="3614901" y="1979298"/>
+            <a:ext cx="4592398" cy="4201147"/>
+          </a:xfrm>
+          <a:prstGeom prst="rect">
+            <a:avLst/>
+          </a:prstGeom>
+        </p:spPr>
+      </p:pic>
+      <p:sp>
+        <p:nvSpPr>
+          <p:cNvPr id="4" name="Rettangolo 3"/>
+          <p:cNvSpPr/>
+          <p:nvPr/>
+        </p:nvSpPr>
+        <p:spPr>
+          <a:xfrm>
+            <a:off x="6812280" y="2575560"/>
+            <a:ext cx="541020" cy="1097280"/>
+          </a:xfrm>
+          <a:prstGeom prst="rect">
+            <a:avLst/>
+          </a:prstGeom>
+          <a:solidFill>
+            <a:srgbClr val="FFFF00">
+              <a:alpha val="33000"/>
+            </a:srgbClr>
+          </a:solidFill>
+        </p:spPr>
+        <p:style>
+          <a:lnRef idx="2">
+            <a:schemeClr val="accent1">
+              <a:shade val="50000"/>
+            </a:schemeClr>
+          </a:lnRef>
+          <a:fillRef idx="1">
+            <a:schemeClr val="accent1"/>
+          </a:fillRef>
+          <a:effectRef idx="0">
+            <a:schemeClr val="accent1"/>
+          </a:effectRef>
+          <a:fontRef idx="minor">
+            <a:schemeClr val="lt1"/>
+          </a:fontRef>
+        </p:style>
+        <p:txBody>
+          <a:bodyPr rtlCol="0" anchor="ctr"/>
+          <a:lstStyle/>
+          <a:p>
+            <a:pPr algn="ctr"/>
+            <a:endParaRPr lang="it-IT"/>
+          </a:p>
+        </p:txBody>
+      </p:sp>
+    </p:spTree>
+    <p:extLst>
+      <p:ext uri="{BB962C8B-B14F-4D97-AF65-F5344CB8AC3E}">
+        <p14:creationId xmlns:p14="http://schemas.microsoft.com/office/powerpoint/2010/main" val="3747607319"/>
+      </p:ext>
+    </p:extLst>
+  </p:cSld>
+  <p:clrMapOvr>
+    <a:masterClrMapping/>
+  </p:clrMapOvr>
+</p:sld>
+</file>
+
+<file path=ppt/slides/slide19.xml><?xml version="1.0" encoding="utf-8"?>
+<p:sld xmlns:a="http://schemas.openxmlformats.org/drawingml/2006/main" xmlns:r="http://schemas.openxmlformats.org/officeDocument/2006/relationships" xmlns:p="http://schemas.openxmlformats.org/presentationml/2006/main">
+  <p:cSld>
+    <p:spTree>
+      <p:nvGrpSpPr>
+        <p:cNvPr id="1" name=""/>
+        <p:cNvGrpSpPr/>
+        <p:nvPr/>
+      </p:nvGrpSpPr>
+      <p:grpSpPr>
+        <a:xfrm>
+          <a:off x="0" y="0"/>
+          <a:ext cx="0" cy="0"/>
+          <a:chOff x="0" y="0"/>
+          <a:chExt cx="0" cy="0"/>
+        </a:xfrm>
+      </p:grpSpPr>
+      <p:sp>
+        <p:nvSpPr>
+          <p:cNvPr id="2" name="Titolo 1"/>
+          <p:cNvSpPr>
+            <a:spLocks noGrp="1"/>
+          </p:cNvSpPr>
+          <p:nvPr>
+            <p:ph type="title"/>
+          </p:nvPr>
+        </p:nvSpPr>
+        <p:spPr/>
+        <p:txBody>
+          <a:bodyPr>
+            <a:normAutofit/>
+          </a:bodyPr>
+          <a:lstStyle/>
+          <a:p>
+            <a:r>
+              <a:rPr lang="it-IT" dirty="0"/>
+              <a:t>Modello migliorato</a:t>
+            </a:r>
+          </a:p>
+        </p:txBody>
+      </p:sp>
+      <p:pic>
+        <p:nvPicPr>
+          <p:cNvPr id="3" name="Immagine 2"/>
+          <p:cNvPicPr>
+            <a:picLocks noChangeAspect="1"/>
+          </p:cNvPicPr>
+          <p:nvPr/>
+        </p:nvPicPr>
+        <p:blipFill>
+          <a:blip r:embed="rId3"/>
+          <a:stretch>
+            <a:fillRect/>
+          </a:stretch>
+        </p:blipFill>
+        <p:spPr>
+          <a:xfrm>
+            <a:off x="3145971" y="1895671"/>
+            <a:ext cx="5944280" cy="4308914"/>
+          </a:xfrm>
+          <a:prstGeom prst="rect">
+            <a:avLst/>
+          </a:prstGeom>
+        </p:spPr>
+      </p:pic>
+      <p:sp>
+        <p:nvSpPr>
+          <p:cNvPr id="4" name="Rettangolo 3"/>
+          <p:cNvSpPr/>
+          <p:nvPr/>
+        </p:nvSpPr>
+        <p:spPr>
+          <a:xfrm>
+            <a:off x="7215051" y="2939143"/>
+            <a:ext cx="1188720" cy="185057"/>
+          </a:xfrm>
+          <a:prstGeom prst="rect">
+            <a:avLst/>
+          </a:prstGeom>
+          <a:solidFill>
+            <a:srgbClr val="FFFF00">
+              <a:alpha val="33000"/>
+            </a:srgbClr>
+          </a:solidFill>
+        </p:spPr>
+        <p:style>
+          <a:lnRef idx="2">
+            <a:schemeClr val="accent1">
+              <a:shade val="50000"/>
+            </a:schemeClr>
+          </a:lnRef>
+          <a:fillRef idx="1">
+            <a:schemeClr val="accent1"/>
+          </a:fillRef>
+          <a:effectRef idx="0">
+            <a:schemeClr val="accent1"/>
+          </a:effectRef>
+          <a:fontRef idx="minor">
+            <a:schemeClr val="lt1"/>
+          </a:fontRef>
+        </p:style>
+        <p:txBody>
+          <a:bodyPr rtlCol="0" anchor="ctr"/>
+          <a:lstStyle/>
+          <a:p>
+            <a:pPr algn="ctr"/>
+            <a:endParaRPr lang="it-IT"/>
+          </a:p>
+        </p:txBody>
+      </p:sp>
+      <p:sp>
+        <p:nvSpPr>
+          <p:cNvPr id="5" name="Rettangolo 4"/>
+          <p:cNvSpPr/>
+          <p:nvPr/>
+        </p:nvSpPr>
+        <p:spPr>
+          <a:xfrm>
+            <a:off x="7215051" y="3472543"/>
+            <a:ext cx="1188720" cy="185057"/>
+          </a:xfrm>
+          <a:prstGeom prst="rect">
+            <a:avLst/>
+          </a:prstGeom>
+          <a:solidFill>
+            <a:srgbClr val="FFFF00">
+              <a:alpha val="33000"/>
+            </a:srgbClr>
+          </a:solidFill>
+        </p:spPr>
+        <p:style>
+          <a:lnRef idx="2">
+            <a:schemeClr val="accent1">
+              <a:shade val="50000"/>
+            </a:schemeClr>
+          </a:lnRef>
+          <a:fillRef idx="1">
+            <a:schemeClr val="accent1"/>
+          </a:fillRef>
+          <a:effectRef idx="0">
+            <a:schemeClr val="accent1"/>
+          </a:effectRef>
+          <a:fontRef idx="minor">
+            <a:schemeClr val="lt1"/>
+          </a:fontRef>
+        </p:style>
+        <p:txBody>
+          <a:bodyPr rtlCol="0" anchor="ctr"/>
+          <a:lstStyle/>
+          <a:p>
+            <a:pPr algn="ctr"/>
+            <a:endParaRPr lang="it-IT"/>
+          </a:p>
+        </p:txBody>
+      </p:sp>
+      <p:sp>
+        <p:nvSpPr>
+          <p:cNvPr id="6" name="Rettangolo 5"/>
+          <p:cNvSpPr/>
+          <p:nvPr/>
+        </p:nvSpPr>
+        <p:spPr>
+          <a:xfrm>
+            <a:off x="3905794" y="5410200"/>
+            <a:ext cx="742406" cy="163285"/>
+          </a:xfrm>
+          <a:prstGeom prst="rect">
+            <a:avLst/>
+          </a:prstGeom>
+          <a:solidFill>
+            <a:srgbClr val="FFFF00">
+              <a:alpha val="33000"/>
+            </a:srgbClr>
+          </a:solidFill>
+        </p:spPr>
+        <p:style>
+          <a:lnRef idx="2">
+            <a:schemeClr val="accent1">
+              <a:shade val="50000"/>
+            </a:schemeClr>
+          </a:lnRef>
+          <a:fillRef idx="1">
+            <a:schemeClr val="accent1"/>
+          </a:fillRef>
+          <a:effectRef idx="0">
+            <a:schemeClr val="accent1"/>
+          </a:effectRef>
+          <a:fontRef idx="minor">
+            <a:schemeClr val="lt1"/>
+          </a:fontRef>
+        </p:style>
+        <p:txBody>
+          <a:bodyPr rtlCol="0" anchor="ctr"/>
+          <a:lstStyle/>
+          <a:p>
+            <a:pPr algn="ctr"/>
+            <a:endParaRPr lang="it-IT"/>
+          </a:p>
+        </p:txBody>
+      </p:sp>
+    </p:spTree>
+    <p:extLst>
+      <p:ext uri="{BB962C8B-B14F-4D97-AF65-F5344CB8AC3E}">
+        <p14:creationId xmlns:p14="http://schemas.microsoft.com/office/powerpoint/2010/main" val="2805806638"/>
+      </p:ext>
+    </p:extLst>
+  </p:cSld>
+  <p:clrMapOvr>
+    <a:masterClrMapping/>
+  </p:clrMapOvr>
 </p:sld>
 </file>
 
@@ -6838,10 +7379,9 @@
           <a:lstStyle/>
           <a:p>
             <a:r>
-              <a:rPr lang="it-IT" dirty="0" smtClean="0"/>
+              <a:rPr lang="it-IT" dirty="0"/>
               <a:t>Descrizione del caso di studio</a:t>
             </a:r>
-            <a:endParaRPr lang="it-IT" dirty="0"/>
           </a:p>
         </p:txBody>
       </p:sp>
@@ -6870,7 +7410,7 @@
               <a:buAutoNum type="arabicPeriod"/>
             </a:pPr>
             <a:r>
-              <a:rPr lang="it-IT" dirty="0" smtClean="0"/>
+              <a:rPr lang="it-IT" dirty="0"/>
               <a:t>Analisi descrittive del campione</a:t>
             </a:r>
           </a:p>
@@ -6880,7 +7420,7 @@
               <a:buAutoNum type="arabicPeriod"/>
             </a:pPr>
             <a:r>
-              <a:rPr lang="it-IT" dirty="0" smtClean="0"/>
+              <a:rPr lang="it-IT" dirty="0"/>
               <a:t>Sesso ed età</a:t>
             </a:r>
           </a:p>
@@ -6890,7 +7430,7 @@
               <a:buAutoNum type="arabicPeriod"/>
             </a:pPr>
             <a:r>
-              <a:rPr lang="it-IT" dirty="0" smtClean="0"/>
+              <a:rPr lang="it-IT" dirty="0"/>
               <a:t>Variabili oggetto di studio</a:t>
             </a:r>
           </a:p>
@@ -6900,15 +7440,15 @@
               <a:buAutoNum type="arabicPeriod"/>
             </a:pPr>
             <a:r>
-              <a:rPr lang="it-IT" dirty="0" smtClean="0"/>
+              <a:rPr lang="it-IT" dirty="0"/>
               <a:t>Analisi non parametrica basata su metodi di stima di </a:t>
             </a:r>
             <a:r>
-              <a:rPr lang="it-IT" dirty="0" err="1" smtClean="0"/>
+              <a:rPr lang="it-IT" dirty="0" err="1"/>
               <a:t>Kaplan</a:t>
             </a:r>
             <a:r>
-              <a:rPr lang="it-IT" dirty="0" smtClean="0"/>
+              <a:rPr lang="it-IT" dirty="0"/>
               <a:t>-Meier </a:t>
             </a:r>
           </a:p>
@@ -6918,7 +7458,7 @@
               <a:buAutoNum type="arabicPeriod"/>
             </a:pPr>
             <a:r>
-              <a:rPr lang="it-IT" dirty="0" smtClean="0"/>
+              <a:rPr lang="it-IT" dirty="0"/>
               <a:t>Curva della sopravvivenza totale</a:t>
             </a:r>
           </a:p>
@@ -6928,7 +7468,7 @@
               <a:buAutoNum type="arabicPeriod"/>
             </a:pPr>
             <a:r>
-              <a:rPr lang="it-IT" dirty="0" smtClean="0"/>
+              <a:rPr lang="it-IT" dirty="0"/>
               <a:t>Curva della sopravvivenza alla prima ricaduta</a:t>
             </a:r>
           </a:p>
@@ -6938,14 +7478,14 @@
               <a:buAutoNum type="arabicPeriod"/>
             </a:pPr>
             <a:r>
-              <a:rPr lang="it-IT" dirty="0" smtClean="0"/>
+              <a:rPr lang="it-IT" dirty="0"/>
               <a:t>Analisi tramite modelli di </a:t>
             </a:r>
             <a:r>
-              <a:rPr lang="it-IT" dirty="0" err="1" smtClean="0"/>
+              <a:rPr lang="it-IT" dirty="0" err="1"/>
               <a:t>Cox</a:t>
             </a:r>
-            <a:endParaRPr lang="it-IT" dirty="0" smtClean="0"/>
+            <a:endParaRPr lang="it-IT" dirty="0"/>
           </a:p>
           <a:p>
             <a:pPr marL="749808" lvl="1" indent="-457200">
@@ -6953,7 +7493,7 @@
               <a:buAutoNum type="arabicPeriod"/>
             </a:pPr>
             <a:r>
-              <a:rPr lang="it-IT" dirty="0" smtClean="0"/>
+              <a:rPr lang="it-IT" dirty="0"/>
               <a:t>Ipotesi di rischi proporzionali</a:t>
             </a:r>
           </a:p>
@@ -6963,14 +7503,14 @@
               <a:buAutoNum type="arabicPeriod"/>
             </a:pPr>
             <a:r>
-              <a:rPr lang="it-IT" dirty="0" smtClean="0"/>
+              <a:rPr lang="it-IT" dirty="0"/>
               <a:t>Modelli </a:t>
             </a:r>
             <a:r>
-              <a:rPr lang="it-IT" dirty="0" err="1" smtClean="0"/>
+              <a:rPr lang="it-IT" dirty="0" err="1"/>
               <a:t>univariati</a:t>
             </a:r>
-            <a:endParaRPr lang="it-IT" dirty="0" smtClean="0"/>
+            <a:endParaRPr lang="it-IT" dirty="0"/>
           </a:p>
         </p:txBody>
       </p:sp>
@@ -6997,14 +7537,13 @@
           <a:lstStyle/>
           <a:p>
             <a:r>
-              <a:rPr lang="it-IT" sz="1200" dirty="0" err="1" smtClean="0"/>
+              <a:rPr lang="it-IT" sz="1200" dirty="0" err="1"/>
               <a:t>N.b.</a:t>
             </a:r>
             <a:r>
-              <a:rPr lang="it-IT" sz="1200" dirty="0" smtClean="0"/>
+              <a:rPr lang="it-IT" sz="1200" dirty="0"/>
               <a:t>: I tratti salienti dell’analisi sono riportati nelle note per il relatore.</a:t>
             </a:r>
-            <a:endParaRPr lang="it-IT" sz="1200" dirty="0"/>
           </a:p>
         </p:txBody>
       </p:sp>
@@ -7018,13 +7557,6 @@
   <p:clrMapOvr>
     <a:masterClrMapping/>
   </p:clrMapOvr>
-  <p:timing>
-    <p:tnLst>
-      <p:par>
-        <p:cTn id="1" dur="indefinite" restart="never" nodeType="tmRoot"/>
-      </p:par>
-    </p:tnLst>
-  </p:timing>
 </p:sld>
 </file>
 
@@ -7061,10 +7593,9 @@
           <a:lstStyle/>
           <a:p>
             <a:r>
-              <a:rPr lang="it-IT" dirty="0" smtClean="0"/>
+              <a:rPr lang="it-IT" dirty="0"/>
               <a:t>Sesso ed Età</a:t>
             </a:r>
-            <a:endParaRPr lang="it-IT" dirty="0"/>
           </a:p>
         </p:txBody>
       </p:sp>
@@ -7130,13 +7661,6 @@
   <p:clrMapOvr>
     <a:masterClrMapping/>
   </p:clrMapOvr>
-  <p:timing>
-    <p:tnLst>
-      <p:par>
-        <p:cTn id="1" dur="indefinite" restart="never" nodeType="tmRoot"/>
-      </p:par>
-    </p:tnLst>
-  </p:timing>
 </p:sld>
 </file>
 
@@ -7173,14 +7697,9 @@
           <a:lstStyle/>
           <a:p>
             <a:r>
-              <a:rPr lang="it-IT" dirty="0" smtClean="0"/>
-              <a:t>Variabile oggetto di studio: </a:t>
-            </a:r>
-            <a:r>
-              <a:rPr lang="it-IT" dirty="0" smtClean="0"/>
-              <a:t>morte</a:t>
-            </a:r>
-            <a:endParaRPr lang="it-IT" dirty="0"/>
+              <a:rPr lang="it-IT" dirty="0"/>
+              <a:t>Variabile oggetto di studio: morte</a:t>
+            </a:r>
           </a:p>
         </p:txBody>
       </p:sp>
@@ -7210,6 +7729,139 @@
           </a:prstGeom>
         </p:spPr>
       </p:pic>
+      <p:cxnSp>
+        <p:nvCxnSpPr>
+          <p:cNvPr id="4" name="Connettore 2 3"/>
+          <p:cNvCxnSpPr>
+            <a:cxnSpLocks/>
+          </p:cNvCxnSpPr>
+          <p:nvPr/>
+        </p:nvCxnSpPr>
+        <p:spPr>
+          <a:xfrm flipH="1" flipV="1">
+            <a:off x="3352800" y="2910840"/>
+            <a:ext cx="1168400" cy="340360"/>
+          </a:xfrm>
+          <a:prstGeom prst="straightConnector1">
+            <a:avLst/>
+          </a:prstGeom>
+          <a:ln>
+            <a:solidFill>
+              <a:srgbClr val="F8766D"/>
+            </a:solidFill>
+            <a:tailEnd type="triangle"/>
+          </a:ln>
+        </p:spPr>
+        <p:style>
+          <a:lnRef idx="1">
+            <a:schemeClr val="accent1"/>
+          </a:lnRef>
+          <a:fillRef idx="0">
+            <a:schemeClr val="accent1"/>
+          </a:fillRef>
+          <a:effectRef idx="0">
+            <a:schemeClr val="accent1"/>
+          </a:effectRef>
+          <a:fontRef idx="minor">
+            <a:schemeClr val="tx1"/>
+          </a:fontRef>
+        </p:style>
+      </p:cxnSp>
+      <p:cxnSp>
+        <p:nvCxnSpPr>
+          <p:cNvPr id="6" name="Connettore 2 5"/>
+          <p:cNvCxnSpPr>
+            <a:cxnSpLocks/>
+          </p:cNvCxnSpPr>
+          <p:nvPr/>
+        </p:nvCxnSpPr>
+        <p:spPr>
+          <a:xfrm flipV="1">
+            <a:off x="7569200" y="2910840"/>
+            <a:ext cx="1198880" cy="284480"/>
+          </a:xfrm>
+          <a:prstGeom prst="straightConnector1">
+            <a:avLst/>
+          </a:prstGeom>
+          <a:ln>
+            <a:solidFill>
+              <a:srgbClr val="00BFC4"/>
+            </a:solidFill>
+            <a:tailEnd type="triangle"/>
+          </a:ln>
+        </p:spPr>
+        <p:style>
+          <a:lnRef idx="1">
+            <a:schemeClr val="accent1"/>
+          </a:lnRef>
+          <a:fillRef idx="0">
+            <a:schemeClr val="accent1"/>
+          </a:fillRef>
+          <a:effectRef idx="0">
+            <a:schemeClr val="accent1"/>
+          </a:effectRef>
+          <a:fontRef idx="minor">
+            <a:schemeClr val="tx1"/>
+          </a:fontRef>
+        </p:style>
+      </p:cxnSp>
+      <p:sp>
+        <p:nvSpPr>
+          <p:cNvPr id="8" name="CasellaDiTesto 7"/>
+          <p:cNvSpPr txBox="1"/>
+          <p:nvPr/>
+        </p:nvSpPr>
+        <p:spPr>
+          <a:xfrm>
+            <a:off x="2465022" y="2650728"/>
+            <a:ext cx="841897" cy="369332"/>
+          </a:xfrm>
+          <a:prstGeom prst="rect">
+            <a:avLst/>
+          </a:prstGeom>
+          <a:noFill/>
+        </p:spPr>
+        <p:txBody>
+          <a:bodyPr wrap="none" rtlCol="0">
+            <a:spAutoFit/>
+          </a:bodyPr>
+          <a:lstStyle/>
+          <a:p>
+            <a:r>
+              <a:rPr lang="it-IT" dirty="0"/>
+              <a:t>maschi</a:t>
+            </a:r>
+          </a:p>
+        </p:txBody>
+      </p:sp>
+      <p:sp>
+        <p:nvSpPr>
+          <p:cNvPr id="9" name="Rettangolo 8"/>
+          <p:cNvSpPr/>
+          <p:nvPr/>
+        </p:nvSpPr>
+        <p:spPr>
+          <a:xfrm>
+            <a:off x="8899526" y="2650728"/>
+            <a:ext cx="1023678" cy="369332"/>
+          </a:xfrm>
+          <a:prstGeom prst="rect">
+            <a:avLst/>
+          </a:prstGeom>
+        </p:spPr>
+        <p:txBody>
+          <a:bodyPr wrap="none">
+            <a:spAutoFit/>
+          </a:bodyPr>
+          <a:lstStyle/>
+          <a:p>
+            <a:r>
+              <a:rPr lang="it-IT" dirty="0"/>
+              <a:t>femmine</a:t>
+            </a:r>
+          </a:p>
+        </p:txBody>
+      </p:sp>
     </p:spTree>
     <p:extLst>
       <p:ext uri="{BB962C8B-B14F-4D97-AF65-F5344CB8AC3E}">
@@ -7220,13 +7872,6 @@
   <p:clrMapOvr>
     <a:masterClrMapping/>
   </p:clrMapOvr>
-  <p:timing>
-    <p:tnLst>
-      <p:par>
-        <p:cTn id="1" dur="indefinite" restart="never" nodeType="tmRoot"/>
-      </p:par>
-    </p:tnLst>
-  </p:timing>
 </p:sld>
 </file>
 
@@ -7264,13 +7909,8 @@
           <a:p>
             <a:r>
               <a:rPr lang="it-IT" dirty="0"/>
-              <a:t>Variabile oggetto di studio: </a:t>
-            </a:r>
-            <a:r>
-              <a:rPr lang="it-IT" dirty="0" smtClean="0"/>
-              <a:t>ricaduta</a:t>
-            </a:r>
-            <a:endParaRPr lang="it-IT" dirty="0"/>
+              <a:t>Variabile oggetto di studio: ricaduta</a:t>
+            </a:r>
           </a:p>
         </p:txBody>
       </p:sp>
@@ -7299,10 +7939,9 @@
               <a:buChar char="•"/>
             </a:pPr>
             <a:r>
-              <a:rPr lang="it-IT" sz="1600" dirty="0" smtClean="0"/>
+              <a:rPr lang="it-IT" sz="1600" dirty="0"/>
               <a:t>Abbiamo considerato tra coloro che hanno avuto una ricaduta quelli che: </a:t>
             </a:r>
-            <a:endParaRPr lang="it-IT" sz="1600" dirty="0"/>
           </a:p>
           <a:p>
             <a:pPr marL="742950" lvl="1" indent="-285750">
@@ -7311,13 +7950,8 @@
             </a:pPr>
             <a:r>
               <a:rPr lang="it-IT" sz="1600" dirty="0"/>
-              <a:t>Sono morti subito dopo la data della prima </a:t>
-            </a:r>
-            <a:r>
-              <a:rPr lang="it-IT" sz="1600" dirty="0" smtClean="0"/>
-              <a:t>ricaduta;</a:t>
-            </a:r>
-            <a:endParaRPr lang="it-IT" sz="1600" dirty="0"/>
+              <a:t>Sono morti subito dopo la data della prima ricaduta;</a:t>
+            </a:r>
           </a:p>
           <a:p>
             <a:pPr marL="742950" lvl="1" indent="-285750">
@@ -7326,13 +7960,8 @@
             </a:pPr>
             <a:r>
               <a:rPr lang="it-IT" sz="1600" dirty="0"/>
-              <a:t>Sono morti tempo dopo la data della prima </a:t>
-            </a:r>
-            <a:r>
-              <a:rPr lang="it-IT" sz="1600" dirty="0" smtClean="0"/>
-              <a:t>ricaduta (almeno un mese di differenza);</a:t>
-            </a:r>
-            <a:endParaRPr lang="it-IT" sz="1600" dirty="0"/>
+              <a:t>Sono morti tempo dopo la data della prima ricaduta (almeno un mese di differenza);</a:t>
+            </a:r>
           </a:p>
           <a:p>
             <a:pPr marL="742950" lvl="1" indent="-285750">
@@ -7341,13 +7970,8 @@
             </a:pPr>
             <a:r>
               <a:rPr lang="it-IT" sz="1600" dirty="0"/>
-              <a:t>Sono ancora vivi, ma hanno avuto una </a:t>
-            </a:r>
-            <a:r>
-              <a:rPr lang="it-IT" sz="1600" dirty="0" smtClean="0"/>
-              <a:t>ricaduta.</a:t>
-            </a:r>
-            <a:endParaRPr lang="it-IT" sz="1600" dirty="0"/>
+              <a:t>Sono ancora vivi, ma hanno avuto una ricaduta.</a:t>
+            </a:r>
           </a:p>
           <a:p>
             <a:endParaRPr lang="it-IT" dirty="0"/>
@@ -7390,13 +8014,6 @@
   <p:clrMapOvr>
     <a:masterClrMapping/>
   </p:clrMapOvr>
-  <p:timing>
-    <p:tnLst>
-      <p:par>
-        <p:cTn id="1" dur="indefinite" restart="never" nodeType="tmRoot"/>
-      </p:par>
-    </p:tnLst>
-  </p:timing>
 </p:sld>
 </file>
 
@@ -7433,14 +8050,13 @@
           <a:lstStyle/>
           <a:p>
             <a:r>
-              <a:rPr lang="it-IT" dirty="0" err="1" smtClean="0"/>
+              <a:rPr lang="it-IT" dirty="0" err="1"/>
               <a:t>Covariate</a:t>
             </a:r>
             <a:r>
-              <a:rPr lang="it-IT" dirty="0" smtClean="0"/>
+              <a:rPr lang="it-IT" dirty="0"/>
               <a:t>: LNR e LODDS</a:t>
             </a:r>
-            <a:endParaRPr lang="it-IT" dirty="0"/>
           </a:p>
         </p:txBody>
       </p:sp>
@@ -7542,10 +8158,9 @@
           <a:lstStyle/>
           <a:p>
             <a:r>
-              <a:rPr lang="it-IT" dirty="0" smtClean="0"/>
+              <a:rPr lang="it-IT" dirty="0"/>
               <a:t>Stima della curva di sopravvivenza</a:t>
             </a:r>
-            <a:endParaRPr lang="it-IT" dirty="0"/>
           </a:p>
         </p:txBody>
       </p:sp>
@@ -7570,30 +8185,30 @@
           <a:lstStyle/>
           <a:p>
             <a:r>
-              <a:rPr lang="it-IT" dirty="0" smtClean="0"/>
+              <a:rPr lang="it-IT" dirty="0"/>
               <a:t>Per la stima di entrambe le curve della sopravvivenza totale e </a:t>
             </a:r>
             <a:r>
-              <a:rPr lang="it-IT" dirty="0" err="1" smtClean="0"/>
+              <a:rPr lang="it-IT" dirty="0" err="1"/>
               <a:t>Disease</a:t>
             </a:r>
             <a:r>
-              <a:rPr lang="it-IT" dirty="0" smtClean="0"/>
+              <a:rPr lang="it-IT" dirty="0"/>
               <a:t>-Free è stato adoperato lo stimatore di </a:t>
             </a:r>
             <a:r>
-              <a:rPr lang="it-IT" dirty="0" err="1" smtClean="0"/>
+              <a:rPr lang="it-IT" dirty="0" err="1"/>
               <a:t>Kaplan</a:t>
             </a:r>
             <a:r>
-              <a:rPr lang="it-IT" dirty="0" smtClean="0"/>
+              <a:rPr lang="it-IT" dirty="0"/>
               <a:t>-Meier (1959):</a:t>
             </a:r>
           </a:p>
         </p:txBody>
       </p:sp>
-      <mc:AlternateContent xmlns:mc="http://schemas.openxmlformats.org/markup-compatibility/2006">
-        <mc:Choice xmlns:a14="http://schemas.microsoft.com/office/drawing/2010/main" Requires="a14">
+      <mc:AlternateContent xmlns:mc="http://schemas.openxmlformats.org/markup-compatibility/2006" xmlns:a14="http://schemas.microsoft.com/office/drawing/2010/main">
+        <mc:Choice Requires="a14">
           <p:sp>
             <p:nvSpPr>
               <p:cNvPr id="6" name="Segnaposto contenuto 5"/>
@@ -7794,15 +8409,14 @@
                   </m:oMath>
                 </a14:m>
                 <a:r>
-                  <a:rPr lang="it-IT" dirty="0" smtClean="0"/>
+                  <a:rPr lang="it-IT" dirty="0"/>
                   <a:t>)</a:t>
                 </a:r>
-                <a:endParaRPr lang="it-IT" dirty="0"/>
               </a:p>
             </p:txBody>
           </p:sp>
         </mc:Choice>
-        <mc:Fallback>
+        <mc:Fallback xmlns="">
           <p:sp>
             <p:nvSpPr>
               <p:cNvPr id="6" name="Segnaposto contenuto 5"/>
@@ -8109,46 +8723,45 @@
           </a:lstStyle>
           <a:p>
             <a:r>
-              <a:rPr lang="it-IT" dirty="0" smtClean="0"/>
+              <a:rPr lang="it-IT" dirty="0"/>
               <a:t>Le analisi sono state condotte tramite il linguaggio di programmazione per l’analisi statistica R versione 3.3.3, per Windows.</a:t>
             </a:r>
           </a:p>
           <a:p>
             <a:r>
-              <a:rPr lang="it-IT" dirty="0" smtClean="0"/>
+              <a:rPr lang="it-IT" dirty="0"/>
               <a:t>Per l’analisi della sopravvivenza sono stati adoperati i </a:t>
             </a:r>
             <a:r>
-              <a:rPr lang="it-IT" dirty="0" err="1" smtClean="0"/>
+              <a:rPr lang="it-IT" dirty="0" err="1"/>
               <a:t>pachetti</a:t>
             </a:r>
             <a:r>
-              <a:rPr lang="it-IT" dirty="0" smtClean="0"/>
+              <a:rPr lang="it-IT" dirty="0"/>
               <a:t> ‘</a:t>
             </a:r>
             <a:r>
-              <a:rPr lang="it-IT" dirty="0" err="1" smtClean="0"/>
+              <a:rPr lang="it-IT" dirty="0" err="1"/>
               <a:t>Epicalc</a:t>
             </a:r>
             <a:r>
-              <a:rPr lang="it-IT" dirty="0" smtClean="0"/>
+              <a:rPr lang="it-IT" dirty="0"/>
               <a:t>’ e ‘</a:t>
             </a:r>
             <a:r>
-              <a:rPr lang="it-IT" dirty="0" err="1" smtClean="0"/>
+              <a:rPr lang="it-IT" dirty="0" err="1"/>
               <a:t>Survival</a:t>
             </a:r>
             <a:r>
-              <a:rPr lang="it-IT" dirty="0" smtClean="0"/>
+              <a:rPr lang="it-IT" dirty="0"/>
               <a:t>’.</a:t>
             </a:r>
           </a:p>
           <a:p>
             <a:r>
-              <a:rPr lang="it-IT" dirty="0" smtClean="0"/>
+              <a:rPr lang="it-IT" dirty="0"/>
               <a:t>I grafici sono stati realizzati con il pacchetto ‘ggplot2’. </a:t>
             </a:r>
-            <a:endParaRPr lang="it-IT" dirty="0" smtClean="0"/>
           </a:p>
         </p:txBody>
       </p:sp>

</xml_diff>

<commit_message>
rimossi i dati, aggiornato il powepoint
</commit_message>
<xml_diff>
--- a/2017-5 - 10 gruppo 8.pptx
+++ b/2017-5 - 10 gruppo 8.pptx
@@ -258,7 +258,7 @@
           <a:p>
             <a:fld id="{0679B769-5A28-446B-BCC4-FA0AD2C4FFEB}" type="datetimeFigureOut">
               <a:rPr lang="it-IT" smtClean="0"/>
-              <a:t>08/05/2017</a:t>
+              <a:t>09/05/2017</a:t>
             </a:fld>
             <a:endParaRPr lang="it-IT"/>
           </a:p>
@@ -1262,7 +1262,90 @@
           <a:bodyPr/>
           <a:lstStyle/>
           <a:p>
-            <a:endParaRPr lang="it-IT" dirty="0"/>
+            <a:r>
+              <a:rPr lang="it-IT" dirty="0"/>
+              <a:t>Tenendo conto anche dell’età il modello è notevolmente migliorato. </a:t>
+            </a:r>
+            <a:br>
+              <a:rPr lang="it-IT" dirty="0"/>
+            </a:br>
+            <a:r>
+              <a:rPr lang="it-IT" dirty="0"/>
+              <a:t>Adesso LNR risulta significativo. </a:t>
+            </a:r>
+            <a:br>
+              <a:rPr lang="it-IT" dirty="0"/>
+            </a:br>
+            <a:r>
+              <a:rPr lang="it-IT" dirty="0"/>
+              <a:t>Inoltre, tramite </a:t>
+            </a:r>
+            <a:r>
+              <a:rPr lang="it-IT" dirty="0" err="1"/>
+              <a:t>stepward</a:t>
+            </a:r>
+            <a:r>
+              <a:rPr lang="it-IT" dirty="0"/>
+              <a:t> procedure, siamo riusciti a trovare un ulteriore fattore protettivo: ASA 2. </a:t>
+            </a:r>
+            <a:br>
+              <a:rPr lang="it-IT" dirty="0"/>
+            </a:br>
+            <a:r>
+              <a:rPr lang="it-IT" dirty="0"/>
+              <a:t>Di fatto, facendo una breve ricerca online, siamo riusciti a trovare un </a:t>
+            </a:r>
+            <a:r>
+              <a:rPr lang="it-IT" dirty="0" err="1"/>
+              <a:t>paper</a:t>
+            </a:r>
+            <a:r>
+              <a:rPr lang="it-IT" dirty="0"/>
+              <a:t> che dovrebbe trattare dello stesso argomento. In esso, è descritto che l’acido amino </a:t>
+            </a:r>
+            <a:r>
+              <a:rPr lang="it-IT" dirty="0" err="1"/>
+              <a:t>salicitico</a:t>
+            </a:r>
+            <a:r>
+              <a:rPr lang="it-IT" dirty="0"/>
+              <a:t> è un fattore </a:t>
+            </a:r>
+            <a:r>
+              <a:rPr lang="it-IT" dirty="0" err="1"/>
+              <a:t>chemioprotettivo</a:t>
+            </a:r>
+            <a:r>
+              <a:rPr lang="it-IT" dirty="0"/>
+              <a:t>. </a:t>
+            </a:r>
+          </a:p>
+          <a:p>
+            <a:r>
+              <a:rPr lang="it-IT" dirty="0"/>
+              <a:t>http://www.dldjournalonline.com/article/S1590-8658(05)00230-6/fulltext?cc=y=</a:t>
+            </a:r>
+          </a:p>
+          <a:p>
+            <a:r>
+              <a:rPr lang="it-IT" dirty="0"/>
+              <a:t>Tuttavia, nell’abstract è riportato: </a:t>
+            </a:r>
+          </a:p>
+          <a:p>
+            <a:r>
+              <a:rPr lang="en-US" sz="1200" b="0" i="1" kern="1200" dirty="0">
+                <a:solidFill>
+                  <a:schemeClr val="tx1"/>
+                </a:solidFill>
+                <a:effectLst/>
+                <a:latin typeface="+mn-lt"/>
+                <a:ea typeface="+mn-ea"/>
+                <a:cs typeface="+mn-cs"/>
+              </a:rPr>
+              <a:t>The evidence for this effect is provided by retrospective and case-control studies whose results, however, do not reach the highest grades for evidence-based recommendations.</a:t>
+            </a:r>
+            <a:endParaRPr lang="it-IT" i="1" dirty="0"/>
           </a:p>
         </p:txBody>
       </p:sp>
@@ -2616,7 +2699,7 @@
           <a:p>
             <a:fld id="{A2A5EAEC-CBB0-449A-A9CE-5377B44B413C}" type="datetimeFigureOut">
               <a:rPr lang="it-IT" smtClean="0"/>
-              <a:t>08/05/2017</a:t>
+              <a:t>09/05/2017</a:t>
             </a:fld>
             <a:endParaRPr lang="it-IT"/>
           </a:p>
@@ -2824,7 +2907,7 @@
           <a:p>
             <a:fld id="{A2A5EAEC-CBB0-449A-A9CE-5377B44B413C}" type="datetimeFigureOut">
               <a:rPr lang="it-IT" smtClean="0"/>
-              <a:t>08/05/2017</a:t>
+              <a:t>09/05/2017</a:t>
             </a:fld>
             <a:endParaRPr lang="it-IT"/>
           </a:p>
@@ -3080,7 +3163,7 @@
           <a:p>
             <a:fld id="{A2A5EAEC-CBB0-449A-A9CE-5377B44B413C}" type="datetimeFigureOut">
               <a:rPr lang="it-IT" smtClean="0"/>
-              <a:t>08/05/2017</a:t>
+              <a:t>09/05/2017</a:t>
             </a:fld>
             <a:endParaRPr lang="it-IT"/>
           </a:p>
@@ -3254,7 +3337,7 @@
           <a:p>
             <a:fld id="{A2A5EAEC-CBB0-449A-A9CE-5377B44B413C}" type="datetimeFigureOut">
               <a:rPr lang="it-IT" smtClean="0"/>
-              <a:t>08/05/2017</a:t>
+              <a:t>09/05/2017</a:t>
             </a:fld>
             <a:endParaRPr lang="it-IT"/>
           </a:p>
@@ -3597,7 +3680,7 @@
           <a:p>
             <a:fld id="{A2A5EAEC-CBB0-449A-A9CE-5377B44B413C}" type="datetimeFigureOut">
               <a:rPr lang="it-IT" smtClean="0"/>
-              <a:t>08/05/2017</a:t>
+              <a:t>09/05/2017</a:t>
             </a:fld>
             <a:endParaRPr lang="it-IT"/>
           </a:p>
@@ -3872,7 +3955,7 @@
           <a:p>
             <a:fld id="{A2A5EAEC-CBB0-449A-A9CE-5377B44B413C}" type="datetimeFigureOut">
               <a:rPr lang="it-IT" smtClean="0"/>
-              <a:t>08/05/2017</a:t>
+              <a:t>09/05/2017</a:t>
             </a:fld>
             <a:endParaRPr lang="it-IT"/>
           </a:p>
@@ -4251,7 +4334,7 @@
           <a:p>
             <a:fld id="{A2A5EAEC-CBB0-449A-A9CE-5377B44B413C}" type="datetimeFigureOut">
               <a:rPr lang="it-IT" smtClean="0"/>
-              <a:t>08/05/2017</a:t>
+              <a:t>09/05/2017</a:t>
             </a:fld>
             <a:endParaRPr lang="it-IT"/>
           </a:p>
@@ -4369,7 +4452,7 @@
           <a:p>
             <a:fld id="{A2A5EAEC-CBB0-449A-A9CE-5377B44B413C}" type="datetimeFigureOut">
               <a:rPr lang="it-IT" smtClean="0"/>
-              <a:t>08/05/2017</a:t>
+              <a:t>09/05/2017</a:t>
             </a:fld>
             <a:endParaRPr lang="it-IT"/>
           </a:p>
@@ -4540,7 +4623,7 @@
           <a:p>
             <a:fld id="{A2A5EAEC-CBB0-449A-A9CE-5377B44B413C}" type="datetimeFigureOut">
               <a:rPr lang="it-IT" smtClean="0"/>
-              <a:t>08/05/2017</a:t>
+              <a:t>09/05/2017</a:t>
             </a:fld>
             <a:endParaRPr lang="it-IT"/>
           </a:p>
@@ -4894,7 +4977,7 @@
           <a:p>
             <a:fld id="{A2A5EAEC-CBB0-449A-A9CE-5377B44B413C}" type="datetimeFigureOut">
               <a:rPr lang="it-IT" smtClean="0"/>
-              <a:t>08/05/2017</a:t>
+              <a:t>09/05/2017</a:t>
             </a:fld>
             <a:endParaRPr lang="it-IT"/>
           </a:p>
@@ -5276,7 +5359,7 @@
           <a:p>
             <a:fld id="{A2A5EAEC-CBB0-449A-A9CE-5377B44B413C}" type="datetimeFigureOut">
               <a:rPr lang="it-IT" smtClean="0"/>
-              <a:t>08/05/2017</a:t>
+              <a:t>09/05/2017</a:t>
             </a:fld>
             <a:endParaRPr lang="it-IT"/>
           </a:p>
@@ -5563,7 +5646,7 @@
           <a:p>
             <a:fld id="{A2A5EAEC-CBB0-449A-A9CE-5377B44B413C}" type="datetimeFigureOut">
               <a:rPr lang="it-IT" smtClean="0"/>
-              <a:t>08/05/2017</a:t>
+              <a:t>09/05/2017</a:t>
             </a:fld>
             <a:endParaRPr lang="it-IT"/>
           </a:p>
@@ -7150,33 +7233,9 @@
           <a:chExt cx="0" cy="0"/>
         </a:xfrm>
       </p:grpSpPr>
-      <p:sp>
-        <p:nvSpPr>
-          <p:cNvPr id="2" name="Titolo 1"/>
-          <p:cNvSpPr>
-            <a:spLocks noGrp="1"/>
-          </p:cNvSpPr>
-          <p:nvPr>
-            <p:ph type="title"/>
-          </p:nvPr>
-        </p:nvSpPr>
-        <p:spPr/>
-        <p:txBody>
-          <a:bodyPr>
-            <a:normAutofit/>
-          </a:bodyPr>
-          <a:lstStyle/>
-          <a:p>
-            <a:r>
-              <a:rPr lang="it-IT" dirty="0"/>
-              <a:t>Modello migliorato</a:t>
-            </a:r>
-          </a:p>
-        </p:txBody>
-      </p:sp>
       <p:pic>
         <p:nvPicPr>
-          <p:cNvPr id="3" name="Immagine 2"/>
+          <p:cNvPr id="7" name="Immagine 6"/>
           <p:cNvPicPr>
             <a:picLocks noChangeAspect="1"/>
           </p:cNvPicPr>
@@ -7190,8 +7249,8 @@
         </p:blipFill>
         <p:spPr>
           <a:xfrm>
-            <a:off x="3145971" y="1895671"/>
-            <a:ext cx="5944280" cy="4308914"/>
+            <a:off x="3760198" y="2145516"/>
+            <a:ext cx="4732564" cy="4049135"/>
           </a:xfrm>
           <a:prstGeom prst="rect">
             <a:avLst/>
@@ -7200,14 +7259,38 @@
       </p:pic>
       <p:sp>
         <p:nvSpPr>
+          <p:cNvPr id="2" name="Titolo 1"/>
+          <p:cNvSpPr>
+            <a:spLocks noGrp="1"/>
+          </p:cNvSpPr>
+          <p:nvPr>
+            <p:ph type="title"/>
+          </p:nvPr>
+        </p:nvSpPr>
+        <p:spPr/>
+        <p:txBody>
+          <a:bodyPr>
+            <a:normAutofit/>
+          </a:bodyPr>
+          <a:lstStyle/>
+          <a:p>
+            <a:r>
+              <a:rPr lang="it-IT" dirty="0"/>
+              <a:t>Modello migliorato</a:t>
+            </a:r>
+          </a:p>
+        </p:txBody>
+      </p:sp>
+      <p:sp>
+        <p:nvSpPr>
           <p:cNvPr id="4" name="Rettangolo 3"/>
           <p:cNvSpPr/>
           <p:nvPr/>
         </p:nvSpPr>
         <p:spPr>
           <a:xfrm>
-            <a:off x="7215051" y="2939143"/>
-            <a:ext cx="1188720" cy="185057"/>
+            <a:off x="6668588" y="2971859"/>
+            <a:ext cx="981892" cy="163772"/>
           </a:xfrm>
           <a:prstGeom prst="rect">
             <a:avLst/>
@@ -7251,8 +7334,8 @@
         </p:nvSpPr>
         <p:spPr>
           <a:xfrm>
-            <a:off x="7215051" y="3472543"/>
-            <a:ext cx="1188720" cy="185057"/>
+            <a:off x="6668588" y="3261360"/>
+            <a:ext cx="981892" cy="143457"/>
           </a:xfrm>
           <a:prstGeom prst="rect">
             <a:avLst/>
@@ -7296,8 +7379,8 @@
         </p:nvSpPr>
         <p:spPr>
           <a:xfrm>
-            <a:off x="3905794" y="5410200"/>
-            <a:ext cx="742406" cy="163285"/>
+            <a:off x="6668588" y="3404817"/>
+            <a:ext cx="981892" cy="138970"/>
           </a:xfrm>
           <a:prstGeom prst="rect">
             <a:avLst/>
@@ -7330,6 +7413,116 @@
           <a:p>
             <a:pPr algn="ctr"/>
             <a:endParaRPr lang="it-IT"/>
+          </a:p>
+        </p:txBody>
+      </p:sp>
+      <p:sp>
+        <p:nvSpPr>
+          <p:cNvPr id="8" name="Rettangolo 7"/>
+          <p:cNvSpPr/>
+          <p:nvPr/>
+        </p:nvSpPr>
+        <p:spPr>
+          <a:xfrm>
+            <a:off x="4161608" y="4792980"/>
+            <a:ext cx="760912" cy="152887"/>
+          </a:xfrm>
+          <a:prstGeom prst="rect">
+            <a:avLst/>
+          </a:prstGeom>
+          <a:solidFill>
+            <a:srgbClr val="FFFF00">
+              <a:alpha val="33000"/>
+            </a:srgbClr>
+          </a:solidFill>
+        </p:spPr>
+        <p:style>
+          <a:lnRef idx="2">
+            <a:schemeClr val="accent1">
+              <a:shade val="50000"/>
+            </a:schemeClr>
+          </a:lnRef>
+          <a:fillRef idx="1">
+            <a:schemeClr val="accent1"/>
+          </a:fillRef>
+          <a:effectRef idx="0">
+            <a:schemeClr val="accent1"/>
+          </a:effectRef>
+          <a:fontRef idx="minor">
+            <a:schemeClr val="lt1"/>
+          </a:fontRef>
+        </p:style>
+        <p:txBody>
+          <a:bodyPr rtlCol="0" anchor="ctr"/>
+          <a:lstStyle/>
+          <a:p>
+            <a:pPr algn="ctr"/>
+            <a:endParaRPr lang="it-IT"/>
+          </a:p>
+        </p:txBody>
+      </p:sp>
+      <p:cxnSp>
+        <p:nvCxnSpPr>
+          <p:cNvPr id="11" name="Connettore 2 10"/>
+          <p:cNvCxnSpPr/>
+          <p:nvPr/>
+        </p:nvCxnSpPr>
+        <p:spPr>
+          <a:xfrm flipH="1">
+            <a:off x="3116580" y="4869180"/>
+            <a:ext cx="518160" cy="0"/>
+          </a:xfrm>
+          <a:prstGeom prst="straightConnector1">
+            <a:avLst/>
+          </a:prstGeom>
+          <a:ln>
+            <a:tailEnd type="triangle"/>
+          </a:ln>
+        </p:spPr>
+        <p:style>
+          <a:lnRef idx="1">
+            <a:schemeClr val="accent1"/>
+          </a:lnRef>
+          <a:fillRef idx="0">
+            <a:schemeClr val="accent1"/>
+          </a:fillRef>
+          <a:effectRef idx="0">
+            <a:schemeClr val="accent1"/>
+          </a:effectRef>
+          <a:fontRef idx="minor">
+            <a:schemeClr val="tx1"/>
+          </a:fontRef>
+        </p:style>
+      </p:cxnSp>
+      <p:sp>
+        <p:nvSpPr>
+          <p:cNvPr id="12" name="CasellaDiTesto 11">
+            <a:hlinkClick r:id="rId4"/>
+          </p:cNvPr>
+          <p:cNvSpPr txBox="1"/>
+          <p:nvPr/>
+        </p:nvSpPr>
+        <p:spPr>
+          <a:xfrm>
+            <a:off x="1714500" y="4655820"/>
+            <a:ext cx="1196340" cy="369332"/>
+          </a:xfrm>
+          <a:prstGeom prst="rect">
+            <a:avLst/>
+          </a:prstGeom>
+          <a:noFill/>
+        </p:spPr>
+        <p:txBody>
+          <a:bodyPr wrap="square" rtlCol="0">
+            <a:spAutoFit/>
+          </a:bodyPr>
+          <a:lstStyle/>
+          <a:p>
+            <a:r>
+              <a:rPr lang="it-IT" dirty="0" err="1"/>
+              <a:t>Dldjournal</a:t>
+            </a:r>
+            <a:endParaRPr lang="it-IT" dirty="0"/>
           </a:p>
         </p:txBody>
       </p:sp>

</xml_diff>